<commit_message>
update change feed ppt
</commit_message>
<xml_diff>
--- a/decks/Change-Feed.pptx
+++ b/decks/Change-Feed.pptx
@@ -5,25 +5,28 @@
     <p:sldMasterId id="2147484407" r:id="rId3"/>
   </p:sldMasterIdLst>
   <p:notesMasterIdLst>
-    <p:notesMasterId r:id="rId17"/>
+    <p:notesMasterId r:id="rId20"/>
   </p:notesMasterIdLst>
   <p:handoutMasterIdLst>
-    <p:handoutMasterId r:id="rId18"/>
+    <p:handoutMasterId r:id="rId21"/>
   </p:handoutMasterIdLst>
   <p:sldIdLst>
     <p:sldId id="4653" r:id="rId4"/>
     <p:sldId id="4709" r:id="rId5"/>
-    <p:sldId id="1568" r:id="rId6"/>
+    <p:sldId id="4719" r:id="rId6"/>
     <p:sldId id="4710" r:id="rId7"/>
     <p:sldId id="4711" r:id="rId8"/>
     <p:sldId id="4712" r:id="rId9"/>
-    <p:sldId id="4714" r:id="rId10"/>
-    <p:sldId id="4713" r:id="rId11"/>
-    <p:sldId id="4715" r:id="rId12"/>
-    <p:sldId id="1600" r:id="rId13"/>
-    <p:sldId id="373" r:id="rId14"/>
-    <p:sldId id="4718" r:id="rId15"/>
-    <p:sldId id="411" r:id="rId16"/>
+    <p:sldId id="4721" r:id="rId10"/>
+    <p:sldId id="4714" r:id="rId11"/>
+    <p:sldId id="1936" r:id="rId12"/>
+    <p:sldId id="4713" r:id="rId13"/>
+    <p:sldId id="4720" r:id="rId14"/>
+    <p:sldId id="4715" r:id="rId15"/>
+    <p:sldId id="1600" r:id="rId16"/>
+    <p:sldId id="373" r:id="rId17"/>
+    <p:sldId id="4718" r:id="rId18"/>
+    <p:sldId id="411" r:id="rId19"/>
   </p:sldIdLst>
   <p:sldSz cx="12192000" cy="6858000"/>
   <p:notesSz cx="6858000" cy="9144000"/>
@@ -129,12 +132,15 @@
           <p14:sldIdLst>
             <p14:sldId id="4653"/>
             <p14:sldId id="4709"/>
-            <p14:sldId id="1568"/>
+            <p14:sldId id="4719"/>
             <p14:sldId id="4710"/>
             <p14:sldId id="4711"/>
             <p14:sldId id="4712"/>
+            <p14:sldId id="4721"/>
             <p14:sldId id="4714"/>
+            <p14:sldId id="1936"/>
             <p14:sldId id="4713"/>
+            <p14:sldId id="4720"/>
             <p14:sldId id="4715"/>
             <p14:sldId id="1600"/>
             <p14:sldId id="373"/>
@@ -271,7 +277,7 @@
               <a:rPr lang="en-US" smtClean="0">
                 <a:latin typeface="Arial" panose="020B0604020202020204" pitchFamily="34" charset="0"/>
               </a:rPr>
-              <a:t>5/28/2019</a:t>
+              <a:t>6/24/2019</a:t>
             </a:fld>
             <a:endParaRPr lang="en-US" dirty="0">
               <a:latin typeface="Arial" panose="020B0604020202020204" pitchFamily="34" charset="0"/>
@@ -461,7 +467,7 @@
             <a:fld id="{C3B508DD-CDB9-4EE9-8F98-E98C69349142}" type="datetimeFigureOut">
               <a:rPr lang="en-US" smtClean="0"/>
               <a:pPr/>
-              <a:t>5/28/2019</a:t>
+              <a:t>6/24/2019</a:t>
             </a:fld>
             <a:endParaRPr lang="en-US" dirty="0"/>
           </a:p>
@@ -777,18 +783,21 @@
           <a:bodyPr/>
           <a:lstStyle/>
           <a:p>
-            <a:endParaRPr lang="en-US"/>
+            <a:r>
+              <a:rPr lang="en-US" dirty="0"/>
+              <a:t>Demo available here: https://github.com/Azure-Samples/cosmosdb-materialized-views</a:t>
+            </a:r>
           </a:p>
         </p:txBody>
       </p:sp>
       <p:sp>
         <p:nvSpPr>
-          <p:cNvPr id="4" name="Header Placeholder 3"/>
+          <p:cNvPr id="4" name="Slide Number Placeholder 3"/>
           <p:cNvSpPr>
             <a:spLocks noGrp="1"/>
           </p:cNvSpPr>
           <p:nvPr>
-            <p:ph type="hdr" sz="quarter" idx="10"/>
+            <p:ph type="sldNum" sz="quarter" idx="5"/>
           </p:nvPr>
         </p:nvSpPr>
         <p:spPr/>
@@ -796,270 +805,19 @@
           <a:bodyPr/>
           <a:lstStyle/>
           <a:p>
-            <a:pPr marL="0" marR="0" lvl="0" indent="0" algn="l" defTabSz="932742" rtl="0" eaLnBrk="1" fontAlgn="auto" latinLnBrk="0" hangingPunct="1">
-              <a:lnSpc>
-                <a:spcPct val="100000"/>
-              </a:lnSpc>
-              <a:spcBef>
-                <a:spcPts val="0"/>
-              </a:spcBef>
-              <a:spcAft>
-                <a:spcPts val="0"/>
-              </a:spcAft>
-              <a:buClrTx/>
-              <a:buSzTx/>
-              <a:buFontTx/>
-              <a:buNone/>
-              <a:tabLst/>
-              <a:defRPr/>
-            </a:pPr>
-            <a:endParaRPr kumimoji="0" lang="en-US" sz="1200" b="0" i="0" u="none" strike="noStrike" kern="1200" cap="none" spc="0" normalizeH="0" baseline="0" noProof="0" dirty="0">
-              <a:ln>
-                <a:noFill/>
-              </a:ln>
-              <a:solidFill>
-                <a:prstClr val="black"/>
-              </a:solidFill>
-              <a:effectLst/>
-              <a:uLnTx/>
-              <a:uFillTx/>
-              <a:latin typeface="Arial" panose="020B0604020202020204" pitchFamily="34" charset="0"/>
-              <a:ea typeface="+mn-ea"/>
-              <a:cs typeface="+mn-cs"/>
-            </a:endParaRPr>
-          </a:p>
-        </p:txBody>
-      </p:sp>
-      <p:sp>
-        <p:nvSpPr>
-          <p:cNvPr id="5" name="Footer Placeholder 4"/>
-          <p:cNvSpPr>
-            <a:spLocks noGrp="1"/>
-          </p:cNvSpPr>
-          <p:nvPr>
-            <p:ph type="ftr" sz="quarter" idx="11"/>
-          </p:nvPr>
-        </p:nvSpPr>
-        <p:spPr/>
-        <p:txBody>
-          <a:bodyPr/>
-          <a:lstStyle/>
-          <a:p>
-            <a:pPr marL="571500" marR="0" lvl="0" indent="0" algn="l" defTabSz="914099" rtl="0" eaLnBrk="0" fontAlgn="auto" latinLnBrk="0" hangingPunct="0">
-              <a:lnSpc>
-                <a:spcPct val="100000"/>
-              </a:lnSpc>
-              <a:spcBef>
-                <a:spcPts val="0"/>
-              </a:spcBef>
-              <a:spcAft>
-                <a:spcPts val="0"/>
-              </a:spcAft>
-              <a:buClrTx/>
-              <a:buSzTx/>
-              <a:buFontTx/>
-              <a:buNone/>
-              <a:tabLst/>
-              <a:defRPr/>
-            </a:pPr>
-            <a:r>
-              <a:rPr kumimoji="0" lang="en-US" sz="400" b="0" i="0" u="none" strike="noStrike" kern="1200" cap="none" spc="0" normalizeH="0" baseline="0" noProof="0" dirty="0">
-                <a:ln>
-                  <a:noFill/>
-                </a:ln>
-                <a:gradFill>
-                  <a:gsLst>
-                    <a:gs pos="0">
-                      <a:prstClr val="black"/>
-                    </a:gs>
-                    <a:gs pos="100000">
-                      <a:prstClr val="black"/>
-                    </a:gs>
-                  </a:gsLst>
-                  <a:lin ang="5400000" scaled="0"/>
-                </a:gradFill>
-                <a:effectLst/>
-                <a:uLnTx/>
-                <a:uFillTx/>
-                <a:latin typeface="Arial" panose="020B0604020202020204" pitchFamily="34" charset="0"/>
-                <a:ea typeface="Segoe UI" pitchFamily="34" charset="0"/>
-                <a:cs typeface="Arial" panose="020B0604020202020204" pitchFamily="34" charset="0"/>
-              </a:rPr>
-              <a:t>© Microsoft Corporation. All rights reserved. MICROSOFT MAKES NO WARRANTIES, EXPRESS, IMPLIED OR STATUTORY, AS TO THE INFORMATION IN THIS PRESENTATION.</a:t>
-            </a:r>
-          </a:p>
-        </p:txBody>
-      </p:sp>
-      <p:sp>
-        <p:nvSpPr>
-          <p:cNvPr id="6" name="Date Placeholder 5"/>
-          <p:cNvSpPr>
-            <a:spLocks noGrp="1"/>
-          </p:cNvSpPr>
-          <p:nvPr>
-            <p:ph type="dt" idx="12"/>
-          </p:nvPr>
-        </p:nvSpPr>
-        <p:spPr/>
-        <p:txBody>
-          <a:bodyPr/>
-          <a:lstStyle/>
-          <a:p>
-            <a:pPr marL="0" marR="0" lvl="0" indent="0" algn="r" defTabSz="932742" rtl="0" eaLnBrk="1" fontAlgn="auto" latinLnBrk="0" hangingPunct="1">
-              <a:lnSpc>
-                <a:spcPct val="100000"/>
-              </a:lnSpc>
-              <a:spcBef>
-                <a:spcPts val="0"/>
-              </a:spcBef>
-              <a:spcAft>
-                <a:spcPts val="0"/>
-              </a:spcAft>
-              <a:buClrTx/>
-              <a:buSzTx/>
-              <a:buFontTx/>
-              <a:buNone/>
-              <a:tabLst/>
-              <a:defRPr/>
-            </a:pPr>
-            <a:fld id="{D18B56EA-E28F-4F92-9F16-7A6F2501B303}" type="datetime8">
-              <a:rPr kumimoji="0" lang="en-US" sz="1200" b="0" i="0" u="none" strike="noStrike" kern="1200" cap="none" spc="0" normalizeH="0" baseline="0" noProof="0" smtClean="0">
-                <a:ln>
-                  <a:noFill/>
-                </a:ln>
-                <a:solidFill>
-                  <a:prstClr val="black"/>
-                </a:solidFill>
-                <a:effectLst/>
-                <a:uLnTx/>
-                <a:uFillTx/>
-                <a:latin typeface="Arial" panose="020B0604020202020204" pitchFamily="34" charset="0"/>
-                <a:ea typeface="+mn-ea"/>
-                <a:cs typeface="+mn-cs"/>
-              </a:rPr>
-              <a:pPr marL="0" marR="0" lvl="0" indent="0" algn="r" defTabSz="932742" rtl="0" eaLnBrk="1" fontAlgn="auto" latinLnBrk="0" hangingPunct="1">
-                <a:lnSpc>
-                  <a:spcPct val="100000"/>
-                </a:lnSpc>
-                <a:spcBef>
-                  <a:spcPts val="0"/>
-                </a:spcBef>
-                <a:spcAft>
-                  <a:spcPts val="0"/>
-                </a:spcAft>
-                <a:buClrTx/>
-                <a:buSzTx/>
-                <a:buFontTx/>
-                <a:buNone/>
-                <a:tabLst/>
-                <a:defRPr/>
-              </a:pPr>
-              <a:t>5/28/2019 1:49 PM</a:t>
+            <a:fld id="{DE955128-46DB-4B46-8D54-0B8BFA51CA0B}" type="slidenum">
+              <a:rPr lang="en-US" smtClean="0"/>
+              <a:pPr/>
+              <a:t>8</a:t>
             </a:fld>
-            <a:endParaRPr kumimoji="0" lang="en-US" sz="1200" b="0" i="0" u="none" strike="noStrike" kern="1200" cap="none" spc="0" normalizeH="0" baseline="0" noProof="0" dirty="0">
-              <a:ln>
-                <a:noFill/>
-              </a:ln>
-              <a:solidFill>
-                <a:prstClr val="black"/>
-              </a:solidFill>
-              <a:effectLst/>
-              <a:uLnTx/>
-              <a:uFillTx/>
-              <a:latin typeface="Arial" panose="020B0604020202020204" pitchFamily="34" charset="0"/>
-              <a:ea typeface="+mn-ea"/>
-              <a:cs typeface="+mn-cs"/>
-            </a:endParaRPr>
-          </a:p>
-        </p:txBody>
-      </p:sp>
-      <p:sp>
-        <p:nvSpPr>
-          <p:cNvPr id="7" name="Slide Number Placeholder 6"/>
-          <p:cNvSpPr>
-            <a:spLocks noGrp="1"/>
-          </p:cNvSpPr>
-          <p:nvPr>
-            <p:ph type="sldNum" sz="quarter" idx="13"/>
-          </p:nvPr>
-        </p:nvSpPr>
-        <p:spPr/>
-        <p:txBody>
-          <a:bodyPr/>
-          <a:lstStyle/>
-          <a:p>
-            <a:pPr marL="0" marR="0" lvl="0" indent="0" algn="r" defTabSz="932742" rtl="0" eaLnBrk="1" fontAlgn="auto" latinLnBrk="0" hangingPunct="1">
-              <a:lnSpc>
-                <a:spcPct val="100000"/>
-              </a:lnSpc>
-              <a:spcBef>
-                <a:spcPts val="0"/>
-              </a:spcBef>
-              <a:spcAft>
-                <a:spcPts val="0"/>
-              </a:spcAft>
-              <a:buClrTx/>
-              <a:buSzTx/>
-              <a:buFontTx/>
-              <a:buNone/>
-              <a:tabLst/>
-              <a:defRPr/>
-            </a:pPr>
-            <a:fld id="{B4008EB6-D09E-4580-8CD6-DDB14511944F}" type="slidenum">
-              <a:rPr kumimoji="0" lang="en-US" sz="1200" b="0" i="0" u="none" strike="noStrike" kern="1200" cap="none" spc="0" normalizeH="0" baseline="0" noProof="0" smtClean="0">
-                <a:ln>
-                  <a:noFill/>
-                </a:ln>
-                <a:solidFill>
-                  <a:prstClr val="black"/>
-                </a:solidFill>
-                <a:effectLst/>
-                <a:uLnTx/>
-                <a:uFillTx/>
-                <a:latin typeface="Arial" panose="020B0604020202020204" pitchFamily="34" charset="0"/>
-                <a:ea typeface="+mn-ea"/>
-                <a:cs typeface="+mn-cs"/>
-              </a:rPr>
-              <a:pPr marL="0" marR="0" lvl="0" indent="0" algn="r" defTabSz="932742" rtl="0" eaLnBrk="1" fontAlgn="auto" latinLnBrk="0" hangingPunct="1">
-                <a:lnSpc>
-                  <a:spcPct val="100000"/>
-                </a:lnSpc>
-                <a:spcBef>
-                  <a:spcPts val="0"/>
-                </a:spcBef>
-                <a:spcAft>
-                  <a:spcPts val="0"/>
-                </a:spcAft>
-                <a:buClrTx/>
-                <a:buSzTx/>
-                <a:buFontTx/>
-                <a:buNone/>
-                <a:tabLst/>
-                <a:defRPr/>
-              </a:pPr>
-              <a:t>3</a:t>
-            </a:fld>
-            <a:endParaRPr kumimoji="0" lang="en-US" sz="1200" b="0" i="0" u="none" strike="noStrike" kern="1200" cap="none" spc="0" normalizeH="0" baseline="0" noProof="0" dirty="0">
-              <a:ln>
-                <a:noFill/>
-              </a:ln>
-              <a:solidFill>
-                <a:prstClr val="black"/>
-              </a:solidFill>
-              <a:effectLst/>
-              <a:uLnTx/>
-              <a:uFillTx/>
-              <a:latin typeface="Arial" panose="020B0604020202020204" pitchFamily="34" charset="0"/>
-              <a:ea typeface="+mn-ea"/>
-              <a:cs typeface="+mn-cs"/>
-            </a:endParaRPr>
+            <a:endParaRPr lang="en-US" dirty="0"/>
           </a:p>
         </p:txBody>
       </p:sp>
     </p:spTree>
     <p:extLst>
       <p:ext uri="{BB962C8B-B14F-4D97-AF65-F5344CB8AC3E}">
-        <p14:creationId xmlns:p14="http://schemas.microsoft.com/office/powerpoint/2010/main" val="2861079598"/>
+        <p14:creationId xmlns:p14="http://schemas.microsoft.com/office/powerpoint/2010/main" val="1044270959"/>
       </p:ext>
     </p:extLst>
   </p:cSld>
@@ -1113,18 +871,24 @@
           <a:bodyPr/>
           <a:lstStyle/>
           <a:p>
-            <a:endParaRPr lang="en-US"/>
+            <a:r>
+              <a:rPr lang="en-US" dirty="0"/>
+              <a:t>Demo available here: https://github.com/Azure-Samples/cosmosdb-materialized-views.</a:t>
+            </a:r>
+          </a:p>
+          <a:p>
+            <a:endParaRPr lang="en-US" dirty="0"/>
           </a:p>
         </p:txBody>
       </p:sp>
       <p:sp>
         <p:nvSpPr>
-          <p:cNvPr id="4" name="Header Placeholder 3"/>
+          <p:cNvPr id="4" name="Slide Number Placeholder 3"/>
           <p:cNvSpPr>
             <a:spLocks noGrp="1"/>
           </p:cNvSpPr>
           <p:nvPr>
-            <p:ph type="hdr" sz="quarter" idx="10"/>
+            <p:ph type="sldNum" sz="quarter" idx="5"/>
           </p:nvPr>
         </p:nvSpPr>
         <p:spPr/>
@@ -1132,270 +896,18 @@
           <a:bodyPr/>
           <a:lstStyle/>
           <a:p>
-            <a:pPr marL="0" marR="0" lvl="0" indent="0" algn="l" defTabSz="932742" rtl="0" eaLnBrk="1" fontAlgn="auto" latinLnBrk="0" hangingPunct="1">
-              <a:lnSpc>
-                <a:spcPct val="100000"/>
-              </a:lnSpc>
-              <a:spcBef>
-                <a:spcPts val="0"/>
-              </a:spcBef>
-              <a:spcAft>
-                <a:spcPts val="0"/>
-              </a:spcAft>
-              <a:buClrTx/>
-              <a:buSzTx/>
-              <a:buFontTx/>
-              <a:buNone/>
-              <a:tabLst/>
-              <a:defRPr/>
-            </a:pPr>
-            <a:endParaRPr kumimoji="0" lang="en-US" sz="1200" b="0" i="0" u="none" strike="noStrike" kern="1200" cap="none" spc="0" normalizeH="0" baseline="0" noProof="0" dirty="0">
-              <a:ln>
-                <a:noFill/>
-              </a:ln>
-              <a:solidFill>
-                <a:prstClr val="black"/>
-              </a:solidFill>
-              <a:effectLst/>
-              <a:uLnTx/>
-              <a:uFillTx/>
-              <a:latin typeface="Arial" panose="020B0604020202020204" pitchFamily="34" charset="0"/>
-              <a:ea typeface="+mn-ea"/>
-              <a:cs typeface="+mn-cs"/>
-            </a:endParaRPr>
-          </a:p>
-        </p:txBody>
-      </p:sp>
-      <p:sp>
-        <p:nvSpPr>
-          <p:cNvPr id="5" name="Footer Placeholder 4"/>
-          <p:cNvSpPr>
-            <a:spLocks noGrp="1"/>
-          </p:cNvSpPr>
-          <p:nvPr>
-            <p:ph type="ftr" sz="quarter" idx="11"/>
-          </p:nvPr>
-        </p:nvSpPr>
-        <p:spPr/>
-        <p:txBody>
-          <a:bodyPr/>
-          <a:lstStyle/>
-          <a:p>
-            <a:pPr marL="571500" marR="0" lvl="0" indent="0" algn="l" defTabSz="914099" rtl="0" eaLnBrk="0" fontAlgn="auto" latinLnBrk="0" hangingPunct="0">
-              <a:lnSpc>
-                <a:spcPct val="100000"/>
-              </a:lnSpc>
-              <a:spcBef>
-                <a:spcPts val="0"/>
-              </a:spcBef>
-              <a:spcAft>
-                <a:spcPts val="0"/>
-              </a:spcAft>
-              <a:buClrTx/>
-              <a:buSzTx/>
-              <a:buFontTx/>
-              <a:buNone/>
-              <a:tabLst/>
-              <a:defRPr/>
-            </a:pPr>
-            <a:r>
-              <a:rPr kumimoji="0" lang="en-US" sz="400" b="0" i="0" u="none" strike="noStrike" kern="1200" cap="none" spc="0" normalizeH="0" baseline="0" noProof="0" dirty="0">
-                <a:ln>
-                  <a:noFill/>
-                </a:ln>
-                <a:gradFill>
-                  <a:gsLst>
-                    <a:gs pos="0">
-                      <a:prstClr val="black"/>
-                    </a:gs>
-                    <a:gs pos="100000">
-                      <a:prstClr val="black"/>
-                    </a:gs>
-                  </a:gsLst>
-                  <a:lin ang="5400000" scaled="0"/>
-                </a:gradFill>
-                <a:effectLst/>
-                <a:uLnTx/>
-                <a:uFillTx/>
-                <a:latin typeface="Arial" panose="020B0604020202020204" pitchFamily="34" charset="0"/>
-                <a:ea typeface="Segoe UI" pitchFamily="34" charset="0"/>
-                <a:cs typeface="Arial" panose="020B0604020202020204" pitchFamily="34" charset="0"/>
-              </a:rPr>
-              <a:t>© Microsoft Corporation. All rights reserved. MICROSOFT MAKES NO WARRANTIES, EXPRESS, IMPLIED OR STATUTORY, AS TO THE INFORMATION IN THIS PRESENTATION.</a:t>
-            </a:r>
-          </a:p>
-        </p:txBody>
-      </p:sp>
-      <p:sp>
-        <p:nvSpPr>
-          <p:cNvPr id="6" name="Date Placeholder 5"/>
-          <p:cNvSpPr>
-            <a:spLocks noGrp="1"/>
-          </p:cNvSpPr>
-          <p:nvPr>
-            <p:ph type="dt" idx="12"/>
-          </p:nvPr>
-        </p:nvSpPr>
-        <p:spPr/>
-        <p:txBody>
-          <a:bodyPr/>
-          <a:lstStyle/>
-          <a:p>
-            <a:pPr marL="0" marR="0" lvl="0" indent="0" algn="r" defTabSz="932742" rtl="0" eaLnBrk="1" fontAlgn="auto" latinLnBrk="0" hangingPunct="1">
-              <a:lnSpc>
-                <a:spcPct val="100000"/>
-              </a:lnSpc>
-              <a:spcBef>
-                <a:spcPts val="0"/>
-              </a:spcBef>
-              <a:spcAft>
-                <a:spcPts val="0"/>
-              </a:spcAft>
-              <a:buClrTx/>
-              <a:buSzTx/>
-              <a:buFontTx/>
-              <a:buNone/>
-              <a:tabLst/>
-              <a:defRPr/>
-            </a:pPr>
-            <a:fld id="{D18B56EA-E28F-4F92-9F16-7A6F2501B303}" type="datetime8">
-              <a:rPr kumimoji="0" lang="en-US" sz="1200" b="0" i="0" u="none" strike="noStrike" kern="1200" cap="none" spc="0" normalizeH="0" baseline="0" noProof="0" smtClean="0">
-                <a:ln>
-                  <a:noFill/>
-                </a:ln>
-                <a:solidFill>
-                  <a:prstClr val="black"/>
-                </a:solidFill>
-                <a:effectLst/>
-                <a:uLnTx/>
-                <a:uFillTx/>
-                <a:latin typeface="Arial" panose="020B0604020202020204" pitchFamily="34" charset="0"/>
-                <a:ea typeface="+mn-ea"/>
-                <a:cs typeface="+mn-cs"/>
-              </a:rPr>
-              <a:pPr marL="0" marR="0" lvl="0" indent="0" algn="r" defTabSz="932742" rtl="0" eaLnBrk="1" fontAlgn="auto" latinLnBrk="0" hangingPunct="1">
-                <a:lnSpc>
-                  <a:spcPct val="100000"/>
-                </a:lnSpc>
-                <a:spcBef>
-                  <a:spcPts val="0"/>
-                </a:spcBef>
-                <a:spcAft>
-                  <a:spcPts val="0"/>
-                </a:spcAft>
-                <a:buClrTx/>
-                <a:buSzTx/>
-                <a:buFontTx/>
-                <a:buNone/>
-                <a:tabLst/>
-                <a:defRPr/>
-              </a:pPr>
-              <a:t>5/28/2019 1:49 PM</a:t>
+            <a:fld id="{DE955128-46DB-4B46-8D54-0B8BFA51CA0B}" type="slidenum">
+              <a:rPr lang="en-US" smtClean="0"/>
+              <a:t>9</a:t>
             </a:fld>
-            <a:endParaRPr kumimoji="0" lang="en-US" sz="1200" b="0" i="0" u="none" strike="noStrike" kern="1200" cap="none" spc="0" normalizeH="0" baseline="0" noProof="0" dirty="0">
-              <a:ln>
-                <a:noFill/>
-              </a:ln>
-              <a:solidFill>
-                <a:prstClr val="black"/>
-              </a:solidFill>
-              <a:effectLst/>
-              <a:uLnTx/>
-              <a:uFillTx/>
-              <a:latin typeface="Arial" panose="020B0604020202020204" pitchFamily="34" charset="0"/>
-              <a:ea typeface="+mn-ea"/>
-              <a:cs typeface="+mn-cs"/>
-            </a:endParaRPr>
-          </a:p>
-        </p:txBody>
-      </p:sp>
-      <p:sp>
-        <p:nvSpPr>
-          <p:cNvPr id="7" name="Slide Number Placeholder 6"/>
-          <p:cNvSpPr>
-            <a:spLocks noGrp="1"/>
-          </p:cNvSpPr>
-          <p:nvPr>
-            <p:ph type="sldNum" sz="quarter" idx="13"/>
-          </p:nvPr>
-        </p:nvSpPr>
-        <p:spPr/>
-        <p:txBody>
-          <a:bodyPr/>
-          <a:lstStyle/>
-          <a:p>
-            <a:pPr marL="0" marR="0" lvl="0" indent="0" algn="r" defTabSz="932742" rtl="0" eaLnBrk="1" fontAlgn="auto" latinLnBrk="0" hangingPunct="1">
-              <a:lnSpc>
-                <a:spcPct val="100000"/>
-              </a:lnSpc>
-              <a:spcBef>
-                <a:spcPts val="0"/>
-              </a:spcBef>
-              <a:spcAft>
-                <a:spcPts val="0"/>
-              </a:spcAft>
-              <a:buClrTx/>
-              <a:buSzTx/>
-              <a:buFontTx/>
-              <a:buNone/>
-              <a:tabLst/>
-              <a:defRPr/>
-            </a:pPr>
-            <a:fld id="{B4008EB6-D09E-4580-8CD6-DDB14511944F}" type="slidenum">
-              <a:rPr kumimoji="0" lang="en-US" sz="1200" b="0" i="0" u="none" strike="noStrike" kern="1200" cap="none" spc="0" normalizeH="0" baseline="0" noProof="0" smtClean="0">
-                <a:ln>
-                  <a:noFill/>
-                </a:ln>
-                <a:solidFill>
-                  <a:prstClr val="black"/>
-                </a:solidFill>
-                <a:effectLst/>
-                <a:uLnTx/>
-                <a:uFillTx/>
-                <a:latin typeface="Arial" panose="020B0604020202020204" pitchFamily="34" charset="0"/>
-                <a:ea typeface="+mn-ea"/>
-                <a:cs typeface="+mn-cs"/>
-              </a:rPr>
-              <a:pPr marL="0" marR="0" lvl="0" indent="0" algn="r" defTabSz="932742" rtl="0" eaLnBrk="1" fontAlgn="auto" latinLnBrk="0" hangingPunct="1">
-                <a:lnSpc>
-                  <a:spcPct val="100000"/>
-                </a:lnSpc>
-                <a:spcBef>
-                  <a:spcPts val="0"/>
-                </a:spcBef>
-                <a:spcAft>
-                  <a:spcPts val="0"/>
-                </a:spcAft>
-                <a:buClrTx/>
-                <a:buSzTx/>
-                <a:buFontTx/>
-                <a:buNone/>
-                <a:tabLst/>
-                <a:defRPr/>
-              </a:pPr>
-              <a:t>10</a:t>
-            </a:fld>
-            <a:endParaRPr kumimoji="0" lang="en-US" sz="1200" b="0" i="0" u="none" strike="noStrike" kern="1200" cap="none" spc="0" normalizeH="0" baseline="0" noProof="0" dirty="0">
-              <a:ln>
-                <a:noFill/>
-              </a:ln>
-              <a:solidFill>
-                <a:prstClr val="black"/>
-              </a:solidFill>
-              <a:effectLst/>
-              <a:uLnTx/>
-              <a:uFillTx/>
-              <a:latin typeface="Arial" panose="020B0604020202020204" pitchFamily="34" charset="0"/>
-              <a:ea typeface="+mn-ea"/>
-              <a:cs typeface="+mn-cs"/>
-            </a:endParaRPr>
+            <a:endParaRPr lang="en-US"/>
           </a:p>
         </p:txBody>
       </p:sp>
     </p:spTree>
     <p:extLst>
       <p:ext uri="{BB962C8B-B14F-4D97-AF65-F5344CB8AC3E}">
-        <p14:creationId xmlns:p14="http://schemas.microsoft.com/office/powerpoint/2010/main" val="664748531"/>
+        <p14:creationId xmlns:p14="http://schemas.microsoft.com/office/powerpoint/2010/main" val="3727204014"/>
       </p:ext>
     </p:extLst>
   </p:cSld>
@@ -1455,12 +967,12 @@
       </p:sp>
       <p:sp>
         <p:nvSpPr>
-          <p:cNvPr id="4" name="Slide Number Placeholder 3"/>
+          <p:cNvPr id="4" name="Header Placeholder 3"/>
           <p:cNvSpPr>
             <a:spLocks noGrp="1"/>
           </p:cNvSpPr>
           <p:nvPr>
-            <p:ph type="sldNum" sz="quarter" idx="10"/>
+            <p:ph type="hdr" sz="quarter" idx="10"/>
           </p:nvPr>
         </p:nvSpPr>
         <p:spPr/>
@@ -1468,18 +980,270 @@
           <a:bodyPr/>
           <a:lstStyle/>
           <a:p>
-            <a:fld id="{4249A09B-4A39-974B-9594-129A7470D52A}" type="slidenum">
-              <a:rPr lang="en-US" smtClean="0"/>
-              <a:t>11</a:t>
+            <a:pPr marL="0" marR="0" lvl="0" indent="0" algn="l" defTabSz="932742" rtl="0" eaLnBrk="1" fontAlgn="auto" latinLnBrk="0" hangingPunct="1">
+              <a:lnSpc>
+                <a:spcPct val="100000"/>
+              </a:lnSpc>
+              <a:spcBef>
+                <a:spcPts val="0"/>
+              </a:spcBef>
+              <a:spcAft>
+                <a:spcPts val="0"/>
+              </a:spcAft>
+              <a:buClrTx/>
+              <a:buSzTx/>
+              <a:buFontTx/>
+              <a:buNone/>
+              <a:tabLst/>
+              <a:defRPr/>
+            </a:pPr>
+            <a:endParaRPr kumimoji="0" lang="en-US" sz="1200" b="0" i="0" u="none" strike="noStrike" kern="1200" cap="none" spc="0" normalizeH="0" baseline="0" noProof="0" dirty="0">
+              <a:ln>
+                <a:noFill/>
+              </a:ln>
+              <a:solidFill>
+                <a:prstClr val="black"/>
+              </a:solidFill>
+              <a:effectLst/>
+              <a:uLnTx/>
+              <a:uFillTx/>
+              <a:latin typeface="Arial" panose="020B0604020202020204" pitchFamily="34" charset="0"/>
+              <a:ea typeface="+mn-ea"/>
+              <a:cs typeface="+mn-cs"/>
+            </a:endParaRPr>
+          </a:p>
+        </p:txBody>
+      </p:sp>
+      <p:sp>
+        <p:nvSpPr>
+          <p:cNvPr id="5" name="Footer Placeholder 4"/>
+          <p:cNvSpPr>
+            <a:spLocks noGrp="1"/>
+          </p:cNvSpPr>
+          <p:nvPr>
+            <p:ph type="ftr" sz="quarter" idx="11"/>
+          </p:nvPr>
+        </p:nvSpPr>
+        <p:spPr/>
+        <p:txBody>
+          <a:bodyPr/>
+          <a:lstStyle/>
+          <a:p>
+            <a:pPr marL="571500" marR="0" lvl="0" indent="0" algn="l" defTabSz="914099" rtl="0" eaLnBrk="0" fontAlgn="auto" latinLnBrk="0" hangingPunct="0">
+              <a:lnSpc>
+                <a:spcPct val="100000"/>
+              </a:lnSpc>
+              <a:spcBef>
+                <a:spcPts val="0"/>
+              </a:spcBef>
+              <a:spcAft>
+                <a:spcPts val="0"/>
+              </a:spcAft>
+              <a:buClrTx/>
+              <a:buSzTx/>
+              <a:buFontTx/>
+              <a:buNone/>
+              <a:tabLst/>
+              <a:defRPr/>
+            </a:pPr>
+            <a:r>
+              <a:rPr kumimoji="0" lang="en-US" sz="400" b="0" i="0" u="none" strike="noStrike" kern="1200" cap="none" spc="0" normalizeH="0" baseline="0" noProof="0" dirty="0">
+                <a:ln>
+                  <a:noFill/>
+                </a:ln>
+                <a:gradFill>
+                  <a:gsLst>
+                    <a:gs pos="0">
+                      <a:prstClr val="black"/>
+                    </a:gs>
+                    <a:gs pos="100000">
+                      <a:prstClr val="black"/>
+                    </a:gs>
+                  </a:gsLst>
+                  <a:lin ang="5400000" scaled="0"/>
+                </a:gradFill>
+                <a:effectLst/>
+                <a:uLnTx/>
+                <a:uFillTx/>
+                <a:latin typeface="Arial" panose="020B0604020202020204" pitchFamily="34" charset="0"/>
+                <a:ea typeface="Segoe UI" pitchFamily="34" charset="0"/>
+                <a:cs typeface="Arial" panose="020B0604020202020204" pitchFamily="34" charset="0"/>
+              </a:rPr>
+              <a:t>© Microsoft Corporation. All rights reserved. MICROSOFT MAKES NO WARRANTIES, EXPRESS, IMPLIED OR STATUTORY, AS TO THE INFORMATION IN THIS PRESENTATION.</a:t>
+            </a:r>
+          </a:p>
+        </p:txBody>
+      </p:sp>
+      <p:sp>
+        <p:nvSpPr>
+          <p:cNvPr id="6" name="Date Placeholder 5"/>
+          <p:cNvSpPr>
+            <a:spLocks noGrp="1"/>
+          </p:cNvSpPr>
+          <p:nvPr>
+            <p:ph type="dt" idx="12"/>
+          </p:nvPr>
+        </p:nvSpPr>
+        <p:spPr/>
+        <p:txBody>
+          <a:bodyPr/>
+          <a:lstStyle/>
+          <a:p>
+            <a:pPr marL="0" marR="0" lvl="0" indent="0" algn="r" defTabSz="932742" rtl="0" eaLnBrk="1" fontAlgn="auto" latinLnBrk="0" hangingPunct="1">
+              <a:lnSpc>
+                <a:spcPct val="100000"/>
+              </a:lnSpc>
+              <a:spcBef>
+                <a:spcPts val="0"/>
+              </a:spcBef>
+              <a:spcAft>
+                <a:spcPts val="0"/>
+              </a:spcAft>
+              <a:buClrTx/>
+              <a:buSzTx/>
+              <a:buFontTx/>
+              <a:buNone/>
+              <a:tabLst/>
+              <a:defRPr/>
+            </a:pPr>
+            <a:fld id="{D18B56EA-E28F-4F92-9F16-7A6F2501B303}" type="datetime8">
+              <a:rPr kumimoji="0" lang="en-US" sz="1200" b="0" i="0" u="none" strike="noStrike" kern="1200" cap="none" spc="0" normalizeH="0" baseline="0" noProof="0" smtClean="0">
+                <a:ln>
+                  <a:noFill/>
+                </a:ln>
+                <a:solidFill>
+                  <a:prstClr val="black"/>
+                </a:solidFill>
+                <a:effectLst/>
+                <a:uLnTx/>
+                <a:uFillTx/>
+                <a:latin typeface="Arial" panose="020B0604020202020204" pitchFamily="34" charset="0"/>
+                <a:ea typeface="+mn-ea"/>
+                <a:cs typeface="+mn-cs"/>
+              </a:rPr>
+              <a:pPr marL="0" marR="0" lvl="0" indent="0" algn="r" defTabSz="932742" rtl="0" eaLnBrk="1" fontAlgn="auto" latinLnBrk="0" hangingPunct="1">
+                <a:lnSpc>
+                  <a:spcPct val="100000"/>
+                </a:lnSpc>
+                <a:spcBef>
+                  <a:spcPts val="0"/>
+                </a:spcBef>
+                <a:spcAft>
+                  <a:spcPts val="0"/>
+                </a:spcAft>
+                <a:buClrTx/>
+                <a:buSzTx/>
+                <a:buFontTx/>
+                <a:buNone/>
+                <a:tabLst/>
+                <a:defRPr/>
+              </a:pPr>
+              <a:t>6/24/2019 2:28 PM</a:t>
             </a:fld>
-            <a:endParaRPr lang="en-US"/>
+            <a:endParaRPr kumimoji="0" lang="en-US" sz="1200" b="0" i="0" u="none" strike="noStrike" kern="1200" cap="none" spc="0" normalizeH="0" baseline="0" noProof="0" dirty="0">
+              <a:ln>
+                <a:noFill/>
+              </a:ln>
+              <a:solidFill>
+                <a:prstClr val="black"/>
+              </a:solidFill>
+              <a:effectLst/>
+              <a:uLnTx/>
+              <a:uFillTx/>
+              <a:latin typeface="Arial" panose="020B0604020202020204" pitchFamily="34" charset="0"/>
+              <a:ea typeface="+mn-ea"/>
+              <a:cs typeface="+mn-cs"/>
+            </a:endParaRPr>
+          </a:p>
+        </p:txBody>
+      </p:sp>
+      <p:sp>
+        <p:nvSpPr>
+          <p:cNvPr id="7" name="Slide Number Placeholder 6"/>
+          <p:cNvSpPr>
+            <a:spLocks noGrp="1"/>
+          </p:cNvSpPr>
+          <p:nvPr>
+            <p:ph type="sldNum" sz="quarter" idx="13"/>
+          </p:nvPr>
+        </p:nvSpPr>
+        <p:spPr/>
+        <p:txBody>
+          <a:bodyPr/>
+          <a:lstStyle/>
+          <a:p>
+            <a:pPr marL="0" marR="0" lvl="0" indent="0" algn="r" defTabSz="932742" rtl="0" eaLnBrk="1" fontAlgn="auto" latinLnBrk="0" hangingPunct="1">
+              <a:lnSpc>
+                <a:spcPct val="100000"/>
+              </a:lnSpc>
+              <a:spcBef>
+                <a:spcPts val="0"/>
+              </a:spcBef>
+              <a:spcAft>
+                <a:spcPts val="0"/>
+              </a:spcAft>
+              <a:buClrTx/>
+              <a:buSzTx/>
+              <a:buFontTx/>
+              <a:buNone/>
+              <a:tabLst/>
+              <a:defRPr/>
+            </a:pPr>
+            <a:fld id="{B4008EB6-D09E-4580-8CD6-DDB14511944F}" type="slidenum">
+              <a:rPr kumimoji="0" lang="en-US" sz="1200" b="0" i="0" u="none" strike="noStrike" kern="1200" cap="none" spc="0" normalizeH="0" baseline="0" noProof="0" smtClean="0">
+                <a:ln>
+                  <a:noFill/>
+                </a:ln>
+                <a:solidFill>
+                  <a:prstClr val="black"/>
+                </a:solidFill>
+                <a:effectLst/>
+                <a:uLnTx/>
+                <a:uFillTx/>
+                <a:latin typeface="Arial" panose="020B0604020202020204" pitchFamily="34" charset="0"/>
+                <a:ea typeface="+mn-ea"/>
+                <a:cs typeface="+mn-cs"/>
+              </a:rPr>
+              <a:pPr marL="0" marR="0" lvl="0" indent="0" algn="r" defTabSz="932742" rtl="0" eaLnBrk="1" fontAlgn="auto" latinLnBrk="0" hangingPunct="1">
+                <a:lnSpc>
+                  <a:spcPct val="100000"/>
+                </a:lnSpc>
+                <a:spcBef>
+                  <a:spcPts val="0"/>
+                </a:spcBef>
+                <a:spcAft>
+                  <a:spcPts val="0"/>
+                </a:spcAft>
+                <a:buClrTx/>
+                <a:buSzTx/>
+                <a:buFontTx/>
+                <a:buNone/>
+                <a:tabLst/>
+                <a:defRPr/>
+              </a:pPr>
+              <a:t>13</a:t>
+            </a:fld>
+            <a:endParaRPr kumimoji="0" lang="en-US" sz="1200" b="0" i="0" u="none" strike="noStrike" kern="1200" cap="none" spc="0" normalizeH="0" baseline="0" noProof="0" dirty="0">
+              <a:ln>
+                <a:noFill/>
+              </a:ln>
+              <a:solidFill>
+                <a:prstClr val="black"/>
+              </a:solidFill>
+              <a:effectLst/>
+              <a:uLnTx/>
+              <a:uFillTx/>
+              <a:latin typeface="Arial" panose="020B0604020202020204" pitchFamily="34" charset="0"/>
+              <a:ea typeface="+mn-ea"/>
+              <a:cs typeface="+mn-cs"/>
+            </a:endParaRPr>
           </a:p>
         </p:txBody>
       </p:sp>
     </p:spTree>
     <p:extLst>
       <p:ext uri="{BB962C8B-B14F-4D97-AF65-F5344CB8AC3E}">
-        <p14:creationId xmlns:p14="http://schemas.microsoft.com/office/powerpoint/2010/main" val="1577792886"/>
+        <p14:creationId xmlns:p14="http://schemas.microsoft.com/office/powerpoint/2010/main" val="664748531"/>
       </p:ext>
     </p:extLst>
   </p:cSld>
@@ -1554,7 +1318,7 @@
           <a:p>
             <a:fld id="{4249A09B-4A39-974B-9594-129A7470D52A}" type="slidenum">
               <a:rPr lang="en-US" smtClean="0"/>
-              <a:t>12</a:t>
+              <a:t>14</a:t>
             </a:fld>
             <a:endParaRPr lang="en-US"/>
           </a:p>
@@ -1563,7 +1327,7 @@
     </p:spTree>
     <p:extLst>
       <p:ext uri="{BB962C8B-B14F-4D97-AF65-F5344CB8AC3E}">
-        <p14:creationId xmlns:p14="http://schemas.microsoft.com/office/powerpoint/2010/main" val="3022834070"/>
+        <p14:creationId xmlns:p14="http://schemas.microsoft.com/office/powerpoint/2010/main" val="1577792886"/>
       </p:ext>
     </p:extLst>
   </p:cSld>
@@ -1638,7 +1402,91 @@
           <a:p>
             <a:fld id="{4249A09B-4A39-974B-9594-129A7470D52A}" type="slidenum">
               <a:rPr lang="en-US" smtClean="0"/>
-              <a:t>13</a:t>
+              <a:t>15</a:t>
+            </a:fld>
+            <a:endParaRPr lang="en-US"/>
+          </a:p>
+        </p:txBody>
+      </p:sp>
+    </p:spTree>
+    <p:extLst>
+      <p:ext uri="{BB962C8B-B14F-4D97-AF65-F5344CB8AC3E}">
+        <p14:creationId xmlns:p14="http://schemas.microsoft.com/office/powerpoint/2010/main" val="3022834070"/>
+      </p:ext>
+    </p:extLst>
+  </p:cSld>
+  <p:clrMapOvr>
+    <a:masterClrMapping/>
+  </p:clrMapOvr>
+</p:notes>
+</file>
+
+<file path=ppt/notesSlides/notesSlide6.xml><?xml version="1.0" encoding="utf-8"?>
+<p:notes xmlns:a="http://schemas.openxmlformats.org/drawingml/2006/main" xmlns:r="http://schemas.openxmlformats.org/officeDocument/2006/relationships" xmlns:p="http://schemas.openxmlformats.org/presentationml/2006/main">
+  <p:cSld>
+    <p:spTree>
+      <p:nvGrpSpPr>
+        <p:cNvPr id="1" name=""/>
+        <p:cNvGrpSpPr/>
+        <p:nvPr/>
+      </p:nvGrpSpPr>
+      <p:grpSpPr>
+        <a:xfrm>
+          <a:off x="0" y="0"/>
+          <a:ext cx="0" cy="0"/>
+          <a:chOff x="0" y="0"/>
+          <a:chExt cx="0" cy="0"/>
+        </a:xfrm>
+      </p:grpSpPr>
+      <p:sp>
+        <p:nvSpPr>
+          <p:cNvPr id="2" name="Slide Image Placeholder 1"/>
+          <p:cNvSpPr>
+            <a:spLocks noGrp="1" noRot="1" noChangeAspect="1"/>
+          </p:cNvSpPr>
+          <p:nvPr>
+            <p:ph type="sldImg"/>
+          </p:nvPr>
+        </p:nvSpPr>
+        <p:spPr/>
+      </p:sp>
+      <p:sp>
+        <p:nvSpPr>
+          <p:cNvPr id="3" name="Notes Placeholder 2"/>
+          <p:cNvSpPr>
+            <a:spLocks noGrp="1"/>
+          </p:cNvSpPr>
+          <p:nvPr>
+            <p:ph type="body" idx="1"/>
+          </p:nvPr>
+        </p:nvSpPr>
+        <p:spPr/>
+        <p:txBody>
+          <a:bodyPr/>
+          <a:lstStyle/>
+          <a:p>
+            <a:endParaRPr lang="en-US"/>
+          </a:p>
+        </p:txBody>
+      </p:sp>
+      <p:sp>
+        <p:nvSpPr>
+          <p:cNvPr id="4" name="Slide Number Placeholder 3"/>
+          <p:cNvSpPr>
+            <a:spLocks noGrp="1"/>
+          </p:cNvSpPr>
+          <p:nvPr>
+            <p:ph type="sldNum" sz="quarter" idx="10"/>
+          </p:nvPr>
+        </p:nvSpPr>
+        <p:spPr/>
+        <p:txBody>
+          <a:bodyPr/>
+          <a:lstStyle/>
+          <a:p>
+            <a:fld id="{4249A09B-4A39-974B-9594-129A7470D52A}" type="slidenum">
+              <a:rPr lang="en-US" smtClean="0"/>
+              <a:t>16</a:t>
             </a:fld>
             <a:endParaRPr lang="en-US"/>
           </a:p>
@@ -1788,7 +1636,7 @@
           <a:p>
             <a:fld id="{D01120C9-890A-4013-ADCB-1DF4AE2150B6}" type="datetimeFigureOut">
               <a:rPr lang="en-US" smtClean="0"/>
-              <a:t>5/28/2019</a:t>
+              <a:t>6/24/2019</a:t>
             </a:fld>
             <a:endParaRPr lang="en-US"/>
           </a:p>
@@ -1963,7 +1811,7 @@
           <a:p>
             <a:fld id="{C764DE79-268F-4C1A-8933-263129D2AF90}" type="datetimeFigureOut">
               <a:rPr lang="en-US" smtClean="0"/>
-              <a:t>5/28/2019</a:t>
+              <a:t>6/24/2019</a:t>
             </a:fld>
             <a:endParaRPr lang="en-US" dirty="0"/>
           </a:p>
@@ -2143,7 +1991,7 @@
           <a:p>
             <a:fld id="{C764DE79-268F-4C1A-8933-263129D2AF90}" type="datetimeFigureOut">
               <a:rPr lang="en-US" smtClean="0"/>
-              <a:t>5/28/2019</a:t>
+              <a:t>6/24/2019</a:t>
             </a:fld>
             <a:endParaRPr lang="en-US" dirty="0"/>
           </a:p>
@@ -2856,6 +2704,153 @@
 </p:sldLayout>
 </file>
 
+<file path=ppt/slideLayouts/slideLayout16.xml><?xml version="1.0" encoding="utf-8"?>
+<p:sldLayout xmlns:a="http://schemas.openxmlformats.org/drawingml/2006/main" xmlns:r="http://schemas.openxmlformats.org/officeDocument/2006/relationships" xmlns:p="http://schemas.openxmlformats.org/presentationml/2006/main" userDrawn="1">
+  <p:cSld name="Demo slide">
+    <p:bg>
+      <p:bgRef idx="1001">
+        <a:schemeClr val="bg2"/>
+      </p:bgRef>
+    </p:bg>
+    <p:spTree>
+      <p:nvGrpSpPr>
+        <p:cNvPr id="1" name=""/>
+        <p:cNvGrpSpPr/>
+        <p:nvPr/>
+      </p:nvGrpSpPr>
+      <p:grpSpPr>
+        <a:xfrm>
+          <a:off x="0" y="0"/>
+          <a:ext cx="0" cy="0"/>
+          <a:chOff x="0" y="0"/>
+          <a:chExt cx="0" cy="0"/>
+        </a:xfrm>
+      </p:grpSpPr>
+      <p:sp>
+        <p:nvSpPr>
+          <p:cNvPr id="7" name="Title 1">
+            <a:extLst>
+              <a:ext uri="{FF2B5EF4-FFF2-40B4-BE49-F238E27FC236}">
+                <a16:creationId xmlns:a16="http://schemas.microsoft.com/office/drawing/2014/main" id="{D6404DEB-A2FD-47E2-863C-BC52EB636058}"/>
+              </a:ext>
+            </a:extLst>
+          </p:cNvPr>
+          <p:cNvSpPr>
+            <a:spLocks noGrp="1"/>
+          </p:cNvSpPr>
+          <p:nvPr>
+            <p:ph type="title" hasCustomPrompt="1"/>
+          </p:nvPr>
+        </p:nvSpPr>
+        <p:spPr>
+          <a:xfrm>
+            <a:off x="1166442" y="3084533"/>
+            <a:ext cx="9859116" cy="738664"/>
+          </a:xfrm>
+          <a:noFill/>
+        </p:spPr>
+        <p:txBody>
+          <a:bodyPr tIns="91440" bIns="91440" anchor="t" anchorCtr="0">
+            <a:spAutoFit/>
+          </a:bodyPr>
+          <a:lstStyle>
+            <a:lvl1pPr algn="ctr">
+              <a:defRPr lang="en-US" sz="4000" b="0" kern="1200" cap="none" spc="-98" baseline="0" dirty="0">
+                <a:ln w="3175">
+                  <a:noFill/>
+                </a:ln>
+                <a:gradFill>
+                  <a:gsLst>
+                    <a:gs pos="0">
+                      <a:schemeClr val="tx1"/>
+                    </a:gs>
+                    <a:gs pos="100000">
+                      <a:schemeClr val="tx1"/>
+                    </a:gs>
+                  </a:gsLst>
+                  <a:lin ang="5400000" scaled="0"/>
+                </a:gradFill>
+                <a:effectLst/>
+                <a:latin typeface="+mj-lt"/>
+                <a:ea typeface="+mn-ea"/>
+                <a:cs typeface="Arial" panose="020B0604020202020204" pitchFamily="34" charset="0"/>
+              </a:defRPr>
+            </a:lvl1pPr>
+          </a:lstStyle>
+          <a:p>
+            <a:r>
+              <a:rPr lang="en-US" dirty="0"/>
+              <a:t>Demo title</a:t>
+            </a:r>
+          </a:p>
+        </p:txBody>
+      </p:sp>
+      <p:sp>
+        <p:nvSpPr>
+          <p:cNvPr id="2" name="Rectangle 1"/>
+          <p:cNvSpPr/>
+          <p:nvPr userDrawn="1"/>
+        </p:nvSpPr>
+        <p:spPr>
+          <a:xfrm>
+            <a:off x="5529178" y="2715201"/>
+            <a:ext cx="1133644" cy="369332"/>
+          </a:xfrm>
+          <a:prstGeom prst="rect">
+            <a:avLst/>
+          </a:prstGeom>
+        </p:spPr>
+        <p:txBody>
+          <a:bodyPr wrap="none">
+            <a:spAutoFit/>
+          </a:bodyPr>
+          <a:lstStyle/>
+          <a:p>
+            <a:pPr algn="ctr">
+              <a:spcBef>
+                <a:spcPts val="1200"/>
+              </a:spcBef>
+              <a:defRPr/>
+            </a:pPr>
+            <a:r>
+              <a:rPr lang="en-US" sz="1800" cap="all" spc="500" dirty="0">
+                <a:solidFill>
+                  <a:srgbClr val="FFFFFF"/>
+                </a:solidFill>
+                <a:latin typeface="Arial" panose="020B0604020202020204" pitchFamily="34" charset="0"/>
+                <a:ea typeface="Segoe UI Semilight" charset="0"/>
+                <a:cs typeface="Arial" panose="020B0604020202020204" pitchFamily="34" charset="0"/>
+              </a:rPr>
+              <a:t>DEMO</a:t>
+            </a:r>
+          </a:p>
+        </p:txBody>
+      </p:sp>
+    </p:spTree>
+    <p:extLst>
+      <p:ext uri="{BB962C8B-B14F-4D97-AF65-F5344CB8AC3E}">
+        <p14:creationId xmlns:p14="http://schemas.microsoft.com/office/powerpoint/2010/main" val="1192171756"/>
+      </p:ext>
+    </p:extLst>
+  </p:cSld>
+  <p:clrMapOvr>
+    <a:overrideClrMapping bg1="dk1" tx1="lt1" bg2="dk2" tx2="lt2" accent1="accent1" accent2="accent2" accent3="accent3" accent4="accent4" accent5="accent5" accent6="accent6" hlink="hlink" folHlink="folHlink"/>
+  </p:clrMapOvr>
+  <mc:AlternateContent xmlns:mc="http://schemas.openxmlformats.org/markup-compatibility/2006" xmlns:p14="http://schemas.microsoft.com/office/powerpoint/2010/main">
+    <mc:Choice Requires="p14">
+      <p:transition spd="slow" p14:dur="3400">
+        <p14:reveal/>
+      </p:transition>
+    </mc:Choice>
+    <mc:Fallback xmlns="">
+      <p:transition spd="slow">
+        <p:fade/>
+      </p:transition>
+    </mc:Fallback>
+  </mc:AlternateContent>
+</p:sldLayout>
+</file>
+
 <file path=ppt/slideLayouts/slideLayout2.xml><?xml version="1.0" encoding="utf-8"?>
 <p:sldLayout xmlns:a="http://schemas.openxmlformats.org/drawingml/2006/main" xmlns:r="http://schemas.openxmlformats.org/officeDocument/2006/relationships" xmlns:p="http://schemas.openxmlformats.org/presentationml/2006/main" type="obj" preserve="1">
   <p:cSld name="Title and Content">
@@ -2965,7 +2960,7 @@
           <a:p>
             <a:fld id="{9912175C-3CF6-487A-9684-5B9CA6422935}" type="datetimeFigureOut">
               <a:rPr lang="en-US" smtClean="0"/>
-              <a:t>5/28/2019</a:t>
+              <a:t>6/24/2019</a:t>
             </a:fld>
             <a:endParaRPr lang="en-US"/>
           </a:p>
@@ -3211,7 +3206,7 @@
           <a:p>
             <a:fld id="{C764DE79-268F-4C1A-8933-263129D2AF90}" type="datetimeFigureOut">
               <a:rPr lang="en-US" smtClean="0"/>
-              <a:t>5/28/2019</a:t>
+              <a:t>6/24/2019</a:t>
             </a:fld>
             <a:endParaRPr lang="en-US" dirty="0"/>
           </a:p>
@@ -3443,7 +3438,7 @@
           <a:p>
             <a:fld id="{C764DE79-268F-4C1A-8933-263129D2AF90}" type="datetimeFigureOut">
               <a:rPr lang="en-US" smtClean="0"/>
-              <a:t>5/28/2019</a:t>
+              <a:t>6/24/2019</a:t>
             </a:fld>
             <a:endParaRPr lang="en-US" dirty="0"/>
           </a:p>
@@ -3810,7 +3805,7 @@
           <a:p>
             <a:fld id="{C764DE79-268F-4C1A-8933-263129D2AF90}" type="datetimeFigureOut">
               <a:rPr lang="en-US" smtClean="0"/>
-              <a:t>5/28/2019</a:t>
+              <a:t>6/24/2019</a:t>
             </a:fld>
             <a:endParaRPr lang="en-US" dirty="0"/>
           </a:p>
@@ -3928,7 +3923,7 @@
           <a:p>
             <a:fld id="{C764DE79-268F-4C1A-8933-263129D2AF90}" type="datetimeFigureOut">
               <a:rPr lang="en-US" smtClean="0"/>
-              <a:t>5/28/2019</a:t>
+              <a:t>6/24/2019</a:t>
             </a:fld>
             <a:endParaRPr lang="en-US" dirty="0"/>
           </a:p>
@@ -4026,7 +4021,7 @@
           <a:p>
             <a:fld id="{D01120C9-890A-4013-ADCB-1DF4AE2150B6}" type="datetimeFigureOut">
               <a:rPr lang="en-US" smtClean="0"/>
-              <a:t>5/28/2019</a:t>
+              <a:t>6/24/2019</a:t>
             </a:fld>
             <a:endParaRPr lang="en-US"/>
           </a:p>
@@ -4303,7 +4298,7 @@
           <a:p>
             <a:fld id="{C764DE79-268F-4C1A-8933-263129D2AF90}" type="datetimeFigureOut">
               <a:rPr lang="en-US" smtClean="0"/>
-              <a:t>5/28/2019</a:t>
+              <a:t>6/24/2019</a:t>
             </a:fld>
             <a:endParaRPr lang="en-US" dirty="0"/>
           </a:p>
@@ -4560,7 +4555,7 @@
           <a:p>
             <a:fld id="{C764DE79-268F-4C1A-8933-263129D2AF90}" type="datetimeFigureOut">
               <a:rPr lang="en-US" smtClean="0"/>
-              <a:t>5/28/2019</a:t>
+              <a:t>6/24/2019</a:t>
             </a:fld>
             <a:endParaRPr lang="en-US" dirty="0"/>
           </a:p>
@@ -4773,7 +4768,7 @@
           <a:p>
             <a:fld id="{C764DE79-268F-4C1A-8933-263129D2AF90}" type="datetimeFigureOut">
               <a:rPr lang="en-US" smtClean="0"/>
-              <a:t>5/28/2019</a:t>
+              <a:t>6/24/2019</a:t>
             </a:fld>
             <a:endParaRPr lang="en-US" dirty="0"/>
           </a:p>
@@ -4881,6 +4876,7 @@
     <p:sldLayoutId id="2147484422" r:id="rId13"/>
     <p:sldLayoutId id="2147484423" r:id="rId14"/>
     <p:sldLayoutId id="2147484432" r:id="rId15"/>
+    <p:sldLayoutId id="2147484433" r:id="rId16"/>
   </p:sldLayoutIdLst>
   <p:txStyles>
     <p:titleStyle>
@@ -5303,6 +5299,1117 @@
           <a:chExt cx="0" cy="0"/>
         </a:xfrm>
       </p:grpSpPr>
+      <p:sp>
+        <p:nvSpPr>
+          <p:cNvPr id="2" name="Title 1">
+            <a:extLst>
+              <a:ext uri="{FF2B5EF4-FFF2-40B4-BE49-F238E27FC236}">
+                <a16:creationId xmlns:a16="http://schemas.microsoft.com/office/drawing/2014/main" id="{BDCEF1CF-0156-4649-9F4A-2761D687C086}"/>
+              </a:ext>
+            </a:extLst>
+          </p:cNvPr>
+          <p:cNvSpPr>
+            <a:spLocks noGrp="1"/>
+          </p:cNvSpPr>
+          <p:nvPr>
+            <p:ph type="title"/>
+          </p:nvPr>
+        </p:nvSpPr>
+        <p:spPr>
+          <a:xfrm>
+            <a:off x="838200" y="88398"/>
+            <a:ext cx="10515600" cy="1325563"/>
+          </a:xfrm>
+        </p:spPr>
+        <p:txBody>
+          <a:bodyPr>
+            <a:normAutofit/>
+          </a:bodyPr>
+          <a:lstStyle/>
+          <a:p>
+            <a:r>
+              <a:rPr lang="en-US" sz="3600" dirty="0">
+                <a:latin typeface="Arial" panose="020B0604020202020204" pitchFamily="34" charset="0"/>
+                <a:cs typeface="Arial" panose="020B0604020202020204" pitchFamily="34" charset="0"/>
+              </a:rPr>
+              <a:t>Three different ways to use the Change Feed</a:t>
+            </a:r>
+          </a:p>
+        </p:txBody>
+      </p:sp>
+      <p:graphicFrame>
+        <p:nvGraphicFramePr>
+          <p:cNvPr id="3" name="Table 2">
+            <a:extLst>
+              <a:ext uri="{FF2B5EF4-FFF2-40B4-BE49-F238E27FC236}">
+                <a16:creationId xmlns:a16="http://schemas.microsoft.com/office/drawing/2014/main" id="{CC3921E2-87CD-46BE-A10F-6E9547602BA8}"/>
+              </a:ext>
+            </a:extLst>
+          </p:cNvPr>
+          <p:cNvGraphicFramePr>
+            <a:graphicFrameLocks noGrp="1"/>
+          </p:cNvGraphicFramePr>
+          <p:nvPr>
+            <p:extLst>
+              <p:ext uri="{D42A27DB-BD31-4B8C-83A1-F6EECF244321}">
+                <p14:modId xmlns:p14="http://schemas.microsoft.com/office/powerpoint/2010/main" val="161136548"/>
+              </p:ext>
+            </p:extLst>
+          </p:nvPr>
+        </p:nvGraphicFramePr>
+        <p:xfrm>
+          <a:off x="563879" y="1840686"/>
+          <a:ext cx="11064241" cy="4216011"/>
+        </p:xfrm>
+        <a:graphic>
+          <a:graphicData uri="http://schemas.openxmlformats.org/drawingml/2006/table">
+            <a:tbl>
+              <a:tblPr firstRow="1" bandRow="1">
+                <a:tableStyleId>{5C22544A-7EE6-4342-B048-85BDC9FD1C3A}</a:tableStyleId>
+              </a:tblPr>
+              <a:tblGrid>
+                <a:gridCol w="2376763">
+                  <a:extLst>
+                    <a:ext uri="{9D8B030D-6E8A-4147-A177-3AD203B41FA5}">
+                      <a16:colId xmlns:a16="http://schemas.microsoft.com/office/drawing/2014/main" val="1439597733"/>
+                    </a:ext>
+                  </a:extLst>
+                </a:gridCol>
+                <a:gridCol w="1966977">
+                  <a:extLst>
+                    <a:ext uri="{9D8B030D-6E8A-4147-A177-3AD203B41FA5}">
+                      <a16:colId xmlns:a16="http://schemas.microsoft.com/office/drawing/2014/main" val="234410396"/>
+                    </a:ext>
+                  </a:extLst>
+                </a:gridCol>
+                <a:gridCol w="6720501">
+                  <a:extLst>
+                    <a:ext uri="{9D8B030D-6E8A-4147-A177-3AD203B41FA5}">
+                      <a16:colId xmlns:a16="http://schemas.microsoft.com/office/drawing/2014/main" val="1602253400"/>
+                    </a:ext>
+                  </a:extLst>
+                </a:gridCol>
+              </a:tblGrid>
+              <a:tr h="535412">
+                <a:tc>
+                  <a:txBody>
+                    <a:bodyPr/>
+                    <a:lstStyle/>
+                    <a:p>
+                      <a:pPr algn="ctr"/>
+                      <a:r>
+                        <a:rPr lang="en-US" sz="2000"/>
+                        <a:t>Implementation</a:t>
+                      </a:r>
+                    </a:p>
+                  </a:txBody>
+                  <a:tcPr marL="89642" marR="89642" marT="44821" marB="44821" anchor="ctr"/>
+                </a:tc>
+                <a:tc>
+                  <a:txBody>
+                    <a:bodyPr/>
+                    <a:lstStyle/>
+                    <a:p>
+                      <a:pPr algn="ctr"/>
+                      <a:r>
+                        <a:rPr lang="en-US" sz="2000"/>
+                        <a:t>Use Case</a:t>
+                      </a:r>
+                    </a:p>
+                  </a:txBody>
+                  <a:tcPr marL="89642" marR="89642" marT="44821" marB="44821" anchor="ctr"/>
+                </a:tc>
+                <a:tc>
+                  <a:txBody>
+                    <a:bodyPr/>
+                    <a:lstStyle/>
+                    <a:p>
+                      <a:pPr algn="ctr"/>
+                      <a:r>
+                        <a:rPr lang="en-US" sz="2000"/>
+                        <a:t>Advantages</a:t>
+                      </a:r>
+                    </a:p>
+                  </a:txBody>
+                  <a:tcPr marL="89642" marR="89642" marT="44821" marB="44821" anchor="ctr"/>
+                </a:tc>
+                <a:extLst>
+                  <a:ext uri="{0D108BD9-81ED-4DB2-BD59-A6C34878D82A}">
+                    <a16:rowId xmlns:a16="http://schemas.microsoft.com/office/drawing/2014/main" val="1446689242"/>
+                  </a:ext>
+                </a:extLst>
+              </a:tr>
+              <a:tr h="1199378">
+                <a:tc>
+                  <a:txBody>
+                    <a:bodyPr/>
+                    <a:lstStyle/>
+                    <a:p>
+                      <a:pPr algn="ctr"/>
+                      <a:r>
+                        <a:rPr lang="en-US" sz="2000" dirty="0"/>
+                        <a:t>Azure Functions</a:t>
+                      </a:r>
+                    </a:p>
+                  </a:txBody>
+                  <a:tcPr marL="89642" marR="89642" marT="44821" marB="44821" anchor="ctr"/>
+                </a:tc>
+                <a:tc>
+                  <a:txBody>
+                    <a:bodyPr/>
+                    <a:lstStyle/>
+                    <a:p>
+                      <a:pPr algn="ctr"/>
+                      <a:r>
+                        <a:rPr lang="en-US" sz="2000"/>
+                        <a:t>Serverless applications</a:t>
+                      </a:r>
+                    </a:p>
+                  </a:txBody>
+                  <a:tcPr marL="89642" marR="89642" marT="44821" marB="44821" anchor="ctr"/>
+                </a:tc>
+                <a:tc>
+                  <a:txBody>
+                    <a:bodyPr/>
+                    <a:lstStyle/>
+                    <a:p>
+                      <a:pPr algn="ctr"/>
+                      <a:r>
+                        <a:rPr lang="en-US" sz="2000"/>
+                        <a:t>Easy to implement. </a:t>
+                      </a:r>
+                    </a:p>
+                    <a:p>
+                      <a:pPr algn="ctr"/>
+                      <a:r>
+                        <a:rPr lang="en-US" sz="2000"/>
+                        <a:t>Used as a trigger, input or output binding to an Azure Function.</a:t>
+                      </a:r>
+                    </a:p>
+                  </a:txBody>
+                  <a:tcPr marL="89642" marR="89642" marT="44821" marB="44821" anchor="ctr"/>
+                </a:tc>
+                <a:extLst>
+                  <a:ext uri="{0D108BD9-81ED-4DB2-BD59-A6C34878D82A}">
+                    <a16:rowId xmlns:a16="http://schemas.microsoft.com/office/drawing/2014/main" val="4214272625"/>
+                  </a:ext>
+                </a:extLst>
+              </a:tr>
+              <a:tr h="1182369">
+                <a:tc>
+                  <a:txBody>
+                    <a:bodyPr/>
+                    <a:lstStyle/>
+                    <a:p>
+                      <a:pPr algn="ctr"/>
+                      <a:r>
+                        <a:rPr lang="en-US" sz="2000"/>
+                        <a:t>Change Feed </a:t>
+                      </a:r>
+                    </a:p>
+                    <a:p>
+                      <a:pPr algn="ctr"/>
+                      <a:r>
+                        <a:rPr lang="en-US" sz="2000"/>
+                        <a:t>Processor Library</a:t>
+                      </a:r>
+                    </a:p>
+                  </a:txBody>
+                  <a:tcPr marL="89642" marR="89642" marT="44821" marB="44821" anchor="ctr"/>
+                </a:tc>
+                <a:tc>
+                  <a:txBody>
+                    <a:bodyPr/>
+                    <a:lstStyle/>
+                    <a:p>
+                      <a:pPr algn="ctr"/>
+                      <a:r>
+                        <a:rPr lang="en-US" sz="2000"/>
+                        <a:t>Distributed applications</a:t>
+                      </a:r>
+                    </a:p>
+                  </a:txBody>
+                  <a:tcPr marL="89642" marR="89642" marT="44821" marB="44821" anchor="ctr"/>
+                </a:tc>
+                <a:tc>
+                  <a:txBody>
+                    <a:bodyPr/>
+                    <a:lstStyle/>
+                    <a:p>
+                      <a:pPr algn="ctr"/>
+                      <a:r>
+                        <a:rPr lang="en-US" sz="2000"/>
+                        <a:t>Ability to distribute the processing of events towards multiple clients. Requires a “leases collection”.</a:t>
+                      </a:r>
+                    </a:p>
+                  </a:txBody>
+                  <a:tcPr marL="89642" marR="89642" marT="44821" marB="44821" anchor="ctr"/>
+                </a:tc>
+                <a:extLst>
+                  <a:ext uri="{0D108BD9-81ED-4DB2-BD59-A6C34878D82A}">
+                    <a16:rowId xmlns:a16="http://schemas.microsoft.com/office/drawing/2014/main" val="3060184176"/>
+                  </a:ext>
+                </a:extLst>
+              </a:tr>
+              <a:tr h="1298852">
+                <a:tc>
+                  <a:txBody>
+                    <a:bodyPr/>
+                    <a:lstStyle/>
+                    <a:p>
+                      <a:pPr algn="ctr"/>
+                      <a:r>
+                        <a:rPr lang="en-US" sz="2000"/>
+                        <a:t>SQL API SDK for .NET or Java</a:t>
+                      </a:r>
+                    </a:p>
+                  </a:txBody>
+                  <a:tcPr marL="89642" marR="89642" marT="44821" marB="44821" anchor="ctr"/>
+                </a:tc>
+                <a:tc>
+                  <a:txBody>
+                    <a:bodyPr/>
+                    <a:lstStyle/>
+                    <a:p>
+                      <a:pPr algn="ctr"/>
+                      <a:r>
+                        <a:rPr lang="en-US" sz="2000"/>
+                        <a:t>Not recommended</a:t>
+                      </a:r>
+                    </a:p>
+                  </a:txBody>
+                  <a:tcPr marL="89642" marR="89642" marT="44821" marB="44821" anchor="ctr"/>
+                </a:tc>
+                <a:tc>
+                  <a:txBody>
+                    <a:bodyPr/>
+                    <a:lstStyle/>
+                    <a:p>
+                      <a:pPr algn="ctr"/>
+                      <a:r>
+                        <a:rPr lang="en-US" sz="2000" dirty="0"/>
+                        <a:t>Requires manual implementation in a .NET or Java application.</a:t>
+                      </a:r>
+                    </a:p>
+                  </a:txBody>
+                  <a:tcPr marL="89642" marR="89642" marT="44821" marB="44821" anchor="ctr"/>
+                </a:tc>
+                <a:extLst>
+                  <a:ext uri="{0D108BD9-81ED-4DB2-BD59-A6C34878D82A}">
+                    <a16:rowId xmlns:a16="http://schemas.microsoft.com/office/drawing/2014/main" val="3319864853"/>
+                  </a:ext>
+                </a:extLst>
+              </a:tr>
+            </a:tbl>
+          </a:graphicData>
+        </a:graphic>
+      </p:graphicFrame>
+    </p:spTree>
+    <p:extLst>
+      <p:ext uri="{BB962C8B-B14F-4D97-AF65-F5344CB8AC3E}">
+        <p14:creationId xmlns:p14="http://schemas.microsoft.com/office/powerpoint/2010/main" val="957795446"/>
+      </p:ext>
+    </p:extLst>
+  </p:cSld>
+  <p:clrMapOvr>
+    <a:masterClrMapping/>
+  </p:clrMapOvr>
+  <p:transition>
+    <p:fade/>
+  </p:transition>
+</p:sld>
+</file>
+
+<file path=ppt/slides/slide11.xml><?xml version="1.0" encoding="utf-8"?>
+<p:sld xmlns:a="http://schemas.openxmlformats.org/drawingml/2006/main" xmlns:r="http://schemas.openxmlformats.org/officeDocument/2006/relationships" xmlns:p="http://schemas.openxmlformats.org/presentationml/2006/main">
+  <p:cSld>
+    <p:spTree>
+      <p:nvGrpSpPr>
+        <p:cNvPr id="1" name=""/>
+        <p:cNvGrpSpPr/>
+        <p:nvPr/>
+      </p:nvGrpSpPr>
+      <p:grpSpPr>
+        <a:xfrm>
+          <a:off x="0" y="0"/>
+          <a:ext cx="0" cy="0"/>
+          <a:chOff x="0" y="0"/>
+          <a:chExt cx="0" cy="0"/>
+        </a:xfrm>
+      </p:grpSpPr>
+      <p:sp>
+        <p:nvSpPr>
+          <p:cNvPr id="2" name="Title 1">
+            <a:extLst>
+              <a:ext uri="{FF2B5EF4-FFF2-40B4-BE49-F238E27FC236}">
+                <a16:creationId xmlns:a16="http://schemas.microsoft.com/office/drawing/2014/main" id="{E159606B-2CA9-42B7-900C-F3F0F7BD931F}"/>
+              </a:ext>
+            </a:extLst>
+          </p:cNvPr>
+          <p:cNvSpPr>
+            <a:spLocks noGrp="1"/>
+          </p:cNvSpPr>
+          <p:nvPr>
+            <p:ph type="title"/>
+          </p:nvPr>
+        </p:nvSpPr>
+        <p:spPr/>
+        <p:txBody>
+          <a:bodyPr/>
+          <a:lstStyle/>
+          <a:p>
+            <a:r>
+              <a:rPr lang="en-US" dirty="0"/>
+              <a:t>Lease collection</a:t>
+            </a:r>
+          </a:p>
+        </p:txBody>
+      </p:sp>
+      <p:sp>
+        <p:nvSpPr>
+          <p:cNvPr id="6" name="TextBox 5">
+            <a:extLst>
+              <a:ext uri="{FF2B5EF4-FFF2-40B4-BE49-F238E27FC236}">
+                <a16:creationId xmlns:a16="http://schemas.microsoft.com/office/drawing/2014/main" id="{A448BC65-D052-4748-97ED-443F5F69A6D9}"/>
+              </a:ext>
+            </a:extLst>
+          </p:cNvPr>
+          <p:cNvSpPr txBox="1"/>
+          <p:nvPr/>
+        </p:nvSpPr>
+        <p:spPr>
+          <a:xfrm>
+            <a:off x="269240" y="1733844"/>
+            <a:ext cx="11655840" cy="4412709"/>
+          </a:xfrm>
+          <a:prstGeom prst="rect">
+            <a:avLst/>
+          </a:prstGeom>
+          <a:noFill/>
+        </p:spPr>
+        <p:txBody>
+          <a:bodyPr wrap="square" lIns="179285" tIns="143428" rIns="179285" bIns="143428" rtlCol="0">
+            <a:spAutoFit/>
+          </a:bodyPr>
+          <a:lstStyle/>
+          <a:p>
+            <a:pPr defTabSz="914367">
+              <a:lnSpc>
+                <a:spcPct val="90000"/>
+              </a:lnSpc>
+              <a:spcAft>
+                <a:spcPts val="588"/>
+              </a:spcAft>
+            </a:pPr>
+            <a:r>
+              <a:rPr lang="en-US" sz="2353" dirty="0">
+                <a:gradFill>
+                  <a:gsLst>
+                    <a:gs pos="2917">
+                      <a:srgbClr val="353535"/>
+                    </a:gs>
+                    <a:gs pos="30000">
+                      <a:srgbClr val="353535"/>
+                    </a:gs>
+                  </a:gsLst>
+                  <a:lin ang="5400000" scaled="0"/>
+                </a:gradFill>
+                <a:latin typeface="Arial" panose="020B0604020202020204" pitchFamily="34" charset="0"/>
+              </a:rPr>
+              <a:t>Required when you consume the change feed through the Change Feed Processor Library or an Azure Function Cosmos DB Trigger</a:t>
+            </a:r>
+          </a:p>
+          <a:p>
+            <a:pPr defTabSz="914367">
+              <a:lnSpc>
+                <a:spcPct val="90000"/>
+              </a:lnSpc>
+              <a:spcAft>
+                <a:spcPts val="588"/>
+              </a:spcAft>
+            </a:pPr>
+            <a:endParaRPr lang="en-US" sz="2353" dirty="0">
+              <a:gradFill>
+                <a:gsLst>
+                  <a:gs pos="2917">
+                    <a:srgbClr val="353535"/>
+                  </a:gs>
+                  <a:gs pos="30000">
+                    <a:srgbClr val="353535"/>
+                  </a:gs>
+                </a:gsLst>
+                <a:lin ang="5400000" scaled="0"/>
+              </a:gradFill>
+              <a:latin typeface="Arial" panose="020B0604020202020204" pitchFamily="34" charset="0"/>
+            </a:endParaRPr>
+          </a:p>
+          <a:p>
+            <a:pPr defTabSz="914367">
+              <a:lnSpc>
+                <a:spcPct val="90000"/>
+              </a:lnSpc>
+              <a:spcAft>
+                <a:spcPts val="588"/>
+              </a:spcAft>
+            </a:pPr>
+            <a:r>
+              <a:rPr lang="en-US" sz="2353" dirty="0">
+                <a:gradFill>
+                  <a:gsLst>
+                    <a:gs pos="2917">
+                      <a:srgbClr val="353535"/>
+                    </a:gs>
+                    <a:gs pos="30000">
+                      <a:srgbClr val="353535"/>
+                    </a:gs>
+                  </a:gsLst>
+                  <a:lin ang="5400000" scaled="0"/>
+                </a:gradFill>
+                <a:latin typeface="Arial" panose="020B0604020202020204" pitchFamily="34" charset="0"/>
+              </a:rPr>
+              <a:t>In the lease collection, a document is created for each physical partition to bookmark the latest document that was processed</a:t>
+            </a:r>
+          </a:p>
+          <a:p>
+            <a:pPr defTabSz="914367">
+              <a:lnSpc>
+                <a:spcPct val="90000"/>
+              </a:lnSpc>
+              <a:spcAft>
+                <a:spcPts val="588"/>
+              </a:spcAft>
+            </a:pPr>
+            <a:endParaRPr lang="en-US" sz="2353" dirty="0">
+              <a:gradFill>
+                <a:gsLst>
+                  <a:gs pos="2917">
+                    <a:srgbClr val="353535"/>
+                  </a:gs>
+                  <a:gs pos="30000">
+                    <a:srgbClr val="353535"/>
+                  </a:gs>
+                </a:gsLst>
+                <a:lin ang="5400000" scaled="0"/>
+              </a:gradFill>
+              <a:latin typeface="Arial" panose="020B0604020202020204" pitchFamily="34" charset="0"/>
+            </a:endParaRPr>
+          </a:p>
+          <a:p>
+            <a:pPr defTabSz="914367">
+              <a:lnSpc>
+                <a:spcPct val="90000"/>
+              </a:lnSpc>
+              <a:spcAft>
+                <a:spcPts val="588"/>
+              </a:spcAft>
+            </a:pPr>
+            <a:r>
+              <a:rPr lang="en-US" sz="2353" dirty="0">
+                <a:gradFill>
+                  <a:gsLst>
+                    <a:gs pos="2917">
+                      <a:srgbClr val="353535"/>
+                    </a:gs>
+                    <a:gs pos="30000">
+                      <a:srgbClr val="353535"/>
+                    </a:gs>
+                  </a:gsLst>
+                  <a:lin ang="5400000" scaled="0"/>
+                </a:gradFill>
+                <a:latin typeface="Arial" panose="020B0604020202020204" pitchFamily="34" charset="0"/>
+              </a:rPr>
+              <a:t>In general, 400 RU’s should be enough for the lease collection. For very large workloads, you may need to increase up to a few thousand RU’s.</a:t>
+            </a:r>
+            <a:endParaRPr lang="en-US" b="1" dirty="0">
+              <a:gradFill>
+                <a:gsLst>
+                  <a:gs pos="2917">
+                    <a:srgbClr val="353535"/>
+                  </a:gs>
+                  <a:gs pos="30000">
+                    <a:srgbClr val="353535"/>
+                  </a:gs>
+                </a:gsLst>
+                <a:lin ang="5400000" scaled="0"/>
+              </a:gradFill>
+              <a:latin typeface="Arial" panose="020B0604020202020204" pitchFamily="34" charset="0"/>
+            </a:endParaRPr>
+          </a:p>
+          <a:p>
+            <a:pPr defTabSz="914367">
+              <a:lnSpc>
+                <a:spcPct val="90000"/>
+              </a:lnSpc>
+              <a:spcAft>
+                <a:spcPts val="588"/>
+              </a:spcAft>
+            </a:pPr>
+            <a:endParaRPr lang="en-US" sz="2353" dirty="0">
+              <a:gradFill>
+                <a:gsLst>
+                  <a:gs pos="2917">
+                    <a:srgbClr val="353535"/>
+                  </a:gs>
+                  <a:gs pos="30000">
+                    <a:srgbClr val="353535"/>
+                  </a:gs>
+                </a:gsLst>
+                <a:lin ang="5400000" scaled="0"/>
+              </a:gradFill>
+              <a:latin typeface="Arial" panose="020B0604020202020204" pitchFamily="34" charset="0"/>
+            </a:endParaRPr>
+          </a:p>
+          <a:p>
+            <a:pPr defTabSz="914367">
+              <a:lnSpc>
+                <a:spcPct val="90000"/>
+              </a:lnSpc>
+              <a:spcAft>
+                <a:spcPts val="588"/>
+              </a:spcAft>
+            </a:pPr>
+            <a:r>
+              <a:rPr lang="en-US" sz="2353" dirty="0">
+                <a:gradFill>
+                  <a:gsLst>
+                    <a:gs pos="2917">
+                      <a:srgbClr val="353535"/>
+                    </a:gs>
+                    <a:gs pos="30000">
+                      <a:srgbClr val="353535"/>
+                    </a:gs>
+                  </a:gsLst>
+                  <a:lin ang="5400000" scaled="0"/>
+                </a:gradFill>
+                <a:latin typeface="Arial" panose="020B0604020202020204" pitchFamily="34" charset="0"/>
+              </a:rPr>
+              <a:t>You should partition your lease collection by “id”</a:t>
+            </a:r>
+          </a:p>
+          <a:p>
+            <a:pPr defTabSz="914367">
+              <a:lnSpc>
+                <a:spcPct val="90000"/>
+              </a:lnSpc>
+              <a:spcAft>
+                <a:spcPts val="588"/>
+              </a:spcAft>
+            </a:pPr>
+            <a:endParaRPr lang="en-US" sz="2353" dirty="0">
+              <a:gradFill>
+                <a:gsLst>
+                  <a:gs pos="2917">
+                    <a:srgbClr val="353535"/>
+                  </a:gs>
+                  <a:gs pos="30000">
+                    <a:srgbClr val="353535"/>
+                  </a:gs>
+                </a:gsLst>
+                <a:lin ang="5400000" scaled="0"/>
+              </a:gradFill>
+              <a:latin typeface="Arial" panose="020B0604020202020204" pitchFamily="34" charset="0"/>
+            </a:endParaRPr>
+          </a:p>
+        </p:txBody>
+      </p:sp>
+    </p:spTree>
+    <p:extLst>
+      <p:ext uri="{BB962C8B-B14F-4D97-AF65-F5344CB8AC3E}">
+        <p14:creationId xmlns:p14="http://schemas.microsoft.com/office/powerpoint/2010/main" val="3725235460"/>
+      </p:ext>
+    </p:extLst>
+  </p:cSld>
+  <p:clrMapOvr>
+    <a:masterClrMapping/>
+  </p:clrMapOvr>
+  <p:transition>
+    <p:fade/>
+  </p:transition>
+</p:sld>
+</file>
+
+<file path=ppt/slides/slide12.xml><?xml version="1.0" encoding="utf-8"?>
+<p:sld xmlns:a="http://schemas.openxmlformats.org/drawingml/2006/main" xmlns:r="http://schemas.openxmlformats.org/officeDocument/2006/relationships" xmlns:p="http://schemas.openxmlformats.org/presentationml/2006/main">
+  <p:cSld>
+    <p:spTree>
+      <p:nvGrpSpPr>
+        <p:cNvPr id="1" name=""/>
+        <p:cNvGrpSpPr/>
+        <p:nvPr/>
+      </p:nvGrpSpPr>
+      <p:grpSpPr>
+        <a:xfrm>
+          <a:off x="0" y="0"/>
+          <a:ext cx="0" cy="0"/>
+          <a:chOff x="0" y="0"/>
+          <a:chExt cx="0" cy="0"/>
+        </a:xfrm>
+      </p:grpSpPr>
+      <p:sp>
+        <p:nvSpPr>
+          <p:cNvPr id="2" name="Title 1">
+            <a:extLst>
+              <a:ext uri="{FF2B5EF4-FFF2-40B4-BE49-F238E27FC236}">
+                <a16:creationId xmlns:a16="http://schemas.microsoft.com/office/drawing/2014/main" id="{BB1C4994-F457-47B3-BBA4-39D1E2365A8D}"/>
+              </a:ext>
+            </a:extLst>
+          </p:cNvPr>
+          <p:cNvSpPr>
+            <a:spLocks noGrp="1"/>
+          </p:cNvSpPr>
+          <p:nvPr>
+            <p:ph type="title"/>
+          </p:nvPr>
+        </p:nvSpPr>
+        <p:spPr>
+          <a:xfrm>
+            <a:off x="264695" y="110680"/>
+            <a:ext cx="11742821" cy="1325563"/>
+          </a:xfrm>
+        </p:spPr>
+        <p:txBody>
+          <a:bodyPr>
+            <a:normAutofit/>
+          </a:bodyPr>
+          <a:lstStyle/>
+          <a:p>
+            <a:r>
+              <a:rPr lang="en-US" sz="3600" dirty="0">
+                <a:latin typeface="Arial" panose="020B0604020202020204" pitchFamily="34" charset="0"/>
+                <a:cs typeface="Arial" panose="020B0604020202020204" pitchFamily="34" charset="0"/>
+              </a:rPr>
+              <a:t>Change Feed Processor Library – Behind the scenes</a:t>
+            </a:r>
+          </a:p>
+        </p:txBody>
+      </p:sp>
+      <p:sp>
+        <p:nvSpPr>
+          <p:cNvPr id="3" name="Text Placeholder 5">
+            <a:extLst>
+              <a:ext uri="{FF2B5EF4-FFF2-40B4-BE49-F238E27FC236}">
+                <a16:creationId xmlns:a16="http://schemas.microsoft.com/office/drawing/2014/main" id="{A3A99102-9472-4260-A6D3-A3B4E0E08804}"/>
+              </a:ext>
+            </a:extLst>
+          </p:cNvPr>
+          <p:cNvSpPr>
+            <a:spLocks noGrp="1"/>
+          </p:cNvSpPr>
+          <p:nvPr>
+            <p:ph type="body" sz="quarter" idx="10"/>
+          </p:nvPr>
+        </p:nvSpPr>
+        <p:spPr>
+          <a:xfrm>
+            <a:off x="136114" y="1913020"/>
+            <a:ext cx="5290128" cy="3983616"/>
+          </a:xfrm>
+        </p:spPr>
+        <p:txBody>
+          <a:bodyPr/>
+          <a:lstStyle/>
+          <a:p>
+            <a:pPr marL="342900" indent="-342900">
+              <a:buFont typeface="Arial" panose="020B0604020202020204" pitchFamily="34" charset="0"/>
+              <a:buChar char="•"/>
+            </a:pPr>
+            <a:r>
+              <a:rPr lang="en-US" sz="2400" b="0" dirty="0"/>
+              <a:t>Spin up instances of the processor  as needed</a:t>
+            </a:r>
+          </a:p>
+          <a:p>
+            <a:pPr marL="342900" indent="-342900">
+              <a:buFont typeface="Arial" panose="020B0604020202020204" pitchFamily="34" charset="0"/>
+              <a:buChar char="•"/>
+            </a:pPr>
+            <a:r>
+              <a:rPr lang="en-US" sz="2400" b="0" dirty="0"/>
+              <a:t>Each host has consumers = observer to implement</a:t>
+            </a:r>
+          </a:p>
+          <a:p>
+            <a:pPr marL="342900" indent="-342900">
+              <a:buFont typeface="Arial" panose="020B0604020202020204" pitchFamily="34" charset="0"/>
+              <a:buChar char="•"/>
+            </a:pPr>
+            <a:r>
+              <a:rPr lang="en-US" sz="2400" b="0" dirty="0"/>
+              <a:t>Each host assigns itself leases on partitions to monitor</a:t>
+            </a:r>
+          </a:p>
+          <a:p>
+            <a:pPr marL="342900" indent="-342900">
+              <a:buFont typeface="Arial" panose="020B0604020202020204" pitchFamily="34" charset="0"/>
+              <a:buChar char="•"/>
+            </a:pPr>
+            <a:r>
+              <a:rPr lang="en-US" sz="2400" b="0" dirty="0"/>
+              <a:t>On each change, logic in consumers gets triggered</a:t>
+            </a:r>
+          </a:p>
+          <a:p>
+            <a:pPr marL="342900" indent="-342900">
+              <a:buFont typeface="Arial" panose="020B0604020202020204" pitchFamily="34" charset="0"/>
+              <a:buChar char="•"/>
+            </a:pPr>
+            <a:r>
+              <a:rPr lang="en-US" sz="2400" b="0" dirty="0"/>
+              <a:t>1 lease collection stored in Cosmos DB</a:t>
+            </a:r>
+          </a:p>
+          <a:p>
+            <a:endParaRPr lang="en-US" sz="2400" b="0" dirty="0"/>
+          </a:p>
+          <a:p>
+            <a:endParaRPr lang="en-US" sz="2400" b="0" dirty="0"/>
+          </a:p>
+          <a:p>
+            <a:endParaRPr lang="en-US" sz="2400" b="0" dirty="0"/>
+          </a:p>
+          <a:p>
+            <a:endParaRPr lang="en-US" sz="2400" dirty="0"/>
+          </a:p>
+        </p:txBody>
+      </p:sp>
+      <p:pic>
+        <p:nvPicPr>
+          <p:cNvPr id="4" name="Picture 3">
+            <a:extLst>
+              <a:ext uri="{FF2B5EF4-FFF2-40B4-BE49-F238E27FC236}">
+                <a16:creationId xmlns:a16="http://schemas.microsoft.com/office/drawing/2014/main" id="{486C3B26-9F94-42C3-A331-36A30A5892A7}"/>
+              </a:ext>
+            </a:extLst>
+          </p:cNvPr>
+          <p:cNvPicPr>
+            <a:picLocks noChangeAspect="1"/>
+          </p:cNvPicPr>
+          <p:nvPr/>
+        </p:nvPicPr>
+        <p:blipFill>
+          <a:blip r:embed="rId2"/>
+          <a:stretch>
+            <a:fillRect/>
+          </a:stretch>
+        </p:blipFill>
+        <p:spPr>
+          <a:xfrm>
+            <a:off x="5635280" y="1788538"/>
+            <a:ext cx="6165670" cy="4232581"/>
+          </a:xfrm>
+          <a:prstGeom prst="rect">
+            <a:avLst/>
+          </a:prstGeom>
+        </p:spPr>
+      </p:pic>
+    </p:spTree>
+    <p:extLst>
+      <p:ext uri="{BB962C8B-B14F-4D97-AF65-F5344CB8AC3E}">
+        <p14:creationId xmlns:p14="http://schemas.microsoft.com/office/powerpoint/2010/main" val="1629628066"/>
+      </p:ext>
+    </p:extLst>
+  </p:cSld>
+  <p:clrMapOvr>
+    <a:masterClrMapping/>
+  </p:clrMapOvr>
+  <p:transition>
+    <p:fade/>
+  </p:transition>
+  <p:timing>
+    <p:tnLst>
+      <p:par>
+        <p:cTn id="1" dur="indefinite" restart="never" nodeType="tmRoot">
+          <p:childTnLst>
+            <p:seq concurrent="1" nextAc="seek">
+              <p:cTn id="2" dur="indefinite" nodeType="mainSeq">
+                <p:childTnLst>
+                  <p:par>
+                    <p:cTn id="3" fill="hold">
+                      <p:stCondLst>
+                        <p:cond delay="indefinite"/>
+                      </p:stCondLst>
+                      <p:childTnLst>
+                        <p:par>
+                          <p:cTn id="4" fill="hold">
+                            <p:stCondLst>
+                              <p:cond delay="0"/>
+                            </p:stCondLst>
+                            <p:childTnLst>
+                              <p:par>
+                                <p:cTn id="5" presetID="1" presetClass="entr" presetSubtype="0" fill="hold" nodeType="clickEffect">
+                                  <p:stCondLst>
+                                    <p:cond delay="0"/>
+                                  </p:stCondLst>
+                                  <p:childTnLst>
+                                    <p:set>
+                                      <p:cBhvr>
+                                        <p:cTn id="6" dur="1" fill="hold">
+                                          <p:stCondLst>
+                                            <p:cond delay="0"/>
+                                          </p:stCondLst>
+                                        </p:cTn>
+                                        <p:tgtEl>
+                                          <p:spTgt spid="3">
+                                            <p:txEl>
+                                              <p:pRg st="0" end="0"/>
+                                            </p:txEl>
+                                          </p:spTgt>
+                                        </p:tgtEl>
+                                        <p:attrNameLst>
+                                          <p:attrName>style.visibility</p:attrName>
+                                        </p:attrNameLst>
+                                      </p:cBhvr>
+                                      <p:to>
+                                        <p:strVal val="visible"/>
+                                      </p:to>
+                                    </p:set>
+                                  </p:childTnLst>
+                                </p:cTn>
+                              </p:par>
+                            </p:childTnLst>
+                          </p:cTn>
+                        </p:par>
+                      </p:childTnLst>
+                    </p:cTn>
+                  </p:par>
+                  <p:par>
+                    <p:cTn id="7" fill="hold">
+                      <p:stCondLst>
+                        <p:cond delay="indefinite"/>
+                      </p:stCondLst>
+                      <p:childTnLst>
+                        <p:par>
+                          <p:cTn id="8" fill="hold">
+                            <p:stCondLst>
+                              <p:cond delay="0"/>
+                            </p:stCondLst>
+                            <p:childTnLst>
+                              <p:par>
+                                <p:cTn id="9" presetID="1" presetClass="entr" presetSubtype="0" fill="hold" nodeType="clickEffect">
+                                  <p:stCondLst>
+                                    <p:cond delay="0"/>
+                                  </p:stCondLst>
+                                  <p:childTnLst>
+                                    <p:set>
+                                      <p:cBhvr>
+                                        <p:cTn id="10" dur="1" fill="hold">
+                                          <p:stCondLst>
+                                            <p:cond delay="0"/>
+                                          </p:stCondLst>
+                                        </p:cTn>
+                                        <p:tgtEl>
+                                          <p:spTgt spid="3">
+                                            <p:txEl>
+                                              <p:pRg st="1" end="1"/>
+                                            </p:txEl>
+                                          </p:spTgt>
+                                        </p:tgtEl>
+                                        <p:attrNameLst>
+                                          <p:attrName>style.visibility</p:attrName>
+                                        </p:attrNameLst>
+                                      </p:cBhvr>
+                                      <p:to>
+                                        <p:strVal val="visible"/>
+                                      </p:to>
+                                    </p:set>
+                                  </p:childTnLst>
+                                </p:cTn>
+                              </p:par>
+                            </p:childTnLst>
+                          </p:cTn>
+                        </p:par>
+                      </p:childTnLst>
+                    </p:cTn>
+                  </p:par>
+                  <p:par>
+                    <p:cTn id="11" fill="hold">
+                      <p:stCondLst>
+                        <p:cond delay="indefinite"/>
+                      </p:stCondLst>
+                      <p:childTnLst>
+                        <p:par>
+                          <p:cTn id="12" fill="hold">
+                            <p:stCondLst>
+                              <p:cond delay="0"/>
+                            </p:stCondLst>
+                            <p:childTnLst>
+                              <p:par>
+                                <p:cTn id="13" presetID="1" presetClass="entr" presetSubtype="0" fill="hold" nodeType="clickEffect">
+                                  <p:stCondLst>
+                                    <p:cond delay="0"/>
+                                  </p:stCondLst>
+                                  <p:childTnLst>
+                                    <p:set>
+                                      <p:cBhvr>
+                                        <p:cTn id="14" dur="1" fill="hold">
+                                          <p:stCondLst>
+                                            <p:cond delay="0"/>
+                                          </p:stCondLst>
+                                        </p:cTn>
+                                        <p:tgtEl>
+                                          <p:spTgt spid="3">
+                                            <p:txEl>
+                                              <p:pRg st="2" end="2"/>
+                                            </p:txEl>
+                                          </p:spTgt>
+                                        </p:tgtEl>
+                                        <p:attrNameLst>
+                                          <p:attrName>style.visibility</p:attrName>
+                                        </p:attrNameLst>
+                                      </p:cBhvr>
+                                      <p:to>
+                                        <p:strVal val="visible"/>
+                                      </p:to>
+                                    </p:set>
+                                  </p:childTnLst>
+                                </p:cTn>
+                              </p:par>
+                            </p:childTnLst>
+                          </p:cTn>
+                        </p:par>
+                      </p:childTnLst>
+                    </p:cTn>
+                  </p:par>
+                  <p:par>
+                    <p:cTn id="15" fill="hold">
+                      <p:stCondLst>
+                        <p:cond delay="indefinite"/>
+                      </p:stCondLst>
+                      <p:childTnLst>
+                        <p:par>
+                          <p:cTn id="16" fill="hold">
+                            <p:stCondLst>
+                              <p:cond delay="0"/>
+                            </p:stCondLst>
+                            <p:childTnLst>
+                              <p:par>
+                                <p:cTn id="17" presetID="1" presetClass="entr" presetSubtype="0" fill="hold" nodeType="clickEffect">
+                                  <p:stCondLst>
+                                    <p:cond delay="0"/>
+                                  </p:stCondLst>
+                                  <p:childTnLst>
+                                    <p:set>
+                                      <p:cBhvr>
+                                        <p:cTn id="18" dur="1" fill="hold">
+                                          <p:stCondLst>
+                                            <p:cond delay="0"/>
+                                          </p:stCondLst>
+                                        </p:cTn>
+                                        <p:tgtEl>
+                                          <p:spTgt spid="3">
+                                            <p:txEl>
+                                              <p:pRg st="3" end="3"/>
+                                            </p:txEl>
+                                          </p:spTgt>
+                                        </p:tgtEl>
+                                        <p:attrNameLst>
+                                          <p:attrName>style.visibility</p:attrName>
+                                        </p:attrNameLst>
+                                      </p:cBhvr>
+                                      <p:to>
+                                        <p:strVal val="visible"/>
+                                      </p:to>
+                                    </p:set>
+                                  </p:childTnLst>
+                                </p:cTn>
+                              </p:par>
+                            </p:childTnLst>
+                          </p:cTn>
+                        </p:par>
+                      </p:childTnLst>
+                    </p:cTn>
+                  </p:par>
+                  <p:par>
+                    <p:cTn id="19" fill="hold">
+                      <p:stCondLst>
+                        <p:cond delay="indefinite"/>
+                      </p:stCondLst>
+                      <p:childTnLst>
+                        <p:par>
+                          <p:cTn id="20" fill="hold">
+                            <p:stCondLst>
+                              <p:cond delay="0"/>
+                            </p:stCondLst>
+                            <p:childTnLst>
+                              <p:par>
+                                <p:cTn id="21" presetID="1" presetClass="entr" presetSubtype="0" fill="hold" nodeType="clickEffect">
+                                  <p:stCondLst>
+                                    <p:cond delay="0"/>
+                                  </p:stCondLst>
+                                  <p:childTnLst>
+                                    <p:set>
+                                      <p:cBhvr>
+                                        <p:cTn id="22" dur="1" fill="hold">
+                                          <p:stCondLst>
+                                            <p:cond delay="0"/>
+                                          </p:stCondLst>
+                                        </p:cTn>
+                                        <p:tgtEl>
+                                          <p:spTgt spid="3">
+                                            <p:txEl>
+                                              <p:pRg st="4" end="4"/>
+                                            </p:txEl>
+                                          </p:spTgt>
+                                        </p:tgtEl>
+                                        <p:attrNameLst>
+                                          <p:attrName>style.visibility</p:attrName>
+                                        </p:attrNameLst>
+                                      </p:cBhvr>
+                                      <p:to>
+                                        <p:strVal val="visible"/>
+                                      </p:to>
+                                    </p:set>
+                                  </p:childTnLst>
+                                </p:cTn>
+                              </p:par>
+                            </p:childTnLst>
+                          </p:cTn>
+                        </p:par>
+                      </p:childTnLst>
+                    </p:cTn>
+                  </p:par>
+                </p:childTnLst>
+              </p:cTn>
+              <p:prevCondLst>
+                <p:cond evt="onPrev" delay="0">
+                  <p:tgtEl>
+                    <p:sldTgt/>
+                  </p:tgtEl>
+                </p:cond>
+              </p:prevCondLst>
+              <p:nextCondLst>
+                <p:cond evt="onNext" delay="0">
+                  <p:tgtEl>
+                    <p:sldTgt/>
+                  </p:tgtEl>
+                </p:cond>
+              </p:nextCondLst>
+            </p:seq>
+          </p:childTnLst>
+        </p:cTn>
+      </p:par>
+    </p:tnLst>
+  </p:timing>
+</p:sld>
+</file>
+
+<file path=ppt/slides/slide13.xml><?xml version="1.0" encoding="utf-8"?>
+<p:sld xmlns:a="http://schemas.openxmlformats.org/drawingml/2006/main" xmlns:r="http://schemas.openxmlformats.org/officeDocument/2006/relationships" xmlns:p="http://schemas.openxmlformats.org/presentationml/2006/main">
+  <p:cSld>
+    <p:spTree>
+      <p:nvGrpSpPr>
+        <p:cNvPr id="1" name=""/>
+        <p:cNvGrpSpPr/>
+        <p:nvPr/>
+      </p:nvGrpSpPr>
+      <p:grpSpPr>
+        <a:xfrm>
+          <a:off x="0" y="0"/>
+          <a:ext cx="0" cy="0"/>
+          <a:chOff x="0" y="0"/>
+          <a:chExt cx="0" cy="0"/>
+        </a:xfrm>
+      </p:grpSpPr>
       <p:pic>
         <p:nvPicPr>
           <p:cNvPr id="4" name="Picture 2" descr="Using the Azure Cosmos DB change feed processor host">
@@ -5366,7 +6473,7 @@
 </p:sld>
 </file>
 
-<file path=ppt/slides/slide11.xml><?xml version="1.0" encoding="utf-8"?>
+<file path=ppt/slides/slide14.xml><?xml version="1.0" encoding="utf-8"?>
 <p:sld xmlns:a="http://schemas.openxmlformats.org/drawingml/2006/main" xmlns:r="http://schemas.openxmlformats.org/officeDocument/2006/relationships" xmlns:p="http://schemas.openxmlformats.org/presentationml/2006/main">
   <p:cSld>
     <p:spTree>
@@ -5402,7 +6509,7 @@
         <p:spPr>
           <a:xfrm>
             <a:off x="338889" y="0"/>
-            <a:ext cx="11514221" cy="1325563"/>
+            <a:ext cx="11853111" cy="1325563"/>
           </a:xfrm>
         </p:spPr>
         <p:txBody>
@@ -5412,7 +6519,7 @@
           <a:lstStyle/>
           <a:p>
             <a:r>
-              <a:rPr lang="en-US" sz="3600" dirty="0">
+              <a:rPr lang="en-US" sz="4000" dirty="0">
                 <a:latin typeface="Arial" panose="020B0604020202020204" pitchFamily="34" charset="0"/>
                 <a:cs typeface="Arial" panose="020B0604020202020204" pitchFamily="34" charset="0"/>
               </a:rPr>
@@ -6460,7 +7567,7 @@
 </p:sld>
 </file>
 
-<file path=ppt/slides/slide12.xml><?xml version="1.0" encoding="utf-8"?>
+<file path=ppt/slides/slide15.xml><?xml version="1.0" encoding="utf-8"?>
 <p:sld xmlns:a="http://schemas.openxmlformats.org/drawingml/2006/main" xmlns:r="http://schemas.openxmlformats.org/officeDocument/2006/relationships" xmlns:p="http://schemas.openxmlformats.org/presentationml/2006/main">
   <p:cSld>
     <p:spTree>
@@ -7719,7 +8826,7 @@
 </p:sld>
 </file>
 
-<file path=ppt/slides/slide13.xml><?xml version="1.0" encoding="utf-8"?>
+<file path=ppt/slides/slide16.xml><?xml version="1.0" encoding="utf-8"?>
 <p:sld xmlns:a="http://schemas.openxmlformats.org/drawingml/2006/main" xmlns:r="http://schemas.openxmlformats.org/officeDocument/2006/relationships" xmlns:p="http://schemas.openxmlformats.org/presentationml/2006/main">
   <p:cSld>
     <p:spTree>
@@ -7736,819 +8843,6 @@
           <a:chExt cx="0" cy="0"/>
         </a:xfrm>
       </p:grpSpPr>
-      <p:grpSp>
-        <p:nvGrpSpPr>
-          <p:cNvPr id="8" name="Group 7">
-            <a:extLst>
-              <a:ext uri="{FF2B5EF4-FFF2-40B4-BE49-F238E27FC236}">
-                <a16:creationId xmlns:a16="http://schemas.microsoft.com/office/drawing/2014/main" id="{26CA9626-EE2A-41CA-BC78-282957E0EA0D}"/>
-              </a:ext>
-            </a:extLst>
-          </p:cNvPr>
-          <p:cNvGrpSpPr/>
-          <p:nvPr/>
-        </p:nvGrpSpPr>
-        <p:grpSpPr>
-          <a:xfrm>
-            <a:off x="11169383" y="5988593"/>
-            <a:ext cx="607510" cy="607510"/>
-            <a:chOff x="11169383" y="5988593"/>
-            <a:chExt cx="607510" cy="607510"/>
-          </a:xfrm>
-        </p:grpSpPr>
-        <p:sp>
-          <p:nvSpPr>
-            <p:cNvPr id="9" name="Rectangle 8">
-              <a:extLst>
-                <a:ext uri="{FF2B5EF4-FFF2-40B4-BE49-F238E27FC236}">
-                  <a16:creationId xmlns:a16="http://schemas.microsoft.com/office/drawing/2014/main" id="{F2711193-9C14-414C-99A7-F7200E426BDF}"/>
-                </a:ext>
-              </a:extLst>
-            </p:cNvPr>
-            <p:cNvSpPr/>
-            <p:nvPr/>
-          </p:nvSpPr>
-          <p:spPr bwMode="auto">
-            <a:xfrm>
-              <a:off x="11169383" y="5988593"/>
-              <a:ext cx="607510" cy="607510"/>
-            </a:xfrm>
-            <a:prstGeom prst="rect">
-              <a:avLst/>
-            </a:prstGeom>
-            <a:solidFill>
-              <a:schemeClr val="tx2"/>
-            </a:solidFill>
-            <a:ln>
-              <a:noFill/>
-              <a:headEnd type="none" w="med" len="med"/>
-              <a:tailEnd type="none" w="med" len="med"/>
-            </a:ln>
-            <a:effectLst/>
-          </p:spPr>
-          <p:style>
-            <a:lnRef idx="1">
-              <a:schemeClr val="accent2"/>
-            </a:lnRef>
-            <a:fillRef idx="3">
-              <a:schemeClr val="accent2"/>
-            </a:fillRef>
-            <a:effectRef idx="2">
-              <a:schemeClr val="accent2"/>
-            </a:effectRef>
-            <a:fontRef idx="minor">
-              <a:schemeClr val="lt1"/>
-            </a:fontRef>
-          </p:style>
-          <p:txBody>
-            <a:bodyPr rot="0" spcFirstLastPara="0" vertOverflow="overflow" horzOverflow="overflow" vert="horz" wrap="square" lIns="182880" tIns="146304" rIns="182880" bIns="146304" numCol="1" spcCol="0" rtlCol="0" fromWordArt="0" anchor="t" anchorCtr="0" forceAA="0" compatLnSpc="1">
-              <a:prstTxWarp prst="textNoShape">
-                <a:avLst/>
-              </a:prstTxWarp>
-              <a:noAutofit/>
-            </a:bodyPr>
-            <a:lstStyle/>
-            <a:p>
-              <a:pPr algn="ctr" defTabSz="932472" fontAlgn="base">
-                <a:lnSpc>
-                  <a:spcPct val="90000"/>
-                </a:lnSpc>
-                <a:spcBef>
-                  <a:spcPct val="0"/>
-                </a:spcBef>
-                <a:spcAft>
-                  <a:spcPct val="0"/>
-                </a:spcAft>
-              </a:pPr>
-              <a:endParaRPr lang="en-US" sz="2400" dirty="0">
-                <a:gradFill>
-                  <a:gsLst>
-                    <a:gs pos="0">
-                      <a:srgbClr val="FFFFFF"/>
-                    </a:gs>
-                    <a:gs pos="100000">
-                      <a:srgbClr val="FFFFFF"/>
-                    </a:gs>
-                  </a:gsLst>
-                  <a:lin ang="5400000" scaled="0"/>
-                </a:gradFill>
-                <a:ea typeface="Segoe UI" pitchFamily="34" charset="0"/>
-                <a:cs typeface="Arial" panose="020B0604020202020204" pitchFamily="34" charset="0"/>
-              </a:endParaRPr>
-            </a:p>
-          </p:txBody>
-        </p:sp>
-        <p:sp>
-          <p:nvSpPr>
-            <p:cNvPr id="10" name="Freeform: Shape 9">
-              <a:extLst>
-                <a:ext uri="{FF2B5EF4-FFF2-40B4-BE49-F238E27FC236}">
-                  <a16:creationId xmlns:a16="http://schemas.microsoft.com/office/drawing/2014/main" id="{6CFC0DF0-A71F-47DE-9E2D-58C0BA526910}"/>
-                </a:ext>
-              </a:extLst>
-            </p:cNvPr>
-            <p:cNvSpPr/>
-            <p:nvPr/>
-          </p:nvSpPr>
-          <p:spPr bwMode="auto">
-            <a:xfrm>
-              <a:off x="11253107" y="6209947"/>
-              <a:ext cx="435337" cy="165698"/>
-            </a:xfrm>
-            <a:custGeom>
-              <a:avLst/>
-              <a:gdLst>
-                <a:gd name="connsiteX0" fmla="*/ 24780 w 853976"/>
-                <a:gd name="connsiteY0" fmla="*/ 883727 h 933956"/>
-                <a:gd name="connsiteX1" fmla="*/ 42639 w 853976"/>
-                <a:gd name="connsiteY1" fmla="*/ 891206 h 933956"/>
-                <a:gd name="connsiteX2" fmla="*/ 50006 w 853976"/>
-                <a:gd name="connsiteY2" fmla="*/ 908953 h 933956"/>
-                <a:gd name="connsiteX3" fmla="*/ 42639 w 853976"/>
-                <a:gd name="connsiteY3" fmla="*/ 926589 h 933956"/>
-                <a:gd name="connsiteX4" fmla="*/ 24780 w 853976"/>
-                <a:gd name="connsiteY4" fmla="*/ 933956 h 933956"/>
-                <a:gd name="connsiteX5" fmla="*/ 7255 w 853976"/>
-                <a:gd name="connsiteY5" fmla="*/ 926589 h 933956"/>
-                <a:gd name="connsiteX6" fmla="*/ 0 w 853976"/>
-                <a:gd name="connsiteY6" fmla="*/ 908953 h 933956"/>
-                <a:gd name="connsiteX7" fmla="*/ 7255 w 853976"/>
-                <a:gd name="connsiteY7" fmla="*/ 891206 h 933956"/>
-                <a:gd name="connsiteX8" fmla="*/ 24780 w 853976"/>
-                <a:gd name="connsiteY8" fmla="*/ 883727 h 933956"/>
-                <a:gd name="connsiteX9" fmla="*/ 631850 w 853976"/>
-                <a:gd name="connsiteY9" fmla="*/ 608916 h 933956"/>
-                <a:gd name="connsiteX10" fmla="*/ 853976 w 853976"/>
-                <a:gd name="connsiteY10" fmla="*/ 608916 h 933956"/>
-                <a:gd name="connsiteX11" fmla="*/ 853976 w 853976"/>
-                <a:gd name="connsiteY11" fmla="*/ 642849 h 933956"/>
-                <a:gd name="connsiteX12" fmla="*/ 761554 w 853976"/>
-                <a:gd name="connsiteY12" fmla="*/ 642849 h 933956"/>
-                <a:gd name="connsiteX13" fmla="*/ 761554 w 853976"/>
-                <a:gd name="connsiteY13" fmla="*/ 929045 h 933956"/>
-                <a:gd name="connsiteX14" fmla="*/ 724049 w 853976"/>
-                <a:gd name="connsiteY14" fmla="*/ 929045 h 933956"/>
-                <a:gd name="connsiteX15" fmla="*/ 724049 w 853976"/>
-                <a:gd name="connsiteY15" fmla="*/ 642849 h 933956"/>
-                <a:gd name="connsiteX16" fmla="*/ 631850 w 853976"/>
-                <a:gd name="connsiteY16" fmla="*/ 642849 h 933956"/>
-                <a:gd name="connsiteX17" fmla="*/ 631850 w 853976"/>
-                <a:gd name="connsiteY17" fmla="*/ 608916 h 933956"/>
-                <a:gd name="connsiteX18" fmla="*/ 436067 w 853976"/>
-                <a:gd name="connsiteY18" fmla="*/ 608916 h 933956"/>
-                <a:gd name="connsiteX19" fmla="*/ 598587 w 853976"/>
-                <a:gd name="connsiteY19" fmla="*/ 608916 h 933956"/>
-                <a:gd name="connsiteX20" fmla="*/ 598587 w 853976"/>
-                <a:gd name="connsiteY20" fmla="*/ 642849 h 933956"/>
-                <a:gd name="connsiteX21" fmla="*/ 473571 w 853976"/>
-                <a:gd name="connsiteY21" fmla="*/ 642849 h 933956"/>
-                <a:gd name="connsiteX22" fmla="*/ 473571 w 853976"/>
-                <a:gd name="connsiteY22" fmla="*/ 749335 h 933956"/>
-                <a:gd name="connsiteX23" fmla="*/ 589211 w 853976"/>
-                <a:gd name="connsiteY23" fmla="*/ 749335 h 933956"/>
-                <a:gd name="connsiteX24" fmla="*/ 589211 w 853976"/>
-                <a:gd name="connsiteY24" fmla="*/ 783045 h 933956"/>
-                <a:gd name="connsiteX25" fmla="*/ 473571 w 853976"/>
-                <a:gd name="connsiteY25" fmla="*/ 783045 h 933956"/>
-                <a:gd name="connsiteX26" fmla="*/ 473571 w 853976"/>
-                <a:gd name="connsiteY26" fmla="*/ 895112 h 933956"/>
-                <a:gd name="connsiteX27" fmla="*/ 605731 w 853976"/>
-                <a:gd name="connsiteY27" fmla="*/ 895112 h 933956"/>
-                <a:gd name="connsiteX28" fmla="*/ 605731 w 853976"/>
-                <a:gd name="connsiteY28" fmla="*/ 929045 h 933956"/>
-                <a:gd name="connsiteX29" fmla="*/ 436067 w 853976"/>
-                <a:gd name="connsiteY29" fmla="*/ 929045 h 933956"/>
-                <a:gd name="connsiteX30" fmla="*/ 436067 w 853976"/>
-                <a:gd name="connsiteY30" fmla="*/ 608916 h 933956"/>
-                <a:gd name="connsiteX31" fmla="*/ 102691 w 853976"/>
-                <a:gd name="connsiteY31" fmla="*/ 608916 h 933956"/>
-                <a:gd name="connsiteX32" fmla="*/ 151359 w 853976"/>
-                <a:gd name="connsiteY32" fmla="*/ 608916 h 933956"/>
-                <a:gd name="connsiteX33" fmla="*/ 311646 w 853976"/>
-                <a:gd name="connsiteY33" fmla="*/ 860063 h 933956"/>
-                <a:gd name="connsiteX34" fmla="*/ 324594 w 853976"/>
-                <a:gd name="connsiteY34" fmla="*/ 881495 h 933956"/>
-                <a:gd name="connsiteX35" fmla="*/ 325487 w 853976"/>
-                <a:gd name="connsiteY35" fmla="*/ 881495 h 933956"/>
-                <a:gd name="connsiteX36" fmla="*/ 323255 w 853976"/>
-                <a:gd name="connsiteY36" fmla="*/ 834390 h 933956"/>
-                <a:gd name="connsiteX37" fmla="*/ 323255 w 853976"/>
-                <a:gd name="connsiteY37" fmla="*/ 608916 h 933956"/>
-                <a:gd name="connsiteX38" fmla="*/ 360760 w 853976"/>
-                <a:gd name="connsiteY38" fmla="*/ 608916 h 933956"/>
-                <a:gd name="connsiteX39" fmla="*/ 360760 w 853976"/>
-                <a:gd name="connsiteY39" fmla="*/ 929045 h 933956"/>
-                <a:gd name="connsiteX40" fmla="*/ 314772 w 853976"/>
-                <a:gd name="connsiteY40" fmla="*/ 929045 h 933956"/>
-                <a:gd name="connsiteX41" fmla="*/ 150019 w 853976"/>
-                <a:gd name="connsiteY41" fmla="*/ 673879 h 933956"/>
-                <a:gd name="connsiteX42" fmla="*/ 139750 w 853976"/>
-                <a:gd name="connsiteY42" fmla="*/ 653788 h 933956"/>
-                <a:gd name="connsiteX43" fmla="*/ 138411 w 853976"/>
-                <a:gd name="connsiteY43" fmla="*/ 653788 h 933956"/>
-                <a:gd name="connsiteX44" fmla="*/ 140196 w 853976"/>
-                <a:gd name="connsiteY44" fmla="*/ 697766 h 933956"/>
-                <a:gd name="connsiteX45" fmla="*/ 140196 w 853976"/>
-                <a:gd name="connsiteY45" fmla="*/ 929045 h 933956"/>
-                <a:gd name="connsiteX46" fmla="*/ 102691 w 853976"/>
-                <a:gd name="connsiteY46" fmla="*/ 929045 h 933956"/>
-                <a:gd name="connsiteX47" fmla="*/ 102691 w 853976"/>
-                <a:gd name="connsiteY47" fmla="*/ 608916 h 933956"/>
-                <a:gd name="connsiteX48" fmla="*/ 116876 w 853976"/>
-                <a:gd name="connsiteY48" fmla="*/ 0 h 933956"/>
-                <a:gd name="connsiteX49" fmla="*/ 389019 w 853976"/>
-                <a:gd name="connsiteY49" fmla="*/ 0 h 933956"/>
-                <a:gd name="connsiteX50" fmla="*/ 389019 w 853976"/>
-                <a:gd name="connsiteY50" fmla="*/ 212602 h 933956"/>
-                <a:gd name="connsiteX51" fmla="*/ 116876 w 853976"/>
-                <a:gd name="connsiteY51" fmla="*/ 0 h 933956"/>
-                <a:gd name="connsiteX0" fmla="*/ 24780 w 853976"/>
-                <a:gd name="connsiteY0" fmla="*/ 883727 h 933956"/>
-                <a:gd name="connsiteX1" fmla="*/ 42639 w 853976"/>
-                <a:gd name="connsiteY1" fmla="*/ 891206 h 933956"/>
-                <a:gd name="connsiteX2" fmla="*/ 50006 w 853976"/>
-                <a:gd name="connsiteY2" fmla="*/ 908953 h 933956"/>
-                <a:gd name="connsiteX3" fmla="*/ 42639 w 853976"/>
-                <a:gd name="connsiteY3" fmla="*/ 926589 h 933956"/>
-                <a:gd name="connsiteX4" fmla="*/ 24780 w 853976"/>
-                <a:gd name="connsiteY4" fmla="*/ 933956 h 933956"/>
-                <a:gd name="connsiteX5" fmla="*/ 7255 w 853976"/>
-                <a:gd name="connsiteY5" fmla="*/ 926589 h 933956"/>
-                <a:gd name="connsiteX6" fmla="*/ 0 w 853976"/>
-                <a:gd name="connsiteY6" fmla="*/ 908953 h 933956"/>
-                <a:gd name="connsiteX7" fmla="*/ 7255 w 853976"/>
-                <a:gd name="connsiteY7" fmla="*/ 891206 h 933956"/>
-                <a:gd name="connsiteX8" fmla="*/ 24780 w 853976"/>
-                <a:gd name="connsiteY8" fmla="*/ 883727 h 933956"/>
-                <a:gd name="connsiteX9" fmla="*/ 631850 w 853976"/>
-                <a:gd name="connsiteY9" fmla="*/ 608916 h 933956"/>
-                <a:gd name="connsiteX10" fmla="*/ 853976 w 853976"/>
-                <a:gd name="connsiteY10" fmla="*/ 608916 h 933956"/>
-                <a:gd name="connsiteX11" fmla="*/ 853976 w 853976"/>
-                <a:gd name="connsiteY11" fmla="*/ 642849 h 933956"/>
-                <a:gd name="connsiteX12" fmla="*/ 761554 w 853976"/>
-                <a:gd name="connsiteY12" fmla="*/ 642849 h 933956"/>
-                <a:gd name="connsiteX13" fmla="*/ 761554 w 853976"/>
-                <a:gd name="connsiteY13" fmla="*/ 929045 h 933956"/>
-                <a:gd name="connsiteX14" fmla="*/ 724049 w 853976"/>
-                <a:gd name="connsiteY14" fmla="*/ 929045 h 933956"/>
-                <a:gd name="connsiteX15" fmla="*/ 724049 w 853976"/>
-                <a:gd name="connsiteY15" fmla="*/ 642849 h 933956"/>
-                <a:gd name="connsiteX16" fmla="*/ 631850 w 853976"/>
-                <a:gd name="connsiteY16" fmla="*/ 642849 h 933956"/>
-                <a:gd name="connsiteX17" fmla="*/ 631850 w 853976"/>
-                <a:gd name="connsiteY17" fmla="*/ 608916 h 933956"/>
-                <a:gd name="connsiteX18" fmla="*/ 436067 w 853976"/>
-                <a:gd name="connsiteY18" fmla="*/ 608916 h 933956"/>
-                <a:gd name="connsiteX19" fmla="*/ 598587 w 853976"/>
-                <a:gd name="connsiteY19" fmla="*/ 608916 h 933956"/>
-                <a:gd name="connsiteX20" fmla="*/ 598587 w 853976"/>
-                <a:gd name="connsiteY20" fmla="*/ 642849 h 933956"/>
-                <a:gd name="connsiteX21" fmla="*/ 473571 w 853976"/>
-                <a:gd name="connsiteY21" fmla="*/ 642849 h 933956"/>
-                <a:gd name="connsiteX22" fmla="*/ 473571 w 853976"/>
-                <a:gd name="connsiteY22" fmla="*/ 749335 h 933956"/>
-                <a:gd name="connsiteX23" fmla="*/ 589211 w 853976"/>
-                <a:gd name="connsiteY23" fmla="*/ 749335 h 933956"/>
-                <a:gd name="connsiteX24" fmla="*/ 589211 w 853976"/>
-                <a:gd name="connsiteY24" fmla="*/ 783045 h 933956"/>
-                <a:gd name="connsiteX25" fmla="*/ 473571 w 853976"/>
-                <a:gd name="connsiteY25" fmla="*/ 783045 h 933956"/>
-                <a:gd name="connsiteX26" fmla="*/ 473571 w 853976"/>
-                <a:gd name="connsiteY26" fmla="*/ 895112 h 933956"/>
-                <a:gd name="connsiteX27" fmla="*/ 605731 w 853976"/>
-                <a:gd name="connsiteY27" fmla="*/ 895112 h 933956"/>
-                <a:gd name="connsiteX28" fmla="*/ 605731 w 853976"/>
-                <a:gd name="connsiteY28" fmla="*/ 929045 h 933956"/>
-                <a:gd name="connsiteX29" fmla="*/ 436067 w 853976"/>
-                <a:gd name="connsiteY29" fmla="*/ 929045 h 933956"/>
-                <a:gd name="connsiteX30" fmla="*/ 436067 w 853976"/>
-                <a:gd name="connsiteY30" fmla="*/ 608916 h 933956"/>
-                <a:gd name="connsiteX31" fmla="*/ 102691 w 853976"/>
-                <a:gd name="connsiteY31" fmla="*/ 608916 h 933956"/>
-                <a:gd name="connsiteX32" fmla="*/ 151359 w 853976"/>
-                <a:gd name="connsiteY32" fmla="*/ 608916 h 933956"/>
-                <a:gd name="connsiteX33" fmla="*/ 311646 w 853976"/>
-                <a:gd name="connsiteY33" fmla="*/ 860063 h 933956"/>
-                <a:gd name="connsiteX34" fmla="*/ 324594 w 853976"/>
-                <a:gd name="connsiteY34" fmla="*/ 881495 h 933956"/>
-                <a:gd name="connsiteX35" fmla="*/ 325487 w 853976"/>
-                <a:gd name="connsiteY35" fmla="*/ 881495 h 933956"/>
-                <a:gd name="connsiteX36" fmla="*/ 323255 w 853976"/>
-                <a:gd name="connsiteY36" fmla="*/ 834390 h 933956"/>
-                <a:gd name="connsiteX37" fmla="*/ 323255 w 853976"/>
-                <a:gd name="connsiteY37" fmla="*/ 608916 h 933956"/>
-                <a:gd name="connsiteX38" fmla="*/ 360760 w 853976"/>
-                <a:gd name="connsiteY38" fmla="*/ 608916 h 933956"/>
-                <a:gd name="connsiteX39" fmla="*/ 360760 w 853976"/>
-                <a:gd name="connsiteY39" fmla="*/ 929045 h 933956"/>
-                <a:gd name="connsiteX40" fmla="*/ 314772 w 853976"/>
-                <a:gd name="connsiteY40" fmla="*/ 929045 h 933956"/>
-                <a:gd name="connsiteX41" fmla="*/ 150019 w 853976"/>
-                <a:gd name="connsiteY41" fmla="*/ 673879 h 933956"/>
-                <a:gd name="connsiteX42" fmla="*/ 139750 w 853976"/>
-                <a:gd name="connsiteY42" fmla="*/ 653788 h 933956"/>
-                <a:gd name="connsiteX43" fmla="*/ 138411 w 853976"/>
-                <a:gd name="connsiteY43" fmla="*/ 653788 h 933956"/>
-                <a:gd name="connsiteX44" fmla="*/ 140196 w 853976"/>
-                <a:gd name="connsiteY44" fmla="*/ 697766 h 933956"/>
-                <a:gd name="connsiteX45" fmla="*/ 140196 w 853976"/>
-                <a:gd name="connsiteY45" fmla="*/ 929045 h 933956"/>
-                <a:gd name="connsiteX46" fmla="*/ 102691 w 853976"/>
-                <a:gd name="connsiteY46" fmla="*/ 929045 h 933956"/>
-                <a:gd name="connsiteX47" fmla="*/ 102691 w 853976"/>
-                <a:gd name="connsiteY47" fmla="*/ 608916 h 933956"/>
-                <a:gd name="connsiteX48" fmla="*/ 116876 w 853976"/>
-                <a:gd name="connsiteY48" fmla="*/ 0 h 933956"/>
-                <a:gd name="connsiteX49" fmla="*/ 389019 w 853976"/>
-                <a:gd name="connsiteY49" fmla="*/ 0 h 933956"/>
-                <a:gd name="connsiteX50" fmla="*/ 116876 w 853976"/>
-                <a:gd name="connsiteY50" fmla="*/ 0 h 933956"/>
-                <a:gd name="connsiteX0" fmla="*/ 24780 w 853976"/>
-                <a:gd name="connsiteY0" fmla="*/ 274811 h 325040"/>
-                <a:gd name="connsiteX1" fmla="*/ 42639 w 853976"/>
-                <a:gd name="connsiteY1" fmla="*/ 282290 h 325040"/>
-                <a:gd name="connsiteX2" fmla="*/ 50006 w 853976"/>
-                <a:gd name="connsiteY2" fmla="*/ 300037 h 325040"/>
-                <a:gd name="connsiteX3" fmla="*/ 42639 w 853976"/>
-                <a:gd name="connsiteY3" fmla="*/ 317673 h 325040"/>
-                <a:gd name="connsiteX4" fmla="*/ 24780 w 853976"/>
-                <a:gd name="connsiteY4" fmla="*/ 325040 h 325040"/>
-                <a:gd name="connsiteX5" fmla="*/ 7255 w 853976"/>
-                <a:gd name="connsiteY5" fmla="*/ 317673 h 325040"/>
-                <a:gd name="connsiteX6" fmla="*/ 0 w 853976"/>
-                <a:gd name="connsiteY6" fmla="*/ 300037 h 325040"/>
-                <a:gd name="connsiteX7" fmla="*/ 7255 w 853976"/>
-                <a:gd name="connsiteY7" fmla="*/ 282290 h 325040"/>
-                <a:gd name="connsiteX8" fmla="*/ 24780 w 853976"/>
-                <a:gd name="connsiteY8" fmla="*/ 274811 h 325040"/>
-                <a:gd name="connsiteX9" fmla="*/ 631850 w 853976"/>
-                <a:gd name="connsiteY9" fmla="*/ 0 h 325040"/>
-                <a:gd name="connsiteX10" fmla="*/ 853976 w 853976"/>
-                <a:gd name="connsiteY10" fmla="*/ 0 h 325040"/>
-                <a:gd name="connsiteX11" fmla="*/ 853976 w 853976"/>
-                <a:gd name="connsiteY11" fmla="*/ 33933 h 325040"/>
-                <a:gd name="connsiteX12" fmla="*/ 761554 w 853976"/>
-                <a:gd name="connsiteY12" fmla="*/ 33933 h 325040"/>
-                <a:gd name="connsiteX13" fmla="*/ 761554 w 853976"/>
-                <a:gd name="connsiteY13" fmla="*/ 320129 h 325040"/>
-                <a:gd name="connsiteX14" fmla="*/ 724049 w 853976"/>
-                <a:gd name="connsiteY14" fmla="*/ 320129 h 325040"/>
-                <a:gd name="connsiteX15" fmla="*/ 724049 w 853976"/>
-                <a:gd name="connsiteY15" fmla="*/ 33933 h 325040"/>
-                <a:gd name="connsiteX16" fmla="*/ 631850 w 853976"/>
-                <a:gd name="connsiteY16" fmla="*/ 33933 h 325040"/>
-                <a:gd name="connsiteX17" fmla="*/ 631850 w 853976"/>
-                <a:gd name="connsiteY17" fmla="*/ 0 h 325040"/>
-                <a:gd name="connsiteX18" fmla="*/ 436067 w 853976"/>
-                <a:gd name="connsiteY18" fmla="*/ 0 h 325040"/>
-                <a:gd name="connsiteX19" fmla="*/ 598587 w 853976"/>
-                <a:gd name="connsiteY19" fmla="*/ 0 h 325040"/>
-                <a:gd name="connsiteX20" fmla="*/ 598587 w 853976"/>
-                <a:gd name="connsiteY20" fmla="*/ 33933 h 325040"/>
-                <a:gd name="connsiteX21" fmla="*/ 473571 w 853976"/>
-                <a:gd name="connsiteY21" fmla="*/ 33933 h 325040"/>
-                <a:gd name="connsiteX22" fmla="*/ 473571 w 853976"/>
-                <a:gd name="connsiteY22" fmla="*/ 140419 h 325040"/>
-                <a:gd name="connsiteX23" fmla="*/ 589211 w 853976"/>
-                <a:gd name="connsiteY23" fmla="*/ 140419 h 325040"/>
-                <a:gd name="connsiteX24" fmla="*/ 589211 w 853976"/>
-                <a:gd name="connsiteY24" fmla="*/ 174129 h 325040"/>
-                <a:gd name="connsiteX25" fmla="*/ 473571 w 853976"/>
-                <a:gd name="connsiteY25" fmla="*/ 174129 h 325040"/>
-                <a:gd name="connsiteX26" fmla="*/ 473571 w 853976"/>
-                <a:gd name="connsiteY26" fmla="*/ 286196 h 325040"/>
-                <a:gd name="connsiteX27" fmla="*/ 605731 w 853976"/>
-                <a:gd name="connsiteY27" fmla="*/ 286196 h 325040"/>
-                <a:gd name="connsiteX28" fmla="*/ 605731 w 853976"/>
-                <a:gd name="connsiteY28" fmla="*/ 320129 h 325040"/>
-                <a:gd name="connsiteX29" fmla="*/ 436067 w 853976"/>
-                <a:gd name="connsiteY29" fmla="*/ 320129 h 325040"/>
-                <a:gd name="connsiteX30" fmla="*/ 436067 w 853976"/>
-                <a:gd name="connsiteY30" fmla="*/ 0 h 325040"/>
-                <a:gd name="connsiteX31" fmla="*/ 102691 w 853976"/>
-                <a:gd name="connsiteY31" fmla="*/ 0 h 325040"/>
-                <a:gd name="connsiteX32" fmla="*/ 151359 w 853976"/>
-                <a:gd name="connsiteY32" fmla="*/ 0 h 325040"/>
-                <a:gd name="connsiteX33" fmla="*/ 311646 w 853976"/>
-                <a:gd name="connsiteY33" fmla="*/ 251147 h 325040"/>
-                <a:gd name="connsiteX34" fmla="*/ 324594 w 853976"/>
-                <a:gd name="connsiteY34" fmla="*/ 272579 h 325040"/>
-                <a:gd name="connsiteX35" fmla="*/ 325487 w 853976"/>
-                <a:gd name="connsiteY35" fmla="*/ 272579 h 325040"/>
-                <a:gd name="connsiteX36" fmla="*/ 323255 w 853976"/>
-                <a:gd name="connsiteY36" fmla="*/ 225474 h 325040"/>
-                <a:gd name="connsiteX37" fmla="*/ 323255 w 853976"/>
-                <a:gd name="connsiteY37" fmla="*/ 0 h 325040"/>
-                <a:gd name="connsiteX38" fmla="*/ 360760 w 853976"/>
-                <a:gd name="connsiteY38" fmla="*/ 0 h 325040"/>
-                <a:gd name="connsiteX39" fmla="*/ 360760 w 853976"/>
-                <a:gd name="connsiteY39" fmla="*/ 320129 h 325040"/>
-                <a:gd name="connsiteX40" fmla="*/ 314772 w 853976"/>
-                <a:gd name="connsiteY40" fmla="*/ 320129 h 325040"/>
-                <a:gd name="connsiteX41" fmla="*/ 150019 w 853976"/>
-                <a:gd name="connsiteY41" fmla="*/ 64963 h 325040"/>
-                <a:gd name="connsiteX42" fmla="*/ 139750 w 853976"/>
-                <a:gd name="connsiteY42" fmla="*/ 44872 h 325040"/>
-                <a:gd name="connsiteX43" fmla="*/ 138411 w 853976"/>
-                <a:gd name="connsiteY43" fmla="*/ 44872 h 325040"/>
-                <a:gd name="connsiteX44" fmla="*/ 140196 w 853976"/>
-                <a:gd name="connsiteY44" fmla="*/ 88850 h 325040"/>
-                <a:gd name="connsiteX45" fmla="*/ 140196 w 853976"/>
-                <a:gd name="connsiteY45" fmla="*/ 320129 h 325040"/>
-                <a:gd name="connsiteX46" fmla="*/ 102691 w 853976"/>
-                <a:gd name="connsiteY46" fmla="*/ 320129 h 325040"/>
-                <a:gd name="connsiteX47" fmla="*/ 102691 w 853976"/>
-                <a:gd name="connsiteY47" fmla="*/ 0 h 325040"/>
-              </a:gdLst>
-              <a:ahLst/>
-              <a:cxnLst>
-                <a:cxn ang="0">
-                  <a:pos x="connsiteX0" y="connsiteY0"/>
-                </a:cxn>
-                <a:cxn ang="0">
-                  <a:pos x="connsiteX1" y="connsiteY1"/>
-                </a:cxn>
-                <a:cxn ang="0">
-                  <a:pos x="connsiteX2" y="connsiteY2"/>
-                </a:cxn>
-                <a:cxn ang="0">
-                  <a:pos x="connsiteX3" y="connsiteY3"/>
-                </a:cxn>
-                <a:cxn ang="0">
-                  <a:pos x="connsiteX4" y="connsiteY4"/>
-                </a:cxn>
-                <a:cxn ang="0">
-                  <a:pos x="connsiteX5" y="connsiteY5"/>
-                </a:cxn>
-                <a:cxn ang="0">
-                  <a:pos x="connsiteX6" y="connsiteY6"/>
-                </a:cxn>
-                <a:cxn ang="0">
-                  <a:pos x="connsiteX7" y="connsiteY7"/>
-                </a:cxn>
-                <a:cxn ang="0">
-                  <a:pos x="connsiteX8" y="connsiteY8"/>
-                </a:cxn>
-                <a:cxn ang="0">
-                  <a:pos x="connsiteX9" y="connsiteY9"/>
-                </a:cxn>
-                <a:cxn ang="0">
-                  <a:pos x="connsiteX10" y="connsiteY10"/>
-                </a:cxn>
-                <a:cxn ang="0">
-                  <a:pos x="connsiteX11" y="connsiteY11"/>
-                </a:cxn>
-                <a:cxn ang="0">
-                  <a:pos x="connsiteX12" y="connsiteY12"/>
-                </a:cxn>
-                <a:cxn ang="0">
-                  <a:pos x="connsiteX13" y="connsiteY13"/>
-                </a:cxn>
-                <a:cxn ang="0">
-                  <a:pos x="connsiteX14" y="connsiteY14"/>
-                </a:cxn>
-                <a:cxn ang="0">
-                  <a:pos x="connsiteX15" y="connsiteY15"/>
-                </a:cxn>
-                <a:cxn ang="0">
-                  <a:pos x="connsiteX16" y="connsiteY16"/>
-                </a:cxn>
-                <a:cxn ang="0">
-                  <a:pos x="connsiteX17" y="connsiteY17"/>
-                </a:cxn>
-                <a:cxn ang="0">
-                  <a:pos x="connsiteX18" y="connsiteY18"/>
-                </a:cxn>
-                <a:cxn ang="0">
-                  <a:pos x="connsiteX19" y="connsiteY19"/>
-                </a:cxn>
-                <a:cxn ang="0">
-                  <a:pos x="connsiteX20" y="connsiteY20"/>
-                </a:cxn>
-                <a:cxn ang="0">
-                  <a:pos x="connsiteX21" y="connsiteY21"/>
-                </a:cxn>
-                <a:cxn ang="0">
-                  <a:pos x="connsiteX22" y="connsiteY22"/>
-                </a:cxn>
-                <a:cxn ang="0">
-                  <a:pos x="connsiteX23" y="connsiteY23"/>
-                </a:cxn>
-                <a:cxn ang="0">
-                  <a:pos x="connsiteX24" y="connsiteY24"/>
-                </a:cxn>
-                <a:cxn ang="0">
-                  <a:pos x="connsiteX25" y="connsiteY25"/>
-                </a:cxn>
-                <a:cxn ang="0">
-                  <a:pos x="connsiteX26" y="connsiteY26"/>
-                </a:cxn>
-                <a:cxn ang="0">
-                  <a:pos x="connsiteX27" y="connsiteY27"/>
-                </a:cxn>
-                <a:cxn ang="0">
-                  <a:pos x="connsiteX28" y="connsiteY28"/>
-                </a:cxn>
-                <a:cxn ang="0">
-                  <a:pos x="connsiteX29" y="connsiteY29"/>
-                </a:cxn>
-                <a:cxn ang="0">
-                  <a:pos x="connsiteX30" y="connsiteY30"/>
-                </a:cxn>
-                <a:cxn ang="0">
-                  <a:pos x="connsiteX31" y="connsiteY31"/>
-                </a:cxn>
-                <a:cxn ang="0">
-                  <a:pos x="connsiteX32" y="connsiteY32"/>
-                </a:cxn>
-                <a:cxn ang="0">
-                  <a:pos x="connsiteX33" y="connsiteY33"/>
-                </a:cxn>
-                <a:cxn ang="0">
-                  <a:pos x="connsiteX34" y="connsiteY34"/>
-                </a:cxn>
-                <a:cxn ang="0">
-                  <a:pos x="connsiteX35" y="connsiteY35"/>
-                </a:cxn>
-                <a:cxn ang="0">
-                  <a:pos x="connsiteX36" y="connsiteY36"/>
-                </a:cxn>
-                <a:cxn ang="0">
-                  <a:pos x="connsiteX37" y="connsiteY37"/>
-                </a:cxn>
-                <a:cxn ang="0">
-                  <a:pos x="connsiteX38" y="connsiteY38"/>
-                </a:cxn>
-                <a:cxn ang="0">
-                  <a:pos x="connsiteX39" y="connsiteY39"/>
-                </a:cxn>
-                <a:cxn ang="0">
-                  <a:pos x="connsiteX40" y="connsiteY40"/>
-                </a:cxn>
-                <a:cxn ang="0">
-                  <a:pos x="connsiteX41" y="connsiteY41"/>
-                </a:cxn>
-                <a:cxn ang="0">
-                  <a:pos x="connsiteX42" y="connsiteY42"/>
-                </a:cxn>
-                <a:cxn ang="0">
-                  <a:pos x="connsiteX43" y="connsiteY43"/>
-                </a:cxn>
-                <a:cxn ang="0">
-                  <a:pos x="connsiteX44" y="connsiteY44"/>
-                </a:cxn>
-                <a:cxn ang="0">
-                  <a:pos x="connsiteX45" y="connsiteY45"/>
-                </a:cxn>
-                <a:cxn ang="0">
-                  <a:pos x="connsiteX46" y="connsiteY46"/>
-                </a:cxn>
-                <a:cxn ang="0">
-                  <a:pos x="connsiteX47" y="connsiteY47"/>
-                </a:cxn>
-              </a:cxnLst>
-              <a:rect l="l" t="t" r="r" b="b"/>
-              <a:pathLst>
-                <a:path w="853976" h="325040">
-                  <a:moveTo>
-                    <a:pt x="24780" y="274811"/>
-                  </a:moveTo>
-                  <a:cubicBezTo>
-                    <a:pt x="31775" y="274811"/>
-                    <a:pt x="37728" y="277304"/>
-                    <a:pt x="42639" y="282290"/>
-                  </a:cubicBezTo>
-                  <a:cubicBezTo>
-                    <a:pt x="47550" y="287275"/>
-                    <a:pt x="50006" y="293191"/>
-                    <a:pt x="50006" y="300037"/>
-                  </a:cubicBezTo>
-                  <a:cubicBezTo>
-                    <a:pt x="50006" y="306883"/>
-                    <a:pt x="47550" y="312762"/>
-                    <a:pt x="42639" y="317673"/>
-                  </a:cubicBezTo>
-                  <a:cubicBezTo>
-                    <a:pt x="37728" y="322585"/>
-                    <a:pt x="31775" y="325040"/>
-                    <a:pt x="24780" y="325040"/>
-                  </a:cubicBezTo>
-                  <a:cubicBezTo>
-                    <a:pt x="17934" y="325040"/>
-                    <a:pt x="12092" y="322585"/>
-                    <a:pt x="7255" y="317673"/>
-                  </a:cubicBezTo>
-                  <a:cubicBezTo>
-                    <a:pt x="2418" y="312762"/>
-                    <a:pt x="0" y="306883"/>
-                    <a:pt x="0" y="300037"/>
-                  </a:cubicBezTo>
-                  <a:cubicBezTo>
-                    <a:pt x="0" y="293191"/>
-                    <a:pt x="2418" y="287275"/>
-                    <a:pt x="7255" y="282290"/>
-                  </a:cubicBezTo>
-                  <a:cubicBezTo>
-                    <a:pt x="12092" y="277304"/>
-                    <a:pt x="17934" y="274811"/>
-                    <a:pt x="24780" y="274811"/>
-                  </a:cubicBezTo>
-                  <a:close/>
-                  <a:moveTo>
-                    <a:pt x="631850" y="0"/>
-                  </a:moveTo>
-                  <a:lnTo>
-                    <a:pt x="853976" y="0"/>
-                  </a:lnTo>
-                  <a:lnTo>
-                    <a:pt x="853976" y="33933"/>
-                  </a:lnTo>
-                  <a:lnTo>
-                    <a:pt x="761554" y="33933"/>
-                  </a:lnTo>
-                  <a:lnTo>
-                    <a:pt x="761554" y="320129"/>
-                  </a:lnTo>
-                  <a:lnTo>
-                    <a:pt x="724049" y="320129"/>
-                  </a:lnTo>
-                  <a:lnTo>
-                    <a:pt x="724049" y="33933"/>
-                  </a:lnTo>
-                  <a:lnTo>
-                    <a:pt x="631850" y="33933"/>
-                  </a:lnTo>
-                  <a:lnTo>
-                    <a:pt x="631850" y="0"/>
-                  </a:lnTo>
-                  <a:close/>
-                  <a:moveTo>
-                    <a:pt x="436067" y="0"/>
-                  </a:moveTo>
-                  <a:lnTo>
-                    <a:pt x="598587" y="0"/>
-                  </a:lnTo>
-                  <a:lnTo>
-                    <a:pt x="598587" y="33933"/>
-                  </a:lnTo>
-                  <a:lnTo>
-                    <a:pt x="473571" y="33933"/>
-                  </a:lnTo>
-                  <a:lnTo>
-                    <a:pt x="473571" y="140419"/>
-                  </a:lnTo>
-                  <a:lnTo>
-                    <a:pt x="589211" y="140419"/>
-                  </a:lnTo>
-                  <a:lnTo>
-                    <a:pt x="589211" y="174129"/>
-                  </a:lnTo>
-                  <a:lnTo>
-                    <a:pt x="473571" y="174129"/>
-                  </a:lnTo>
-                  <a:lnTo>
-                    <a:pt x="473571" y="286196"/>
-                  </a:lnTo>
-                  <a:lnTo>
-                    <a:pt x="605731" y="286196"/>
-                  </a:lnTo>
-                  <a:lnTo>
-                    <a:pt x="605731" y="320129"/>
-                  </a:lnTo>
-                  <a:lnTo>
-                    <a:pt x="436067" y="320129"/>
-                  </a:lnTo>
-                  <a:lnTo>
-                    <a:pt x="436067" y="0"/>
-                  </a:lnTo>
-                  <a:close/>
-                  <a:moveTo>
-                    <a:pt x="102691" y="0"/>
-                  </a:moveTo>
-                  <a:lnTo>
-                    <a:pt x="151359" y="0"/>
-                  </a:lnTo>
-                  <a:lnTo>
-                    <a:pt x="311646" y="251147"/>
-                  </a:lnTo>
-                  <a:cubicBezTo>
-                    <a:pt x="318344" y="261565"/>
-                    <a:pt x="322660" y="268709"/>
-                    <a:pt x="324594" y="272579"/>
-                  </a:cubicBezTo>
-                  <a:lnTo>
-                    <a:pt x="325487" y="272579"/>
-                  </a:lnTo>
-                  <a:cubicBezTo>
-                    <a:pt x="323999" y="263351"/>
-                    <a:pt x="323255" y="247650"/>
-                    <a:pt x="323255" y="225474"/>
-                  </a:cubicBezTo>
-                  <a:lnTo>
-                    <a:pt x="323255" y="0"/>
-                  </a:lnTo>
-                  <a:lnTo>
-                    <a:pt x="360760" y="0"/>
-                  </a:lnTo>
-                  <a:lnTo>
-                    <a:pt x="360760" y="320129"/>
-                  </a:lnTo>
-                  <a:lnTo>
-                    <a:pt x="314772" y="320129"/>
-                  </a:lnTo>
-                  <a:lnTo>
-                    <a:pt x="150019" y="64963"/>
-                  </a:lnTo>
-                  <a:cubicBezTo>
-                    <a:pt x="145852" y="58564"/>
-                    <a:pt x="142429" y="51866"/>
-                    <a:pt x="139750" y="44872"/>
-                  </a:cubicBezTo>
-                  <a:lnTo>
-                    <a:pt x="138411" y="44872"/>
-                  </a:lnTo>
-                  <a:cubicBezTo>
-                    <a:pt x="139601" y="51718"/>
-                    <a:pt x="140196" y="66377"/>
-                    <a:pt x="140196" y="88850"/>
-                  </a:cubicBezTo>
-                  <a:lnTo>
-                    <a:pt x="140196" y="320129"/>
-                  </a:lnTo>
-                  <a:lnTo>
-                    <a:pt x="102691" y="320129"/>
-                  </a:lnTo>
-                  <a:lnTo>
-                    <a:pt x="102691" y="0"/>
-                  </a:lnTo>
-                  <a:close/>
-                </a:path>
-              </a:pathLst>
-            </a:custGeom>
-            <a:solidFill>
-              <a:schemeClr val="bg1"/>
-            </a:solidFill>
-            <a:ln>
-              <a:noFill/>
-              <a:headEnd type="none" w="med" len="med"/>
-              <a:tailEnd type="none" w="med" len="med"/>
-            </a:ln>
-            <a:effectLst/>
-          </p:spPr>
-          <p:style>
-            <a:lnRef idx="1">
-              <a:schemeClr val="accent2"/>
-            </a:lnRef>
-            <a:fillRef idx="3">
-              <a:schemeClr val="accent2"/>
-            </a:fillRef>
-            <a:effectRef idx="2">
-              <a:schemeClr val="accent2"/>
-            </a:effectRef>
-            <a:fontRef idx="minor">
-              <a:schemeClr val="lt1"/>
-            </a:fontRef>
-          </p:style>
-          <p:txBody>
-            <a:bodyPr rot="0" spcFirstLastPara="0" vertOverflow="overflow" horzOverflow="overflow" vert="horz" wrap="square" lIns="182880" tIns="146304" rIns="182880" bIns="146304" numCol="1" spcCol="0" rtlCol="0" fromWordArt="0" anchor="t" anchorCtr="0" forceAA="0" compatLnSpc="1">
-              <a:prstTxWarp prst="textNoShape">
-                <a:avLst/>
-              </a:prstTxWarp>
-              <a:noAutofit/>
-            </a:bodyPr>
-            <a:lstStyle/>
-            <a:p>
-              <a:pPr algn="ctr" defTabSz="932472" fontAlgn="base">
-                <a:lnSpc>
-                  <a:spcPct val="90000"/>
-                </a:lnSpc>
-                <a:spcBef>
-                  <a:spcPct val="0"/>
-                </a:spcBef>
-                <a:spcAft>
-                  <a:spcPct val="0"/>
-                </a:spcAft>
-              </a:pPr>
-              <a:endParaRPr lang="en-US" sz="2400" dirty="0">
-                <a:gradFill>
-                  <a:gsLst>
-                    <a:gs pos="0">
-                      <a:srgbClr val="FFFFFF"/>
-                    </a:gs>
-                    <a:gs pos="100000">
-                      <a:srgbClr val="FFFFFF"/>
-                    </a:gs>
-                  </a:gsLst>
-                  <a:lin ang="5400000" scaled="0"/>
-                </a:gradFill>
-                <a:ea typeface="Segoe UI" pitchFamily="34" charset="0"/>
-                <a:cs typeface="Arial" panose="020B0604020202020204" pitchFamily="34" charset="0"/>
-              </a:endParaRPr>
-            </a:p>
-          </p:txBody>
-        </p:sp>
-      </p:grpSp>
       <p:sp>
         <p:nvSpPr>
           <p:cNvPr id="11" name="Title 1">
@@ -8565,7 +8859,7 @@
         </p:nvSpPr>
         <p:spPr>
           <a:xfrm>
-            <a:off x="1407161" y="0"/>
+            <a:off x="481262" y="0"/>
             <a:ext cx="10515600" cy="1325563"/>
           </a:xfrm>
           <a:prstGeom prst="rect">
@@ -8601,7 +8895,7 @@
                 <a:latin typeface="Arial" panose="020B0604020202020204" pitchFamily="34" charset="0"/>
                 <a:cs typeface="Arial" panose="020B0604020202020204" pitchFamily="34" charset="0"/>
               </a:rPr>
-              <a:t>Azure Cosmos DB Change Feed FAQ</a:t>
+              <a:t>Azure Cosmos DB Change Feed Summary</a:t>
             </a:r>
           </a:p>
         </p:txBody>
@@ -8622,8 +8916,8 @@
         </p:nvSpPr>
         <p:spPr>
           <a:xfrm>
-            <a:off x="481262" y="1720515"/>
-            <a:ext cx="10241385" cy="2889156"/>
+            <a:off x="481262" y="1720514"/>
+            <a:ext cx="10984833" cy="3705727"/>
           </a:xfrm>
           <a:prstGeom prst="rect">
             <a:avLst/>
@@ -8840,7 +9134,7 @@
           <a:p>
             <a:r>
               <a:rPr lang="en-US" sz="2400" dirty="0"/>
-              <a:t>Automatically enabled in any Cosmos DB database account.</a:t>
+              <a:t>Automatically enabled in any Cosmos DB database account</a:t>
             </a:r>
           </a:p>
           <a:p>
@@ -8882,12 +9176,17 @@
             </a:r>
             <a:r>
               <a:rPr lang="en-US" sz="2400" dirty="0"/>
-              <a:t>. Delete support can be implemented with a flag</a:t>
-            </a:r>
-            <a:r>
-              <a:rPr lang="en-US" dirty="0"/>
-              <a:t>.</a:t>
-            </a:r>
+              <a:t>. Delete support can be implemented by creating a property called </a:t>
+            </a:r>
+            <a:r>
+              <a:rPr lang="en-US" sz="2400" dirty="0" err="1"/>
+              <a:t>isDeleted</a:t>
+            </a:r>
+            <a:r>
+              <a:rPr lang="en-US" sz="2400" dirty="0"/>
+              <a:t> (or similar), modifying this property (to act as an update), and then setting a TTL on the document to delete it.</a:t>
+            </a:r>
+            <a:endParaRPr lang="en-US" dirty="0"/>
           </a:p>
           <a:p>
             <a:pPr marL="571500" indent="-571500">
@@ -8956,7 +9255,7 @@
         </p:nvSpPr>
         <p:spPr>
           <a:xfrm>
-            <a:off x="838200" y="146640"/>
+            <a:off x="838199" y="86482"/>
             <a:ext cx="10515600" cy="1325563"/>
           </a:xfrm>
         </p:spPr>
@@ -9094,12 +9393,50 @@
           <a:chExt cx="0" cy="0"/>
         </a:xfrm>
       </p:grpSpPr>
+      <p:sp>
+        <p:nvSpPr>
+          <p:cNvPr id="7" name="Title 16">
+            <a:extLst>
+              <a:ext uri="{FF2B5EF4-FFF2-40B4-BE49-F238E27FC236}">
+                <a16:creationId xmlns:a16="http://schemas.microsoft.com/office/drawing/2014/main" id="{EF8C58CB-E0F1-418D-8711-93DFA38C64B4}"/>
+              </a:ext>
+            </a:extLst>
+          </p:cNvPr>
+          <p:cNvSpPr>
+            <a:spLocks noGrp="1"/>
+          </p:cNvSpPr>
+          <p:nvPr>
+            <p:ph type="title"/>
+          </p:nvPr>
+        </p:nvSpPr>
+        <p:spPr>
+          <a:xfrm>
+            <a:off x="838200" y="146640"/>
+            <a:ext cx="10515600" cy="1325563"/>
+          </a:xfrm>
+        </p:spPr>
+        <p:txBody>
+          <a:bodyPr>
+            <a:normAutofit/>
+          </a:bodyPr>
+          <a:lstStyle/>
+          <a:p>
+            <a:r>
+              <a:rPr lang="en-US" sz="4000" dirty="0">
+                <a:latin typeface="Arial" panose="020B0604020202020204" pitchFamily="34" charset="0"/>
+                <a:cs typeface="Arial" panose="020B0604020202020204" pitchFamily="34" charset="0"/>
+              </a:rPr>
+              <a:t>Common Change Feed Scenarios</a:t>
+            </a:r>
+          </a:p>
+        </p:txBody>
+      </p:sp>
       <p:pic>
         <p:nvPicPr>
-          <p:cNvPr id="4" name="Picture 3">
+          <p:cNvPr id="5" name="Picture 4">
             <a:extLst>
               <a:ext uri="{FF2B5EF4-FFF2-40B4-BE49-F238E27FC236}">
-                <a16:creationId xmlns:a16="http://schemas.microsoft.com/office/drawing/2014/main" id="{D8C1689B-3C73-4123-B336-FFD938EEEFE9}"/>
+                <a16:creationId xmlns:a16="http://schemas.microsoft.com/office/drawing/2014/main" id="{73734A0D-87B4-4EBE-9E8B-C5FD41B40C22}"/>
               </a:ext>
             </a:extLst>
           </p:cNvPr>
@@ -9109,15 +9446,15 @@
           <p:nvPr/>
         </p:nvPicPr>
         <p:blipFill>
-          <a:blip r:embed="rId3"/>
+          <a:blip r:embed="rId2"/>
           <a:stretch>
             <a:fillRect/>
           </a:stretch>
         </p:blipFill>
         <p:spPr>
           <a:xfrm>
-            <a:off x="418643" y="142110"/>
-            <a:ext cx="11354714" cy="6358917"/>
+            <a:off x="1617016" y="1592629"/>
+            <a:ext cx="8957968" cy="5016681"/>
           </a:xfrm>
           <a:prstGeom prst="rect">
             <a:avLst/>
@@ -9130,7 +9467,7 @@
     </p:spTree>
     <p:extLst>
       <p:ext uri="{BB962C8B-B14F-4D97-AF65-F5344CB8AC3E}">
-        <p14:creationId xmlns:p14="http://schemas.microsoft.com/office/powerpoint/2010/main" val="1766005108"/>
+        <p14:creationId xmlns:p14="http://schemas.microsoft.com/office/powerpoint/2010/main" val="3774207067"/>
       </p:ext>
     </p:extLst>
   </p:cSld>
@@ -10230,7 +10567,7 @@
                 <a:latin typeface="Arial" panose="020B0604020202020204" pitchFamily="34" charset="0"/>
                 <a:cs typeface="Arial" panose="020B0604020202020204" pitchFamily="34" charset="0"/>
               </a:rPr>
-              <a:t>Retail Order Processing Pipelines</a:t>
+              <a:t>1. Retail Order Processing Pipelines</a:t>
             </a:r>
           </a:p>
         </p:txBody>
@@ -11280,7 +11617,7 @@
                 <a:latin typeface="Arial" panose="020B0604020202020204" pitchFamily="34" charset="0"/>
                 <a:cs typeface="Arial" panose="020B0604020202020204" pitchFamily="34" charset="0"/>
               </a:rPr>
-              <a:t>Common Scenarios </a:t>
+              <a:t>2. Real-time data movement</a:t>
             </a:r>
           </a:p>
         </p:txBody>
@@ -12784,17 +13121,297 @@
                 <a:latin typeface="Arial" panose="020B0604020202020204" pitchFamily="34" charset="0"/>
                 <a:cs typeface="Arial" panose="020B0604020202020204" pitchFamily="34" charset="0"/>
               </a:rPr>
-              <a:t>Common Scenarios </a:t>
+              <a:t>2. Real-time data movement </a:t>
             </a:r>
           </a:p>
         </p:txBody>
       </p:sp>
       <p:sp>
         <p:nvSpPr>
-          <p:cNvPr id="35" name="Text Placeholder 2">
+          <p:cNvPr id="35" name="TextBox 34">
             <a:extLst>
               <a:ext uri="{FF2B5EF4-FFF2-40B4-BE49-F238E27FC236}">
-                <a16:creationId xmlns:a16="http://schemas.microsoft.com/office/drawing/2014/main" id="{6B632669-9B5A-4583-BBE8-0DF5999C9A61}"/>
+                <a16:creationId xmlns:a16="http://schemas.microsoft.com/office/drawing/2014/main" id="{2268FEE3-9F39-4A9B-AD32-41F6B934B144}"/>
+              </a:ext>
+            </a:extLst>
+          </p:cNvPr>
+          <p:cNvSpPr txBox="1"/>
+          <p:nvPr/>
+        </p:nvSpPr>
+        <p:spPr>
+          <a:xfrm>
+            <a:off x="269240" y="1733844"/>
+            <a:ext cx="11655840" cy="4987482"/>
+          </a:xfrm>
+          <a:prstGeom prst="rect">
+            <a:avLst/>
+          </a:prstGeom>
+          <a:noFill/>
+        </p:spPr>
+        <p:txBody>
+          <a:bodyPr wrap="square" lIns="179285" tIns="143428" rIns="179285" bIns="143428" rtlCol="0">
+            <a:spAutoFit/>
+          </a:bodyPr>
+          <a:lstStyle/>
+          <a:p>
+            <a:pPr defTabSz="914367">
+              <a:lnSpc>
+                <a:spcPct val="90000"/>
+              </a:lnSpc>
+              <a:spcAft>
+                <a:spcPts val="588"/>
+              </a:spcAft>
+            </a:pPr>
+            <a:r>
+              <a:rPr lang="en-US" sz="2353" b="1" dirty="0">
+                <a:gradFill>
+                  <a:gsLst>
+                    <a:gs pos="2917">
+                      <a:srgbClr val="353535"/>
+                    </a:gs>
+                    <a:gs pos="30000">
+                      <a:srgbClr val="353535"/>
+                    </a:gs>
+                  </a:gsLst>
+                  <a:lin ang="5400000" scaled="0"/>
+                </a:gradFill>
+                <a:latin typeface="Arial" panose="020B0604020202020204" pitchFamily="34" charset="0"/>
+              </a:rPr>
+              <a:t>This is useful for:</a:t>
+            </a:r>
+          </a:p>
+          <a:p>
+            <a:pPr marL="342900" indent="-342900" defTabSz="914367">
+              <a:lnSpc>
+                <a:spcPct val="90000"/>
+              </a:lnSpc>
+              <a:spcAft>
+                <a:spcPts val="588"/>
+              </a:spcAft>
+              <a:buFont typeface="Arial" panose="020B0604020202020204" pitchFamily="34" charset="0"/>
+              <a:buChar char="•"/>
+            </a:pPr>
+            <a:r>
+              <a:rPr lang="en-US" sz="2353" dirty="0">
+                <a:gradFill>
+                  <a:gsLst>
+                    <a:gs pos="2917">
+                      <a:srgbClr val="353535"/>
+                    </a:gs>
+                    <a:gs pos="30000">
+                      <a:srgbClr val="353535"/>
+                    </a:gs>
+                  </a:gsLst>
+                  <a:lin ang="5400000" scaled="0"/>
+                </a:gradFill>
+                <a:latin typeface="Arial" panose="020B0604020202020204" pitchFamily="34" charset="0"/>
+              </a:rPr>
+              <a:t>Performing a live migration from one Cosmos container to another</a:t>
+            </a:r>
+          </a:p>
+          <a:p>
+            <a:pPr marL="800100" lvl="1" indent="-342900" defTabSz="914367">
+              <a:lnSpc>
+                <a:spcPct val="90000"/>
+              </a:lnSpc>
+              <a:spcAft>
+                <a:spcPts val="588"/>
+              </a:spcAft>
+              <a:buFont typeface="Arial" panose="020B0604020202020204" pitchFamily="34" charset="0"/>
+              <a:buChar char="•"/>
+            </a:pPr>
+            <a:r>
+              <a:rPr lang="en-US" sz="2353" i="1" dirty="0">
+                <a:gradFill>
+                  <a:gsLst>
+                    <a:gs pos="2917">
+                      <a:srgbClr val="353535"/>
+                    </a:gs>
+                    <a:gs pos="30000">
+                      <a:srgbClr val="353535"/>
+                    </a:gs>
+                  </a:gsLst>
+                  <a:lin ang="5400000" scaled="0"/>
+                </a:gradFill>
+                <a:latin typeface="Arial" panose="020B0604020202020204" pitchFamily="34" charset="0"/>
+              </a:rPr>
+              <a:t>For example, to a container with a different partition key</a:t>
+            </a:r>
+            <a:r>
+              <a:rPr lang="en-US" sz="2353" dirty="0">
+                <a:gradFill>
+                  <a:gsLst>
+                    <a:gs pos="2917">
+                      <a:srgbClr val="353535"/>
+                    </a:gs>
+                    <a:gs pos="30000">
+                      <a:srgbClr val="353535"/>
+                    </a:gs>
+                  </a:gsLst>
+                  <a:lin ang="5400000" scaled="0"/>
+                </a:gradFill>
+                <a:latin typeface="Arial" panose="020B0604020202020204" pitchFamily="34" charset="0"/>
+              </a:rPr>
+              <a:t> </a:t>
+            </a:r>
+          </a:p>
+          <a:p>
+            <a:pPr marL="342900" indent="-342900" defTabSz="914367">
+              <a:lnSpc>
+                <a:spcPct val="90000"/>
+              </a:lnSpc>
+              <a:spcAft>
+                <a:spcPts val="588"/>
+              </a:spcAft>
+              <a:buFont typeface="Arial" panose="020B0604020202020204" pitchFamily="34" charset="0"/>
+              <a:buChar char="•"/>
+            </a:pPr>
+            <a:r>
+              <a:rPr lang="en-US" sz="2353" dirty="0">
+                <a:gradFill>
+                  <a:gsLst>
+                    <a:gs pos="2917">
+                      <a:srgbClr val="353535"/>
+                    </a:gs>
+                    <a:gs pos="30000">
+                      <a:srgbClr val="353535"/>
+                    </a:gs>
+                  </a:gsLst>
+                  <a:lin ang="5400000" scaled="0"/>
+                </a:gradFill>
+                <a:latin typeface="Arial" panose="020B0604020202020204" pitchFamily="34" charset="0"/>
+              </a:rPr>
+              <a:t>Replicating data to another collection optimize for different read operations</a:t>
+            </a:r>
+          </a:p>
+          <a:p>
+            <a:pPr marL="800100" lvl="1" indent="-342900" defTabSz="914367">
+              <a:lnSpc>
+                <a:spcPct val="90000"/>
+              </a:lnSpc>
+              <a:spcAft>
+                <a:spcPts val="588"/>
+              </a:spcAft>
+              <a:buFont typeface="Arial" panose="020B0604020202020204" pitchFamily="34" charset="0"/>
+              <a:buChar char="•"/>
+            </a:pPr>
+            <a:r>
+              <a:rPr lang="en-US" sz="2353" i="1" dirty="0">
+                <a:gradFill>
+                  <a:gsLst>
+                    <a:gs pos="2917">
+                      <a:srgbClr val="353535"/>
+                    </a:gs>
+                    <a:gs pos="30000">
+                      <a:srgbClr val="353535"/>
+                    </a:gs>
+                  </a:gsLst>
+                  <a:lin ang="5400000" scaled="0"/>
+                </a:gradFill>
+                <a:latin typeface="Arial" panose="020B0604020202020204" pitchFamily="34" charset="0"/>
+              </a:rPr>
+              <a:t>For read-heavy workloads, sometimes it makes sense to replicate the same data two or more times (with different schema or different partition keys) to optimize for different read operation</a:t>
+            </a:r>
+          </a:p>
+          <a:p>
+            <a:pPr marL="342900" indent="-342900" defTabSz="914367">
+              <a:lnSpc>
+                <a:spcPct val="90000"/>
+              </a:lnSpc>
+              <a:spcAft>
+                <a:spcPts val="588"/>
+              </a:spcAft>
+              <a:buFont typeface="Arial" panose="020B0604020202020204" pitchFamily="34" charset="0"/>
+              <a:buChar char="•"/>
+            </a:pPr>
+            <a:r>
+              <a:rPr lang="en-US" sz="2353" dirty="0">
+                <a:gradFill>
+                  <a:gsLst>
+                    <a:gs pos="2917">
+                      <a:srgbClr val="353535"/>
+                    </a:gs>
+                    <a:gs pos="30000">
+                      <a:srgbClr val="353535"/>
+                    </a:gs>
+                  </a:gsLst>
+                  <a:lin ang="5400000" scaled="0"/>
+                </a:gradFill>
+                <a:latin typeface="Arial" panose="020B0604020202020204" pitchFamily="34" charset="0"/>
+              </a:rPr>
+              <a:t>Replicating data to another type of storage (colder storage with less-rich query capabilities such as Azure Blob Storage)</a:t>
+            </a:r>
+          </a:p>
+          <a:p>
+            <a:pPr marL="800100" lvl="1" indent="-342900" defTabSz="914367">
+              <a:lnSpc>
+                <a:spcPct val="90000"/>
+              </a:lnSpc>
+              <a:spcAft>
+                <a:spcPts val="588"/>
+              </a:spcAft>
+              <a:buFont typeface="Arial" panose="020B0604020202020204" pitchFamily="34" charset="0"/>
+              <a:buChar char="•"/>
+            </a:pPr>
+            <a:r>
+              <a:rPr lang="en-US" sz="2353" i="1" dirty="0">
+                <a:gradFill>
+                  <a:gsLst>
+                    <a:gs pos="2917">
+                      <a:srgbClr val="353535"/>
+                    </a:gs>
+                    <a:gs pos="30000">
+                      <a:srgbClr val="353535"/>
+                    </a:gs>
+                  </a:gsLst>
+                  <a:lin ang="5400000" scaled="0"/>
+                </a:gradFill>
+                <a:latin typeface="Arial" panose="020B0604020202020204" pitchFamily="34" charset="0"/>
+              </a:rPr>
+              <a:t>You can ingest data directly into Azure Cosmos DB and keep another data source synchronized. Then, you can set a TTL (time-to-live) on your Cosmos containers to have documents automatically deleted from Cosmos DB when the data is no longer “hot” and heavily accessed.</a:t>
+            </a:r>
+          </a:p>
+        </p:txBody>
+      </p:sp>
+    </p:spTree>
+    <p:extLst>
+      <p:ext uri="{BB962C8B-B14F-4D97-AF65-F5344CB8AC3E}">
+        <p14:creationId xmlns:p14="http://schemas.microsoft.com/office/powerpoint/2010/main" val="4209007239"/>
+      </p:ext>
+    </p:extLst>
+  </p:cSld>
+  <p:clrMapOvr>
+    <a:masterClrMapping/>
+  </p:clrMapOvr>
+  <p:transition>
+    <p:fade/>
+  </p:transition>
+</p:sld>
+</file>
+
+<file path=ppt/slides/slide8.xml><?xml version="1.0" encoding="utf-8"?>
+<p:sld xmlns:a="http://schemas.openxmlformats.org/drawingml/2006/main" xmlns:r="http://schemas.openxmlformats.org/officeDocument/2006/relationships" xmlns:p="http://schemas.openxmlformats.org/presentationml/2006/main">
+  <p:cSld>
+    <p:spTree>
+      <p:nvGrpSpPr>
+        <p:cNvPr id="1" name=""/>
+        <p:cNvGrpSpPr/>
+        <p:nvPr/>
+      </p:nvGrpSpPr>
+      <p:grpSpPr>
+        <a:xfrm>
+          <a:off x="0" y="0"/>
+          <a:ext cx="0" cy="0"/>
+          <a:chOff x="0" y="0"/>
+          <a:chExt cx="0" cy="0"/>
+        </a:xfrm>
+      </p:grpSpPr>
+      <p:sp>
+        <p:nvSpPr>
+          <p:cNvPr id="2" name="Title 1">
+            <a:extLst>
+              <a:ext uri="{FF2B5EF4-FFF2-40B4-BE49-F238E27FC236}">
+                <a16:creationId xmlns:a16="http://schemas.microsoft.com/office/drawing/2014/main" id="{1D0CD931-0E5B-4F2A-B453-82933D8FDFBF}"/>
               </a:ext>
             </a:extLst>
           </p:cNvPr>
@@ -12802,22 +13419,27 @@
             <a:spLocks noGrp="1"/>
           </p:cNvSpPr>
           <p:nvPr>
-            <p:ph type="body" sz="quarter" idx="10"/>
+            <p:ph type="title"/>
           </p:nvPr>
         </p:nvSpPr>
         <p:spPr>
           <a:xfrm>
-            <a:off x="633457" y="1749892"/>
-            <a:ext cx="10925086" cy="369332"/>
+            <a:off x="838200" y="92753"/>
+            <a:ext cx="10515600" cy="1325563"/>
           </a:xfrm>
         </p:spPr>
         <p:txBody>
-          <a:bodyPr/>
+          <a:bodyPr>
+            <a:normAutofit/>
+          </a:bodyPr>
           <a:lstStyle/>
           <a:p>
             <a:r>
-              <a:rPr lang="en-US" sz="2000" dirty="0"/>
-              <a:t>3 Materialized View </a:t>
+              <a:rPr lang="en-US" sz="4000" dirty="0">
+                <a:latin typeface="Arial" panose="020B0604020202020204" pitchFamily="34" charset="0"/>
+                <a:cs typeface="Arial" panose="020B0604020202020204" pitchFamily="34" charset="0"/>
+              </a:rPr>
+              <a:t>3. Materialized View</a:t>
             </a:r>
           </a:p>
         </p:txBody>
@@ -13396,14 +14018,14 @@
           <p:nvPr/>
         </p:nvPicPr>
         <p:blipFill>
-          <a:blip r:embed="rId2"/>
+          <a:blip r:embed="rId3"/>
           <a:stretch>
             <a:fillRect/>
           </a:stretch>
         </p:blipFill>
         <p:spPr>
           <a:xfrm>
-            <a:off x="1645859" y="3132585"/>
+            <a:off x="1430572" y="3119171"/>
             <a:ext cx="655042" cy="601761"/>
           </a:xfrm>
           <a:prstGeom prst="rect">
@@ -13425,8 +14047,8 @@
         </p:nvSpPr>
         <p:spPr>
           <a:xfrm>
-            <a:off x="2293609" y="3220966"/>
-            <a:ext cx="1789937" cy="882581"/>
+            <a:off x="2085615" y="3094550"/>
+            <a:ext cx="2655876" cy="577049"/>
           </a:xfrm>
           <a:prstGeom prst="rect">
             <a:avLst/>
@@ -13462,7 +14084,7 @@
                 </a:gradFill>
                 <a:latin typeface="Arial" panose="020B0604020202020204" pitchFamily="34" charset="0"/>
               </a:rPr>
-              <a:t>Cosmos DB</a:t>
+              <a:t>Azure Cosmos DB</a:t>
             </a:r>
           </a:p>
         </p:txBody>
@@ -13482,7 +14104,7 @@
           <p:nvPr/>
         </p:nvPicPr>
         <p:blipFill>
-          <a:blip r:embed="rId3"/>
+          <a:blip r:embed="rId4"/>
           <a:stretch>
             <a:fillRect/>
           </a:stretch>
@@ -13965,7 +14587,7 @@
           <p:nvPr/>
         </p:nvPicPr>
         <p:blipFill>
-          <a:blip r:embed="rId2"/>
+          <a:blip r:embed="rId3"/>
           <a:stretch>
             <a:fillRect/>
           </a:stretch>
@@ -13996,8 +14618,8 @@
 </p:sld>
 </file>
 
-<file path=ppt/slides/slide8.xml><?xml version="1.0" encoding="utf-8"?>
-<p:sld xmlns:a="http://schemas.openxmlformats.org/drawingml/2006/main" xmlns:r="http://schemas.openxmlformats.org/officeDocument/2006/relationships" xmlns:p="http://schemas.openxmlformats.org/presentationml/2006/main">
+<file path=ppt/slides/slide9.xml><?xml version="1.0" encoding="utf-8"?>
+<p:sld xmlns:a="http://schemas.openxmlformats.org/drawingml/2006/main" xmlns:r="http://schemas.openxmlformats.org/officeDocument/2006/relationships" xmlns:p="http://schemas.openxmlformats.org/presentationml/2006/main" show="0">
   <p:cSld>
     <p:spTree>
       <p:nvGrpSpPr>
@@ -14018,7 +14640,7 @@
           <p:cNvPr id="2" name="Title 1">
             <a:extLst>
               <a:ext uri="{FF2B5EF4-FFF2-40B4-BE49-F238E27FC236}">
-                <a16:creationId xmlns:a16="http://schemas.microsoft.com/office/drawing/2014/main" id="{BDCEF1CF-0156-4649-9F4A-2761D687C086}"/>
+                <a16:creationId xmlns:a16="http://schemas.microsoft.com/office/drawing/2014/main" id="{49732C0D-3FCC-4193-9362-A24F452C3BA7}"/>
               </a:ext>
             </a:extLst>
           </p:cNvPr>
@@ -14031,297 +14653,25 @@
         </p:nvSpPr>
         <p:spPr>
           <a:xfrm>
-            <a:off x="838200" y="88398"/>
-            <a:ext cx="10515600" cy="1325563"/>
+            <a:off x="1166442" y="3084533"/>
+            <a:ext cx="9859116" cy="1292662"/>
           </a:xfrm>
         </p:spPr>
         <p:txBody>
-          <a:bodyPr>
-            <a:normAutofit/>
-          </a:bodyPr>
+          <a:bodyPr/>
           <a:lstStyle/>
           <a:p>
             <a:r>
-              <a:rPr lang="en-US" sz="3600" dirty="0">
-                <a:latin typeface="Arial" panose="020B0604020202020204" pitchFamily="34" charset="0"/>
-                <a:cs typeface="Arial" panose="020B0604020202020204" pitchFamily="34" charset="0"/>
-              </a:rPr>
-              <a:t>3 Different ways to use the Change Feed</a:t>
+              <a:rPr lang="en-US" dirty="0"/>
+              <a:t>Building a materialized view using the Azure Cosmos DB Change Feed</a:t>
             </a:r>
           </a:p>
         </p:txBody>
       </p:sp>
-      <p:graphicFrame>
-        <p:nvGraphicFramePr>
-          <p:cNvPr id="3" name="Table 2">
-            <a:extLst>
-              <a:ext uri="{FF2B5EF4-FFF2-40B4-BE49-F238E27FC236}">
-                <a16:creationId xmlns:a16="http://schemas.microsoft.com/office/drawing/2014/main" id="{CC3921E2-87CD-46BE-A10F-6E9547602BA8}"/>
-              </a:ext>
-            </a:extLst>
-          </p:cNvPr>
-          <p:cNvGraphicFramePr>
-            <a:graphicFrameLocks noGrp="1"/>
-          </p:cNvGraphicFramePr>
-          <p:nvPr>
-            <p:extLst>
-              <p:ext uri="{D42A27DB-BD31-4B8C-83A1-F6EECF244321}">
-                <p14:modId xmlns:p14="http://schemas.microsoft.com/office/powerpoint/2010/main" val="161136548"/>
-              </p:ext>
-            </p:extLst>
-          </p:nvPr>
-        </p:nvGraphicFramePr>
-        <p:xfrm>
-          <a:off x="563879" y="1840686"/>
-          <a:ext cx="11064241" cy="4216011"/>
-        </p:xfrm>
-        <a:graphic>
-          <a:graphicData uri="http://schemas.openxmlformats.org/drawingml/2006/table">
-            <a:tbl>
-              <a:tblPr firstRow="1" bandRow="1">
-                <a:tableStyleId>{5C22544A-7EE6-4342-B048-85BDC9FD1C3A}</a:tableStyleId>
-              </a:tblPr>
-              <a:tblGrid>
-                <a:gridCol w="2376763">
-                  <a:extLst>
-                    <a:ext uri="{9D8B030D-6E8A-4147-A177-3AD203B41FA5}">
-                      <a16:colId xmlns:a16="http://schemas.microsoft.com/office/drawing/2014/main" val="1439597733"/>
-                    </a:ext>
-                  </a:extLst>
-                </a:gridCol>
-                <a:gridCol w="1966977">
-                  <a:extLst>
-                    <a:ext uri="{9D8B030D-6E8A-4147-A177-3AD203B41FA5}">
-                      <a16:colId xmlns:a16="http://schemas.microsoft.com/office/drawing/2014/main" val="234410396"/>
-                    </a:ext>
-                  </a:extLst>
-                </a:gridCol>
-                <a:gridCol w="6720501">
-                  <a:extLst>
-                    <a:ext uri="{9D8B030D-6E8A-4147-A177-3AD203B41FA5}">
-                      <a16:colId xmlns:a16="http://schemas.microsoft.com/office/drawing/2014/main" val="1602253400"/>
-                    </a:ext>
-                  </a:extLst>
-                </a:gridCol>
-              </a:tblGrid>
-              <a:tr h="535412">
-                <a:tc>
-                  <a:txBody>
-                    <a:bodyPr/>
-                    <a:lstStyle/>
-                    <a:p>
-                      <a:pPr algn="ctr"/>
-                      <a:r>
-                        <a:rPr lang="en-US" sz="2000"/>
-                        <a:t>Implementation</a:t>
-                      </a:r>
-                    </a:p>
-                  </a:txBody>
-                  <a:tcPr marL="89642" marR="89642" marT="44821" marB="44821" anchor="ctr"/>
-                </a:tc>
-                <a:tc>
-                  <a:txBody>
-                    <a:bodyPr/>
-                    <a:lstStyle/>
-                    <a:p>
-                      <a:pPr algn="ctr"/>
-                      <a:r>
-                        <a:rPr lang="en-US" sz="2000"/>
-                        <a:t>Use Case</a:t>
-                      </a:r>
-                    </a:p>
-                  </a:txBody>
-                  <a:tcPr marL="89642" marR="89642" marT="44821" marB="44821" anchor="ctr"/>
-                </a:tc>
-                <a:tc>
-                  <a:txBody>
-                    <a:bodyPr/>
-                    <a:lstStyle/>
-                    <a:p>
-                      <a:pPr algn="ctr"/>
-                      <a:r>
-                        <a:rPr lang="en-US" sz="2000"/>
-                        <a:t>Advantages</a:t>
-                      </a:r>
-                    </a:p>
-                  </a:txBody>
-                  <a:tcPr marL="89642" marR="89642" marT="44821" marB="44821" anchor="ctr"/>
-                </a:tc>
-                <a:extLst>
-                  <a:ext uri="{0D108BD9-81ED-4DB2-BD59-A6C34878D82A}">
-                    <a16:rowId xmlns:a16="http://schemas.microsoft.com/office/drawing/2014/main" val="1446689242"/>
-                  </a:ext>
-                </a:extLst>
-              </a:tr>
-              <a:tr h="1199378">
-                <a:tc>
-                  <a:txBody>
-                    <a:bodyPr/>
-                    <a:lstStyle/>
-                    <a:p>
-                      <a:pPr algn="ctr"/>
-                      <a:r>
-                        <a:rPr lang="en-US" sz="2000" dirty="0"/>
-                        <a:t>Azure Functions</a:t>
-                      </a:r>
-                    </a:p>
-                  </a:txBody>
-                  <a:tcPr marL="89642" marR="89642" marT="44821" marB="44821" anchor="ctr"/>
-                </a:tc>
-                <a:tc>
-                  <a:txBody>
-                    <a:bodyPr/>
-                    <a:lstStyle/>
-                    <a:p>
-                      <a:pPr algn="ctr"/>
-                      <a:r>
-                        <a:rPr lang="en-US" sz="2000"/>
-                        <a:t>Serverless applications</a:t>
-                      </a:r>
-                    </a:p>
-                  </a:txBody>
-                  <a:tcPr marL="89642" marR="89642" marT="44821" marB="44821" anchor="ctr"/>
-                </a:tc>
-                <a:tc>
-                  <a:txBody>
-                    <a:bodyPr/>
-                    <a:lstStyle/>
-                    <a:p>
-                      <a:pPr algn="ctr"/>
-                      <a:r>
-                        <a:rPr lang="en-US" sz="2000"/>
-                        <a:t>Easy to implement. </a:t>
-                      </a:r>
-                    </a:p>
-                    <a:p>
-                      <a:pPr algn="ctr"/>
-                      <a:r>
-                        <a:rPr lang="en-US" sz="2000"/>
-                        <a:t>Used as a trigger, input or output binding to an Azure Function.</a:t>
-                      </a:r>
-                    </a:p>
-                  </a:txBody>
-                  <a:tcPr marL="89642" marR="89642" marT="44821" marB="44821" anchor="ctr"/>
-                </a:tc>
-                <a:extLst>
-                  <a:ext uri="{0D108BD9-81ED-4DB2-BD59-A6C34878D82A}">
-                    <a16:rowId xmlns:a16="http://schemas.microsoft.com/office/drawing/2014/main" val="4214272625"/>
-                  </a:ext>
-                </a:extLst>
-              </a:tr>
-              <a:tr h="1182369">
-                <a:tc>
-                  <a:txBody>
-                    <a:bodyPr/>
-                    <a:lstStyle/>
-                    <a:p>
-                      <a:pPr algn="ctr"/>
-                      <a:r>
-                        <a:rPr lang="en-US" sz="2000"/>
-                        <a:t>Change Feed </a:t>
-                      </a:r>
-                    </a:p>
-                    <a:p>
-                      <a:pPr algn="ctr"/>
-                      <a:r>
-                        <a:rPr lang="en-US" sz="2000"/>
-                        <a:t>Processor Library</a:t>
-                      </a:r>
-                    </a:p>
-                  </a:txBody>
-                  <a:tcPr marL="89642" marR="89642" marT="44821" marB="44821" anchor="ctr"/>
-                </a:tc>
-                <a:tc>
-                  <a:txBody>
-                    <a:bodyPr/>
-                    <a:lstStyle/>
-                    <a:p>
-                      <a:pPr algn="ctr"/>
-                      <a:r>
-                        <a:rPr lang="en-US" sz="2000"/>
-                        <a:t>Distributed applications</a:t>
-                      </a:r>
-                    </a:p>
-                  </a:txBody>
-                  <a:tcPr marL="89642" marR="89642" marT="44821" marB="44821" anchor="ctr"/>
-                </a:tc>
-                <a:tc>
-                  <a:txBody>
-                    <a:bodyPr/>
-                    <a:lstStyle/>
-                    <a:p>
-                      <a:pPr algn="ctr"/>
-                      <a:r>
-                        <a:rPr lang="en-US" sz="2000"/>
-                        <a:t>Ability to distribute the processing of events towards multiple clients. Requires a “leases collection”.</a:t>
-                      </a:r>
-                    </a:p>
-                  </a:txBody>
-                  <a:tcPr marL="89642" marR="89642" marT="44821" marB="44821" anchor="ctr"/>
-                </a:tc>
-                <a:extLst>
-                  <a:ext uri="{0D108BD9-81ED-4DB2-BD59-A6C34878D82A}">
-                    <a16:rowId xmlns:a16="http://schemas.microsoft.com/office/drawing/2014/main" val="3060184176"/>
-                  </a:ext>
-                </a:extLst>
-              </a:tr>
-              <a:tr h="1298852">
-                <a:tc>
-                  <a:txBody>
-                    <a:bodyPr/>
-                    <a:lstStyle/>
-                    <a:p>
-                      <a:pPr algn="ctr"/>
-                      <a:r>
-                        <a:rPr lang="en-US" sz="2000"/>
-                        <a:t>SQL API SDK for .NET or Java</a:t>
-                      </a:r>
-                    </a:p>
-                  </a:txBody>
-                  <a:tcPr marL="89642" marR="89642" marT="44821" marB="44821" anchor="ctr"/>
-                </a:tc>
-                <a:tc>
-                  <a:txBody>
-                    <a:bodyPr/>
-                    <a:lstStyle/>
-                    <a:p>
-                      <a:pPr algn="ctr"/>
-                      <a:r>
-                        <a:rPr lang="en-US" sz="2000"/>
-                        <a:t>Not recommended</a:t>
-                      </a:r>
-                    </a:p>
-                  </a:txBody>
-                  <a:tcPr marL="89642" marR="89642" marT="44821" marB="44821" anchor="ctr"/>
-                </a:tc>
-                <a:tc>
-                  <a:txBody>
-                    <a:bodyPr/>
-                    <a:lstStyle/>
-                    <a:p>
-                      <a:pPr algn="ctr"/>
-                      <a:r>
-                        <a:rPr lang="en-US" sz="2000" dirty="0"/>
-                        <a:t>Requires manual implementation in a .NET or Java application.</a:t>
-                      </a:r>
-                    </a:p>
-                  </a:txBody>
-                  <a:tcPr marL="89642" marR="89642" marT="44821" marB="44821" anchor="ctr"/>
-                </a:tc>
-                <a:extLst>
-                  <a:ext uri="{0D108BD9-81ED-4DB2-BD59-A6C34878D82A}">
-                    <a16:rowId xmlns:a16="http://schemas.microsoft.com/office/drawing/2014/main" val="3319864853"/>
-                  </a:ext>
-                </a:extLst>
-              </a:tr>
-            </a:tbl>
-          </a:graphicData>
-        </a:graphic>
-      </p:graphicFrame>
     </p:spTree>
     <p:extLst>
       <p:ext uri="{BB962C8B-B14F-4D97-AF65-F5344CB8AC3E}">
-        <p14:creationId xmlns:p14="http://schemas.microsoft.com/office/powerpoint/2010/main" val="957795446"/>
+        <p14:creationId xmlns:p14="http://schemas.microsoft.com/office/powerpoint/2010/main" val="3555402536"/>
       </p:ext>
     </p:extLst>
   </p:cSld>
@@ -14331,471 +14681,6 @@
   <p:transition>
     <p:fade/>
   </p:transition>
-</p:sld>
-</file>
-
-<file path=ppt/slides/slide9.xml><?xml version="1.0" encoding="utf-8"?>
-<p:sld xmlns:a="http://schemas.openxmlformats.org/drawingml/2006/main" xmlns:r="http://schemas.openxmlformats.org/officeDocument/2006/relationships" xmlns:p="http://schemas.openxmlformats.org/presentationml/2006/main">
-  <p:cSld>
-    <p:spTree>
-      <p:nvGrpSpPr>
-        <p:cNvPr id="1" name=""/>
-        <p:cNvGrpSpPr/>
-        <p:nvPr/>
-      </p:nvGrpSpPr>
-      <p:grpSpPr>
-        <a:xfrm>
-          <a:off x="0" y="0"/>
-          <a:ext cx="0" cy="0"/>
-          <a:chOff x="0" y="0"/>
-          <a:chExt cx="0" cy="0"/>
-        </a:xfrm>
-      </p:grpSpPr>
-      <p:sp>
-        <p:nvSpPr>
-          <p:cNvPr id="2" name="Title 1">
-            <a:extLst>
-              <a:ext uri="{FF2B5EF4-FFF2-40B4-BE49-F238E27FC236}">
-                <a16:creationId xmlns:a16="http://schemas.microsoft.com/office/drawing/2014/main" id="{BB1C4994-F457-47B3-BBA4-39D1E2365A8D}"/>
-              </a:ext>
-            </a:extLst>
-          </p:cNvPr>
-          <p:cNvSpPr>
-            <a:spLocks noGrp="1"/>
-          </p:cNvSpPr>
-          <p:nvPr>
-            <p:ph type="title"/>
-          </p:nvPr>
-        </p:nvSpPr>
-        <p:spPr>
-          <a:xfrm>
-            <a:off x="838200" y="110680"/>
-            <a:ext cx="10515600" cy="1325563"/>
-          </a:xfrm>
-        </p:spPr>
-        <p:txBody>
-          <a:bodyPr>
-            <a:normAutofit/>
-          </a:bodyPr>
-          <a:lstStyle/>
-          <a:p>
-            <a:r>
-              <a:rPr lang="en-US" sz="4000" dirty="0">
-                <a:latin typeface="Arial" panose="020B0604020202020204" pitchFamily="34" charset="0"/>
-                <a:cs typeface="Arial" panose="020B0604020202020204" pitchFamily="34" charset="0"/>
-              </a:rPr>
-              <a:t>Using the Change Feed Processor Library</a:t>
-            </a:r>
-          </a:p>
-        </p:txBody>
-      </p:sp>
-      <p:sp>
-        <p:nvSpPr>
-          <p:cNvPr id="3" name="Text Placeholder 5">
-            <a:extLst>
-              <a:ext uri="{FF2B5EF4-FFF2-40B4-BE49-F238E27FC236}">
-                <a16:creationId xmlns:a16="http://schemas.microsoft.com/office/drawing/2014/main" id="{A3A99102-9472-4260-A6D3-A3B4E0E08804}"/>
-              </a:ext>
-            </a:extLst>
-          </p:cNvPr>
-          <p:cNvSpPr>
-            <a:spLocks noGrp="1"/>
-          </p:cNvSpPr>
-          <p:nvPr>
-            <p:ph type="body" sz="quarter" idx="10"/>
-          </p:nvPr>
-        </p:nvSpPr>
-        <p:spPr>
-          <a:xfrm>
-            <a:off x="136114" y="1913020"/>
-            <a:ext cx="5290128" cy="3983616"/>
-          </a:xfrm>
-        </p:spPr>
-        <p:txBody>
-          <a:bodyPr/>
-          <a:lstStyle/>
-          <a:p>
-            <a:pPr marL="342900" indent="-342900">
-              <a:buFont typeface="Arial" panose="020B0604020202020204" pitchFamily="34" charset="0"/>
-              <a:buChar char="•"/>
-            </a:pPr>
-            <a:r>
-              <a:rPr lang="en-US" sz="2400" b="0" dirty="0"/>
-              <a:t>Spin up instances of the processor  as needed</a:t>
-            </a:r>
-          </a:p>
-          <a:p>
-            <a:pPr marL="342900" indent="-342900">
-              <a:buFont typeface="Arial" panose="020B0604020202020204" pitchFamily="34" charset="0"/>
-              <a:buChar char="•"/>
-            </a:pPr>
-            <a:r>
-              <a:rPr lang="en-US" sz="2400" b="0" dirty="0"/>
-              <a:t>Each host has consumers = observer to implement</a:t>
-            </a:r>
-          </a:p>
-          <a:p>
-            <a:pPr marL="342900" indent="-342900">
-              <a:buFont typeface="Arial" panose="020B0604020202020204" pitchFamily="34" charset="0"/>
-              <a:buChar char="•"/>
-            </a:pPr>
-            <a:r>
-              <a:rPr lang="en-US" sz="2400" b="0" dirty="0"/>
-              <a:t>Each host assigns itself leases on partitions to monitor</a:t>
-            </a:r>
-          </a:p>
-          <a:p>
-            <a:pPr marL="342900" indent="-342900">
-              <a:buFont typeface="Arial" panose="020B0604020202020204" pitchFamily="34" charset="0"/>
-              <a:buChar char="•"/>
-            </a:pPr>
-            <a:r>
-              <a:rPr lang="en-US" sz="2400" b="0" dirty="0"/>
-              <a:t>On each change, logic in consumers gets triggered</a:t>
-            </a:r>
-          </a:p>
-          <a:p>
-            <a:pPr marL="342900" indent="-342900">
-              <a:buFont typeface="Arial" panose="020B0604020202020204" pitchFamily="34" charset="0"/>
-              <a:buChar char="•"/>
-            </a:pPr>
-            <a:r>
-              <a:rPr lang="en-US" sz="2400" b="0" dirty="0"/>
-              <a:t>1 lease collection stored in Cosmos DB</a:t>
-            </a:r>
-          </a:p>
-          <a:p>
-            <a:endParaRPr lang="en-US" sz="2400" b="0" dirty="0"/>
-          </a:p>
-          <a:p>
-            <a:endParaRPr lang="en-US" sz="2400" b="0" dirty="0"/>
-          </a:p>
-          <a:p>
-            <a:endParaRPr lang="en-US" sz="2400" b="0" dirty="0"/>
-          </a:p>
-          <a:p>
-            <a:endParaRPr lang="en-US" sz="2400" dirty="0"/>
-          </a:p>
-        </p:txBody>
-      </p:sp>
-      <p:pic>
-        <p:nvPicPr>
-          <p:cNvPr id="4" name="Picture 3">
-            <a:extLst>
-              <a:ext uri="{FF2B5EF4-FFF2-40B4-BE49-F238E27FC236}">
-                <a16:creationId xmlns:a16="http://schemas.microsoft.com/office/drawing/2014/main" id="{486C3B26-9F94-42C3-A331-36A30A5892A7}"/>
-              </a:ext>
-            </a:extLst>
-          </p:cNvPr>
-          <p:cNvPicPr>
-            <a:picLocks noChangeAspect="1"/>
-          </p:cNvPicPr>
-          <p:nvPr/>
-        </p:nvPicPr>
-        <p:blipFill>
-          <a:blip r:embed="rId2"/>
-          <a:stretch>
-            <a:fillRect/>
-          </a:stretch>
-        </p:blipFill>
-        <p:spPr>
-          <a:xfrm>
-            <a:off x="5635280" y="1788538"/>
-            <a:ext cx="6165670" cy="4232581"/>
-          </a:xfrm>
-          <a:prstGeom prst="rect">
-            <a:avLst/>
-          </a:prstGeom>
-        </p:spPr>
-      </p:pic>
-    </p:spTree>
-    <p:extLst>
-      <p:ext uri="{BB962C8B-B14F-4D97-AF65-F5344CB8AC3E}">
-        <p14:creationId xmlns:p14="http://schemas.microsoft.com/office/powerpoint/2010/main" val="1629628066"/>
-      </p:ext>
-    </p:extLst>
-  </p:cSld>
-  <p:clrMapOvr>
-    <a:masterClrMapping/>
-  </p:clrMapOvr>
-  <p:transition>
-    <p:fade/>
-  </p:transition>
-  <p:timing>
-    <p:tnLst>
-      <p:par>
-        <p:cTn id="1" dur="indefinite" restart="never" nodeType="tmRoot">
-          <p:childTnLst>
-            <p:seq concurrent="1" nextAc="seek">
-              <p:cTn id="2" dur="indefinite" nodeType="mainSeq">
-                <p:childTnLst>
-                  <p:par>
-                    <p:cTn id="3" fill="hold">
-                      <p:stCondLst>
-                        <p:cond delay="indefinite"/>
-                      </p:stCondLst>
-                      <p:childTnLst>
-                        <p:par>
-                          <p:cTn id="4" fill="hold">
-                            <p:stCondLst>
-                              <p:cond delay="0"/>
-                            </p:stCondLst>
-                            <p:childTnLst>
-                              <p:par>
-                                <p:cTn id="5" presetID="1" presetClass="entr" presetSubtype="0" fill="hold" nodeType="clickEffect">
-                                  <p:stCondLst>
-                                    <p:cond delay="0"/>
-                                  </p:stCondLst>
-                                  <p:childTnLst>
-                                    <p:set>
-                                      <p:cBhvr>
-                                        <p:cTn id="6" dur="1" fill="hold">
-                                          <p:stCondLst>
-                                            <p:cond delay="0"/>
-                                          </p:stCondLst>
-                                        </p:cTn>
-                                        <p:tgtEl>
-                                          <p:spTgt spid="3">
-                                            <p:txEl>
-                                              <p:pRg st="0" end="0"/>
-                                            </p:txEl>
-                                          </p:spTgt>
-                                        </p:tgtEl>
-                                        <p:attrNameLst>
-                                          <p:attrName>style.visibility</p:attrName>
-                                        </p:attrNameLst>
-                                      </p:cBhvr>
-                                      <p:to>
-                                        <p:strVal val="visible"/>
-                                      </p:to>
-                                    </p:set>
-                                  </p:childTnLst>
-                                </p:cTn>
-                              </p:par>
-                            </p:childTnLst>
-                          </p:cTn>
-                        </p:par>
-                      </p:childTnLst>
-                    </p:cTn>
-                  </p:par>
-                  <p:par>
-                    <p:cTn id="7" fill="hold">
-                      <p:stCondLst>
-                        <p:cond delay="indefinite"/>
-                      </p:stCondLst>
-                      <p:childTnLst>
-                        <p:par>
-                          <p:cTn id="8" fill="hold">
-                            <p:stCondLst>
-                              <p:cond delay="0"/>
-                            </p:stCondLst>
-                            <p:childTnLst>
-                              <p:par>
-                                <p:cTn id="9" presetID="1" presetClass="entr" presetSubtype="0" fill="hold" nodeType="clickEffect">
-                                  <p:stCondLst>
-                                    <p:cond delay="0"/>
-                                  </p:stCondLst>
-                                  <p:childTnLst>
-                                    <p:set>
-                                      <p:cBhvr>
-                                        <p:cTn id="10" dur="1" fill="hold">
-                                          <p:stCondLst>
-                                            <p:cond delay="0"/>
-                                          </p:stCondLst>
-                                        </p:cTn>
-                                        <p:tgtEl>
-                                          <p:spTgt spid="3">
-                                            <p:txEl>
-                                              <p:pRg st="1" end="1"/>
-                                            </p:txEl>
-                                          </p:spTgt>
-                                        </p:tgtEl>
-                                        <p:attrNameLst>
-                                          <p:attrName>style.visibility</p:attrName>
-                                        </p:attrNameLst>
-                                      </p:cBhvr>
-                                      <p:to>
-                                        <p:strVal val="visible"/>
-                                      </p:to>
-                                    </p:set>
-                                  </p:childTnLst>
-                                </p:cTn>
-                              </p:par>
-                            </p:childTnLst>
-                          </p:cTn>
-                        </p:par>
-                      </p:childTnLst>
-                    </p:cTn>
-                  </p:par>
-                  <p:par>
-                    <p:cTn id="11" fill="hold">
-                      <p:stCondLst>
-                        <p:cond delay="indefinite"/>
-                      </p:stCondLst>
-                      <p:childTnLst>
-                        <p:par>
-                          <p:cTn id="12" fill="hold">
-                            <p:stCondLst>
-                              <p:cond delay="0"/>
-                            </p:stCondLst>
-                            <p:childTnLst>
-                              <p:par>
-                                <p:cTn id="13" presetID="1" presetClass="entr" presetSubtype="0" fill="hold" nodeType="clickEffect">
-                                  <p:stCondLst>
-                                    <p:cond delay="0"/>
-                                  </p:stCondLst>
-                                  <p:childTnLst>
-                                    <p:set>
-                                      <p:cBhvr>
-                                        <p:cTn id="14" dur="1" fill="hold">
-                                          <p:stCondLst>
-                                            <p:cond delay="0"/>
-                                          </p:stCondLst>
-                                        </p:cTn>
-                                        <p:tgtEl>
-                                          <p:spTgt spid="3">
-                                            <p:txEl>
-                                              <p:pRg st="2" end="2"/>
-                                            </p:txEl>
-                                          </p:spTgt>
-                                        </p:tgtEl>
-                                        <p:attrNameLst>
-                                          <p:attrName>style.visibility</p:attrName>
-                                        </p:attrNameLst>
-                                      </p:cBhvr>
-                                      <p:to>
-                                        <p:strVal val="visible"/>
-                                      </p:to>
-                                    </p:set>
-                                  </p:childTnLst>
-                                </p:cTn>
-                              </p:par>
-                            </p:childTnLst>
-                          </p:cTn>
-                        </p:par>
-                      </p:childTnLst>
-                    </p:cTn>
-                  </p:par>
-                  <p:par>
-                    <p:cTn id="15" fill="hold">
-                      <p:stCondLst>
-                        <p:cond delay="indefinite"/>
-                      </p:stCondLst>
-                      <p:childTnLst>
-                        <p:par>
-                          <p:cTn id="16" fill="hold">
-                            <p:stCondLst>
-                              <p:cond delay="0"/>
-                            </p:stCondLst>
-                            <p:childTnLst>
-                              <p:par>
-                                <p:cTn id="17" presetID="1" presetClass="entr" presetSubtype="0" fill="hold" nodeType="clickEffect">
-                                  <p:stCondLst>
-                                    <p:cond delay="0"/>
-                                  </p:stCondLst>
-                                  <p:childTnLst>
-                                    <p:set>
-                                      <p:cBhvr>
-                                        <p:cTn id="18" dur="1" fill="hold">
-                                          <p:stCondLst>
-                                            <p:cond delay="0"/>
-                                          </p:stCondLst>
-                                        </p:cTn>
-                                        <p:tgtEl>
-                                          <p:spTgt spid="3">
-                                            <p:txEl>
-                                              <p:pRg st="3" end="3"/>
-                                            </p:txEl>
-                                          </p:spTgt>
-                                        </p:tgtEl>
-                                        <p:attrNameLst>
-                                          <p:attrName>style.visibility</p:attrName>
-                                        </p:attrNameLst>
-                                      </p:cBhvr>
-                                      <p:to>
-                                        <p:strVal val="visible"/>
-                                      </p:to>
-                                    </p:set>
-                                  </p:childTnLst>
-                                </p:cTn>
-                              </p:par>
-                            </p:childTnLst>
-                          </p:cTn>
-                        </p:par>
-                      </p:childTnLst>
-                    </p:cTn>
-                  </p:par>
-                  <p:par>
-                    <p:cTn id="19" fill="hold">
-                      <p:stCondLst>
-                        <p:cond delay="indefinite"/>
-                      </p:stCondLst>
-                      <p:childTnLst>
-                        <p:par>
-                          <p:cTn id="20" fill="hold">
-                            <p:stCondLst>
-                              <p:cond delay="0"/>
-                            </p:stCondLst>
-                            <p:childTnLst>
-                              <p:par>
-                                <p:cTn id="21" presetID="1" presetClass="entr" presetSubtype="0" fill="hold" nodeType="clickEffect">
-                                  <p:stCondLst>
-                                    <p:cond delay="0"/>
-                                  </p:stCondLst>
-                                  <p:childTnLst>
-                                    <p:set>
-                                      <p:cBhvr>
-                                        <p:cTn id="22" dur="1" fill="hold">
-                                          <p:stCondLst>
-                                            <p:cond delay="0"/>
-                                          </p:stCondLst>
-                                        </p:cTn>
-                                        <p:tgtEl>
-                                          <p:spTgt spid="3">
-                                            <p:txEl>
-                                              <p:pRg st="4" end="4"/>
-                                            </p:txEl>
-                                          </p:spTgt>
-                                        </p:tgtEl>
-                                        <p:attrNameLst>
-                                          <p:attrName>style.visibility</p:attrName>
-                                        </p:attrNameLst>
-                                      </p:cBhvr>
-                                      <p:to>
-                                        <p:strVal val="visible"/>
-                                      </p:to>
-                                    </p:set>
-                                  </p:childTnLst>
-                                </p:cTn>
-                              </p:par>
-                            </p:childTnLst>
-                          </p:cTn>
-                        </p:par>
-                      </p:childTnLst>
-                    </p:cTn>
-                  </p:par>
-                </p:childTnLst>
-              </p:cTn>
-              <p:prevCondLst>
-                <p:cond evt="onPrev" delay="0">
-                  <p:tgtEl>
-                    <p:sldTgt/>
-                  </p:tgtEl>
-                </p:cond>
-              </p:prevCondLst>
-              <p:nextCondLst>
-                <p:cond evt="onNext" delay="0">
-                  <p:tgtEl>
-                    <p:sldTgt/>
-                  </p:tgtEl>
-                </p:cond>
-              </p:nextCondLst>
-            </p:seq>
-          </p:childTnLst>
-        </p:cTn>
-      </p:par>
-    </p:tnLst>
-  </p:timing>
 </p:sld>
 </file>
 
@@ -15663,7 +15548,7 @@
 </file>
 
 <file path=customXml/itemProps1.xml><?xml version="1.0" encoding="utf-8"?>
-<ds:datastoreItem xmlns:ds="http://schemas.openxmlformats.org/officeDocument/2006/customXml" ds:itemID="{21A078F2-2CE7-4A00-AFB0-A6144267802C}">
+<ds:datastoreItem xmlns:ds="http://schemas.openxmlformats.org/officeDocument/2006/customXml" ds:itemID="{3D2DABB3-6646-48C4-BE5A-7BF5800B8A20}">
   <ds:schemaRefs>
     <ds:schemaRef ds:uri="http://schemas.microsoft.com/VisualStudio/2011/storyboarding/control"/>
   </ds:schemaRefs>
@@ -15671,7 +15556,7 @@
 </file>
 
 <file path=customXml/itemProps2.xml><?xml version="1.0" encoding="utf-8"?>
-<ds:datastoreItem xmlns:ds="http://schemas.openxmlformats.org/officeDocument/2006/customXml" ds:itemID="{3D2DABB3-6646-48C4-BE5A-7BF5800B8A20}">
+<ds:datastoreItem xmlns:ds="http://schemas.openxmlformats.org/officeDocument/2006/customXml" ds:itemID="{21A078F2-2CE7-4A00-AFB0-A6144267802C}">
   <ds:schemaRefs>
     <ds:schemaRef ds:uri="http://schemas.microsoft.com/VisualStudio/2011/storyboarding/control"/>
   </ds:schemaRefs>

</xml_diff>